<commit_message>
More box 1 figure edits
</commit_message>
<xml_diff>
--- a/manuscript/final_figures/Figure_Box1_cleanup.pptx
+++ b/manuscript/final_figures/Figure_Box1_cleanup.pptx
@@ -243,7 +243,7 @@
           <a:p>
             <a:fld id="{9989B3A2-2388-44BE-9854-4BCC09CB1095}" type="datetimeFigureOut">
               <a:rPr lang="en-US" smtClean="0"/>
-              <a:t>12/9/2023</a:t>
+              <a:t>12/11/2023</a:t>
             </a:fld>
             <a:endParaRPr lang="en-US"/>
           </a:p>
@@ -413,7 +413,7 @@
           <a:p>
             <a:fld id="{9989B3A2-2388-44BE-9854-4BCC09CB1095}" type="datetimeFigureOut">
               <a:rPr lang="en-US" smtClean="0"/>
-              <a:t>12/9/2023</a:t>
+              <a:t>12/11/2023</a:t>
             </a:fld>
             <a:endParaRPr lang="en-US"/>
           </a:p>
@@ -593,7 +593,7 @@
           <a:p>
             <a:fld id="{9989B3A2-2388-44BE-9854-4BCC09CB1095}" type="datetimeFigureOut">
               <a:rPr lang="en-US" smtClean="0"/>
-              <a:t>12/9/2023</a:t>
+              <a:t>12/11/2023</a:t>
             </a:fld>
             <a:endParaRPr lang="en-US"/>
           </a:p>
@@ -763,7 +763,7 @@
           <a:p>
             <a:fld id="{9989B3A2-2388-44BE-9854-4BCC09CB1095}" type="datetimeFigureOut">
               <a:rPr lang="en-US" smtClean="0"/>
-              <a:t>12/9/2023</a:t>
+              <a:t>12/11/2023</a:t>
             </a:fld>
             <a:endParaRPr lang="en-US"/>
           </a:p>
@@ -1007,7 +1007,7 @@
           <a:p>
             <a:fld id="{9989B3A2-2388-44BE-9854-4BCC09CB1095}" type="datetimeFigureOut">
               <a:rPr lang="en-US" smtClean="0"/>
-              <a:t>12/9/2023</a:t>
+              <a:t>12/11/2023</a:t>
             </a:fld>
             <a:endParaRPr lang="en-US"/>
           </a:p>
@@ -1239,7 +1239,7 @@
           <a:p>
             <a:fld id="{9989B3A2-2388-44BE-9854-4BCC09CB1095}" type="datetimeFigureOut">
               <a:rPr lang="en-US" smtClean="0"/>
-              <a:t>12/9/2023</a:t>
+              <a:t>12/11/2023</a:t>
             </a:fld>
             <a:endParaRPr lang="en-US"/>
           </a:p>
@@ -1606,7 +1606,7 @@
           <a:p>
             <a:fld id="{9989B3A2-2388-44BE-9854-4BCC09CB1095}" type="datetimeFigureOut">
               <a:rPr lang="en-US" smtClean="0"/>
-              <a:t>12/9/2023</a:t>
+              <a:t>12/11/2023</a:t>
             </a:fld>
             <a:endParaRPr lang="en-US"/>
           </a:p>
@@ -1724,7 +1724,7 @@
           <a:p>
             <a:fld id="{9989B3A2-2388-44BE-9854-4BCC09CB1095}" type="datetimeFigureOut">
               <a:rPr lang="en-US" smtClean="0"/>
-              <a:t>12/9/2023</a:t>
+              <a:t>12/11/2023</a:t>
             </a:fld>
             <a:endParaRPr lang="en-US"/>
           </a:p>
@@ -1819,7 +1819,7 @@
           <a:p>
             <a:fld id="{9989B3A2-2388-44BE-9854-4BCC09CB1095}" type="datetimeFigureOut">
               <a:rPr lang="en-US" smtClean="0"/>
-              <a:t>12/9/2023</a:t>
+              <a:t>12/11/2023</a:t>
             </a:fld>
             <a:endParaRPr lang="en-US"/>
           </a:p>
@@ -2096,7 +2096,7 @@
           <a:p>
             <a:fld id="{9989B3A2-2388-44BE-9854-4BCC09CB1095}" type="datetimeFigureOut">
               <a:rPr lang="en-US" smtClean="0"/>
-              <a:t>12/9/2023</a:t>
+              <a:t>12/11/2023</a:t>
             </a:fld>
             <a:endParaRPr lang="en-US"/>
           </a:p>
@@ -2353,7 +2353,7 @@
           <a:p>
             <a:fld id="{9989B3A2-2388-44BE-9854-4BCC09CB1095}" type="datetimeFigureOut">
               <a:rPr lang="en-US" smtClean="0"/>
-              <a:t>12/9/2023</a:t>
+              <a:t>12/11/2023</a:t>
             </a:fld>
             <a:endParaRPr lang="en-US"/>
           </a:p>
@@ -2566,7 +2566,7 @@
           <a:p>
             <a:fld id="{9989B3A2-2388-44BE-9854-4BCC09CB1095}" type="datetimeFigureOut">
               <a:rPr lang="en-US" smtClean="0"/>
-              <a:t>12/9/2023</a:t>
+              <a:t>12/11/2023</a:t>
             </a:fld>
             <a:endParaRPr lang="en-US"/>
           </a:p>
@@ -2973,10 +2973,10 @@
       </p:grpSpPr>
       <p:grpSp>
         <p:nvGrpSpPr>
-          <p:cNvPr id="25" name="Group 24">
+          <p:cNvPr id="7" name="Group 6">
             <a:extLst>
               <a:ext uri="{FF2B5EF4-FFF2-40B4-BE49-F238E27FC236}">
-                <a16:creationId xmlns:a16="http://schemas.microsoft.com/office/drawing/2014/main" id="{D1F2D3A0-F7DF-5982-8B0B-FC3BADC2C869}"/>
+                <a16:creationId xmlns:a16="http://schemas.microsoft.com/office/drawing/2014/main" id="{B7F00C9A-50F7-CE98-D92D-93781964996E}"/>
               </a:ext>
             </a:extLst>
           </p:cNvPr>
@@ -2985,18 +2985,47 @@
         </p:nvGrpSpPr>
         <p:grpSpPr>
           <a:xfrm>
-            <a:off x="558817" y="954617"/>
-            <a:ext cx="17314566" cy="13519033"/>
-            <a:chOff x="556079" y="-110066"/>
-            <a:chExt cx="17229742" cy="13452803"/>
+            <a:off x="147889" y="200667"/>
+            <a:ext cx="18174784" cy="14686265"/>
+            <a:chOff x="1" y="0"/>
+            <a:chExt cx="18174784" cy="14686265"/>
           </a:xfrm>
         </p:grpSpPr>
         <p:pic>
           <p:nvPicPr>
-            <p:cNvPr id="13" name="Picture 12" descr="A collage of graphs and diagrams&#10;&#10;Description automatically generated">
+            <p:cNvPr id="3" name="Picture 2">
               <a:extLst>
                 <a:ext uri="{FF2B5EF4-FFF2-40B4-BE49-F238E27FC236}">
-                  <a16:creationId xmlns:a16="http://schemas.microsoft.com/office/drawing/2014/main" id="{50412086-C2E0-9960-6418-24520EFE753F}"/>
+                  <a16:creationId xmlns:a16="http://schemas.microsoft.com/office/drawing/2014/main" id="{95381C81-1480-BD42-2F45-708F3C7DB13B}"/>
+                </a:ext>
+              </a:extLst>
+            </p:cNvPr>
+            <p:cNvPicPr>
+              <a:picLocks noChangeAspect="1"/>
+            </p:cNvPicPr>
+            <p:nvPr/>
+          </p:nvPicPr>
+          <p:blipFill rotWithShape="1">
+            <a:blip r:embed="rId2"/>
+            <a:srcRect b="33258"/>
+            <a:stretch/>
+          </p:blipFill>
+          <p:spPr>
+            <a:xfrm>
+              <a:off x="1" y="355686"/>
+              <a:ext cx="18174784" cy="9073422"/>
+            </a:xfrm>
+            <a:prstGeom prst="rect">
+              <a:avLst/>
+            </a:prstGeom>
+          </p:spPr>
+        </p:pic>
+        <p:pic>
+          <p:nvPicPr>
+            <p:cNvPr id="22" name="Picture 21">
+              <a:extLst>
+                <a:ext uri="{FF2B5EF4-FFF2-40B4-BE49-F238E27FC236}">
+                  <a16:creationId xmlns:a16="http://schemas.microsoft.com/office/drawing/2014/main" id="{860B0FC7-9579-8A13-6C92-20AA193D1264}"/>
                 </a:ext>
               </a:extLst>
             </p:cNvPr>
@@ -3006,259 +3035,30 @@
             <p:nvPr/>
           </p:nvPicPr>
           <p:blipFill>
-            <a:blip r:embed="rId2">
-              <a:extLst>
-                <a:ext uri="{28A0092B-C50C-407E-A947-70E740481C1C}">
-                  <a14:useLocalDpi xmlns:a14="http://schemas.microsoft.com/office/drawing/2010/main" val="0"/>
-                </a:ext>
-              </a:extLst>
-            </a:blip>
+            <a:blip r:embed="rId3"/>
             <a:stretch>
               <a:fillRect/>
             </a:stretch>
           </p:blipFill>
           <p:spPr>
             <a:xfrm>
-              <a:off x="594254" y="0"/>
-              <a:ext cx="17191567" cy="12893675"/>
+              <a:off x="11539694" y="6730915"/>
+              <a:ext cx="1442587" cy="1669510"/>
             </a:xfrm>
-            <a:prstGeom prst="rect">
-              <a:avLst/>
+            <a:prstGeom prst="corner">
+              <a:avLst>
+                <a:gd name="adj1" fmla="val 50000"/>
+                <a:gd name="adj2" fmla="val 61608"/>
+              </a:avLst>
             </a:prstGeom>
           </p:spPr>
         </p:pic>
-        <p:grpSp>
-          <p:nvGrpSpPr>
-            <p:cNvPr id="9" name="Group 8">
+        <p:pic>
+          <p:nvPicPr>
+            <p:cNvPr id="6" name="Picture 5">
               <a:extLst>
                 <a:ext uri="{FF2B5EF4-FFF2-40B4-BE49-F238E27FC236}">
-                  <a16:creationId xmlns:a16="http://schemas.microsoft.com/office/drawing/2014/main" id="{E12D2797-8A2A-3484-1E16-619EE1E70CA3}"/>
-                </a:ext>
-              </a:extLst>
-            </p:cNvPr>
-            <p:cNvGrpSpPr/>
-            <p:nvPr/>
-          </p:nvGrpSpPr>
-          <p:grpSpPr>
-            <a:xfrm>
-              <a:off x="1481580" y="453179"/>
-              <a:ext cx="11444043" cy="5026329"/>
-              <a:chOff x="10504845" y="289668"/>
-              <a:chExt cx="11444043" cy="5026329"/>
-            </a:xfrm>
-          </p:grpSpPr>
-          <p:pic>
-            <p:nvPicPr>
-              <p:cNvPr id="22" name="Picture 21">
-                <a:extLst>
-                  <a:ext uri="{FF2B5EF4-FFF2-40B4-BE49-F238E27FC236}">
-                    <a16:creationId xmlns:a16="http://schemas.microsoft.com/office/drawing/2014/main" id="{860B0FC7-9579-8A13-6C92-20AA193D1264}"/>
-                  </a:ext>
-                </a:extLst>
-              </p:cNvPr>
-              <p:cNvPicPr>
-                <a:picLocks noChangeAspect="1"/>
-              </p:cNvPicPr>
-              <p:nvPr/>
-            </p:nvPicPr>
-            <p:blipFill>
-              <a:blip r:embed="rId3"/>
-              <a:stretch>
-                <a:fillRect/>
-              </a:stretch>
-            </p:blipFill>
-            <p:spPr>
-              <a:xfrm>
-                <a:off x="20493789" y="4113112"/>
-                <a:ext cx="1039387" cy="1202885"/>
-              </a:xfrm>
-              <a:prstGeom prst="corner">
-                <a:avLst>
-                  <a:gd name="adj1" fmla="val 50000"/>
-                  <a:gd name="adj2" fmla="val 61608"/>
-                </a:avLst>
-              </a:prstGeom>
-            </p:spPr>
-          </p:pic>
-          <p:pic>
-            <p:nvPicPr>
-              <p:cNvPr id="30" name="Picture 29">
-                <a:extLst>
-                  <a:ext uri="{FF2B5EF4-FFF2-40B4-BE49-F238E27FC236}">
-                    <a16:creationId xmlns:a16="http://schemas.microsoft.com/office/drawing/2014/main" id="{2A204CC1-9247-9043-9421-6469DE0FDD4D}"/>
-                  </a:ext>
-                </a:extLst>
-              </p:cNvPr>
-              <p:cNvPicPr>
-                <a:picLocks noChangeAspect="1"/>
-              </p:cNvPicPr>
-              <p:nvPr/>
-            </p:nvPicPr>
-            <p:blipFill>
-              <a:blip r:embed="rId4"/>
-              <a:stretch>
-                <a:fillRect/>
-              </a:stretch>
-            </p:blipFill>
-            <p:spPr>
-              <a:xfrm>
-                <a:off x="20876033" y="289668"/>
-                <a:ext cx="1072855" cy="897137"/>
-              </a:xfrm>
-              <a:prstGeom prst="rect">
-                <a:avLst/>
-              </a:prstGeom>
-            </p:spPr>
-          </p:pic>
-          <p:pic>
-            <p:nvPicPr>
-              <p:cNvPr id="32" name="Picture 31">
-                <a:extLst>
-                  <a:ext uri="{FF2B5EF4-FFF2-40B4-BE49-F238E27FC236}">
-                    <a16:creationId xmlns:a16="http://schemas.microsoft.com/office/drawing/2014/main" id="{7C356589-1AA4-41A8-E1CC-DA7059BD4000}"/>
-                  </a:ext>
-                </a:extLst>
-              </p:cNvPr>
-              <p:cNvPicPr>
-                <a:picLocks noChangeAspect="1"/>
-              </p:cNvPicPr>
-              <p:nvPr/>
-            </p:nvPicPr>
-            <p:blipFill>
-              <a:blip r:embed="rId5"/>
-              <a:stretch>
-                <a:fillRect/>
-              </a:stretch>
-            </p:blipFill>
-            <p:spPr>
-              <a:xfrm>
-                <a:off x="10504845" y="1539152"/>
-                <a:ext cx="772670" cy="644243"/>
-              </a:xfrm>
-              <a:prstGeom prst="rect">
-                <a:avLst/>
-              </a:prstGeom>
-            </p:spPr>
-          </p:pic>
-          <p:pic>
-            <p:nvPicPr>
-              <p:cNvPr id="34" name="Picture 33">
-                <a:extLst>
-                  <a:ext uri="{FF2B5EF4-FFF2-40B4-BE49-F238E27FC236}">
-                    <a16:creationId xmlns:a16="http://schemas.microsoft.com/office/drawing/2014/main" id="{B99D52E5-88F3-258E-EF1A-5399BDE6841A}"/>
-                  </a:ext>
-                </a:extLst>
-              </p:cNvPr>
-              <p:cNvPicPr>
-                <a:picLocks noChangeAspect="1"/>
-              </p:cNvPicPr>
-              <p:nvPr/>
-            </p:nvPicPr>
-            <p:blipFill>
-              <a:blip r:embed="rId6"/>
-              <a:stretch>
-                <a:fillRect/>
-              </a:stretch>
-            </p:blipFill>
-            <p:spPr>
-              <a:xfrm>
-                <a:off x="14137698" y="289670"/>
-                <a:ext cx="1080486" cy="897137"/>
-              </a:xfrm>
-              <a:prstGeom prst="rect">
-                <a:avLst/>
-              </a:prstGeom>
-            </p:spPr>
-          </p:pic>
-          <p:pic>
-            <p:nvPicPr>
-              <p:cNvPr id="36" name="Picture 35">
-                <a:extLst>
-                  <a:ext uri="{FF2B5EF4-FFF2-40B4-BE49-F238E27FC236}">
-                    <a16:creationId xmlns:a16="http://schemas.microsoft.com/office/drawing/2014/main" id="{83B5222C-D90B-C5E4-E0D2-63BC160732F1}"/>
-                  </a:ext>
-                </a:extLst>
-              </p:cNvPr>
-              <p:cNvPicPr>
-                <a:picLocks noChangeAspect="1"/>
-              </p:cNvPicPr>
-              <p:nvPr/>
-            </p:nvPicPr>
-            <p:blipFill>
-              <a:blip r:embed="rId7"/>
-              <a:stretch>
-                <a:fillRect/>
-              </a:stretch>
-            </p:blipFill>
-            <p:spPr>
-              <a:xfrm>
-                <a:off x="17643571" y="289669"/>
-                <a:ext cx="1080486" cy="898934"/>
-              </a:xfrm>
-              <a:prstGeom prst="rect">
-                <a:avLst/>
-              </a:prstGeom>
-            </p:spPr>
-          </p:pic>
-        </p:grpSp>
-        <p:sp>
-          <p:nvSpPr>
-            <p:cNvPr id="15" name="Rectangle 14">
-              <a:extLst>
-                <a:ext uri="{FF2B5EF4-FFF2-40B4-BE49-F238E27FC236}">
-                  <a16:creationId xmlns:a16="http://schemas.microsoft.com/office/drawing/2014/main" id="{CA13574B-638C-08CA-CE54-795AA0BA94BC}"/>
-                </a:ext>
-              </a:extLst>
-            </p:cNvPr>
-            <p:cNvSpPr/>
-            <p:nvPr/>
-          </p:nvSpPr>
-          <p:spPr>
-            <a:xfrm>
-              <a:off x="816429" y="6446837"/>
-              <a:ext cx="8193519" cy="4744175"/>
-            </a:xfrm>
-            <a:prstGeom prst="rect">
-              <a:avLst/>
-            </a:prstGeom>
-            <a:solidFill>
-              <a:schemeClr val="bg1"/>
-            </a:solidFill>
-            <a:ln>
-              <a:noFill/>
-            </a:ln>
-          </p:spPr>
-          <p:style>
-            <a:lnRef idx="2">
-              <a:schemeClr val="accent1">
-                <a:shade val="15000"/>
-              </a:schemeClr>
-            </a:lnRef>
-            <a:fillRef idx="1">
-              <a:schemeClr val="accent1"/>
-            </a:fillRef>
-            <a:effectRef idx="0">
-              <a:schemeClr val="accent1"/>
-            </a:effectRef>
-            <a:fontRef idx="minor">
-              <a:schemeClr val="lt1"/>
-            </a:fontRef>
-          </p:style>
-          <p:txBody>
-            <a:bodyPr rtlCol="0" anchor="ctr"/>
-            <a:lstStyle/>
-            <a:p>
-              <a:pPr algn="ctr"/>
-              <a:endParaRPr lang="en-US" sz="1940"/>
-            </a:p>
-          </p:txBody>
-        </p:sp>
-        <p:pic>
-          <p:nvPicPr>
-            <p:cNvPr id="14" name="Picture 13" descr="A collage of graphs and diagrams&#10;&#10;Description automatically generated">
-              <a:extLst>
-                <a:ext uri="{FF2B5EF4-FFF2-40B4-BE49-F238E27FC236}">
-                  <a16:creationId xmlns:a16="http://schemas.microsoft.com/office/drawing/2014/main" id="{9A0C49E0-0F14-FC0C-95D7-730B5087F375}"/>
+                  <a16:creationId xmlns:a16="http://schemas.microsoft.com/office/drawing/2014/main" id="{DFF9BB04-EC72-BE7A-E344-BC4FA60DC190}"/>
                 </a:ext>
               </a:extLst>
             </p:cNvPr>
@@ -3268,20 +3068,14 @@
             <p:nvPr/>
           </p:nvPicPr>
           <p:blipFill rotWithShape="1">
-            <a:blip r:embed="rId2">
-              <a:extLst>
-                <a:ext uri="{28A0092B-C50C-407E-A947-70E740481C1C}">
-                  <a14:useLocalDpi xmlns:a14="http://schemas.microsoft.com/office/drawing/2010/main" val="0"/>
-                </a:ext>
-              </a:extLst>
-            </a:blip>
-            <a:srcRect t="50000" r="51048"/>
+            <a:blip r:embed="rId2"/>
+            <a:srcRect l="49910" t="66374"/>
             <a:stretch/>
           </p:blipFill>
           <p:spPr>
             <a:xfrm>
-              <a:off x="705341" y="6895899"/>
-              <a:ext cx="8415694" cy="6446838"/>
+              <a:off x="8789530" y="9784793"/>
+              <a:ext cx="9103723" cy="4571272"/>
             </a:xfrm>
             <a:prstGeom prst="rect">
               <a:avLst/>
@@ -3302,8 +3096,8 @@
           </p:nvSpPr>
           <p:spPr>
             <a:xfrm>
-              <a:off x="556079" y="-110066"/>
-              <a:ext cx="520700" cy="707886"/>
+              <a:off x="297185" y="0"/>
+              <a:ext cx="523263" cy="711371"/>
             </a:xfrm>
             <a:prstGeom prst="rect">
               <a:avLst/>
@@ -3338,8 +3132,8 @@
           </p:nvSpPr>
           <p:spPr>
             <a:xfrm>
-              <a:off x="9066396" y="6257994"/>
-              <a:ext cx="520700" cy="707886"/>
+              <a:off x="9247100" y="9429108"/>
+              <a:ext cx="523263" cy="711371"/>
             </a:xfrm>
             <a:prstGeom prst="rect">
               <a:avLst/>
@@ -3374,8 +3168,8 @@
           </p:nvSpPr>
           <p:spPr>
             <a:xfrm>
-              <a:off x="556079" y="6257994"/>
-              <a:ext cx="520700" cy="707886"/>
+              <a:off x="295778" y="9429108"/>
+              <a:ext cx="523263" cy="711371"/>
             </a:xfrm>
             <a:prstGeom prst="rect">
               <a:avLst/>
@@ -3396,6 +3190,35 @@
             </a:p>
           </p:txBody>
         </p:sp>
+        <p:pic>
+          <p:nvPicPr>
+            <p:cNvPr id="4" name="Picture 3">
+              <a:extLst>
+                <a:ext uri="{FF2B5EF4-FFF2-40B4-BE49-F238E27FC236}">
+                  <a16:creationId xmlns:a16="http://schemas.microsoft.com/office/drawing/2014/main" id="{705CEE61-6546-7039-F8F2-994F4A5C9BE3}"/>
+                </a:ext>
+              </a:extLst>
+            </p:cNvPr>
+            <p:cNvPicPr>
+              <a:picLocks noChangeAspect="1"/>
+            </p:cNvPicPr>
+            <p:nvPr/>
+          </p:nvPicPr>
+          <p:blipFill rotWithShape="1">
+            <a:blip r:embed="rId2"/>
+            <a:srcRect t="66374" r="49910"/>
+            <a:stretch/>
+          </p:blipFill>
+          <p:spPr>
+            <a:xfrm>
+              <a:off x="23639" y="10114993"/>
+              <a:ext cx="9103723" cy="4571272"/>
+            </a:xfrm>
+            <a:prstGeom prst="rect">
+              <a:avLst/>
+            </a:prstGeom>
+          </p:spPr>
+        </p:pic>
       </p:grpSp>
     </p:spTree>
     <p:extLst>

</xml_diff>

<commit_message>
cleaned up figure storage, fixed legend from orcas to killer whales
</commit_message>
<xml_diff>
--- a/manuscript/final_figures/Figure_Box1_cleanup.pptx
+++ b/manuscript/final_figures/Figure_Box1_cleanup.pptx
@@ -2,12 +2,12 @@
 <file path=ppt/presentation.xml><?xml version="1.0" encoding="utf-8"?>
 <p:presentation xmlns:a="http://schemas.openxmlformats.org/drawingml/2006/main" xmlns:r="http://schemas.openxmlformats.org/officeDocument/2006/relationships" xmlns:p="http://schemas.openxmlformats.org/presentationml/2006/main" saveSubsetFonts="1">
   <p:sldMasterIdLst>
-    <p:sldMasterId id="2147483672" r:id="rId1"/>
+    <p:sldMasterId id="2147483684" r:id="rId1"/>
   </p:sldMasterIdLst>
   <p:sldIdLst>
     <p:sldId id="256" r:id="rId2"/>
   </p:sldIdLst>
-  <p:sldSz cx="18470563" cy="15087600"/>
+  <p:sldSz cx="20208875" cy="15087600"/>
   <p:notesSz cx="6858000" cy="9144000"/>
   <p:defaultTextStyle>
     <a:defPPr>
@@ -141,15 +141,15 @@
         </p:nvSpPr>
         <p:spPr>
           <a:xfrm>
-            <a:off x="1385292" y="2469199"/>
-            <a:ext cx="15699979" cy="5252720"/>
+            <a:off x="1515666" y="2469199"/>
+            <a:ext cx="17177544" cy="5252720"/>
           </a:xfrm>
         </p:spPr>
         <p:txBody>
           <a:bodyPr anchor="b"/>
           <a:lstStyle>
             <a:lvl1pPr algn="ctr">
-              <a:defRPr sz="12120"/>
+              <a:defRPr sz="13200"/>
             </a:lvl1pPr>
           </a:lstStyle>
           <a:p>
@@ -173,8 +173,8 @@
         </p:nvSpPr>
         <p:spPr>
           <a:xfrm>
-            <a:off x="2308821" y="7924484"/>
-            <a:ext cx="13852922" cy="3642676"/>
+            <a:off x="2526110" y="7924484"/>
+            <a:ext cx="15156656" cy="3642676"/>
           </a:xfrm>
         </p:spPr>
         <p:txBody>
@@ -182,39 +182,39 @@
           <a:lstStyle>
             <a:lvl1pPr marL="0" indent="0" algn="ctr">
               <a:buNone/>
-              <a:defRPr sz="4848"/>
+              <a:defRPr sz="5280"/>
             </a:lvl1pPr>
-            <a:lvl2pPr marL="923544" indent="0" algn="ctr">
-              <a:buNone/>
-              <a:defRPr sz="4040"/>
+            <a:lvl2pPr marL="1005840" indent="0" algn="ctr">
+              <a:buNone/>
+              <a:defRPr sz="4400"/>
             </a:lvl2pPr>
-            <a:lvl3pPr marL="1847088" indent="0" algn="ctr">
-              <a:buNone/>
-              <a:defRPr sz="3636"/>
+            <a:lvl3pPr marL="2011680" indent="0" algn="ctr">
+              <a:buNone/>
+              <a:defRPr sz="3960"/>
             </a:lvl3pPr>
-            <a:lvl4pPr marL="2770632" indent="0" algn="ctr">
-              <a:buNone/>
-              <a:defRPr sz="3232"/>
+            <a:lvl4pPr marL="3017520" indent="0" algn="ctr">
+              <a:buNone/>
+              <a:defRPr sz="3520"/>
             </a:lvl4pPr>
-            <a:lvl5pPr marL="3694176" indent="0" algn="ctr">
-              <a:buNone/>
-              <a:defRPr sz="3232"/>
+            <a:lvl5pPr marL="4023360" indent="0" algn="ctr">
+              <a:buNone/>
+              <a:defRPr sz="3520"/>
             </a:lvl5pPr>
-            <a:lvl6pPr marL="4617720" indent="0" algn="ctr">
-              <a:buNone/>
-              <a:defRPr sz="3232"/>
+            <a:lvl6pPr marL="5029200" indent="0" algn="ctr">
+              <a:buNone/>
+              <a:defRPr sz="3520"/>
             </a:lvl6pPr>
-            <a:lvl7pPr marL="5541264" indent="0" algn="ctr">
-              <a:buNone/>
-              <a:defRPr sz="3232"/>
+            <a:lvl7pPr marL="6035040" indent="0" algn="ctr">
+              <a:buNone/>
+              <a:defRPr sz="3520"/>
             </a:lvl7pPr>
-            <a:lvl8pPr marL="6464808" indent="0" algn="ctr">
-              <a:buNone/>
-              <a:defRPr sz="3232"/>
+            <a:lvl8pPr marL="7040880" indent="0" algn="ctr">
+              <a:buNone/>
+              <a:defRPr sz="3520"/>
             </a:lvl8pPr>
-            <a:lvl9pPr marL="7388352" indent="0" algn="ctr">
-              <a:buNone/>
-              <a:defRPr sz="3232"/>
+            <a:lvl9pPr marL="8046720" indent="0" algn="ctr">
+              <a:buNone/>
+              <a:defRPr sz="3520"/>
             </a:lvl9pPr>
           </a:lstStyle>
           <a:p>
@@ -243,7 +243,7 @@
           <a:p>
             <a:fld id="{9989B3A2-2388-44BE-9854-4BCC09CB1095}" type="datetimeFigureOut">
               <a:rPr lang="en-US" smtClean="0"/>
-              <a:t>12/11/2023</a:t>
+              <a:t>12/17/2023</a:t>
             </a:fld>
             <a:endParaRPr lang="en-US"/>
           </a:p>
@@ -294,7 +294,7 @@
     </p:spTree>
     <p:extLst>
       <p:ext uri="{BB962C8B-B14F-4D97-AF65-F5344CB8AC3E}">
-        <p14:creationId xmlns:p14="http://schemas.microsoft.com/office/powerpoint/2010/main" val="1900701429"/>
+        <p14:creationId xmlns:p14="http://schemas.microsoft.com/office/powerpoint/2010/main" val="3185662121"/>
       </p:ext>
     </p:extLst>
   </p:cSld>
@@ -413,7 +413,7 @@
           <a:p>
             <a:fld id="{9989B3A2-2388-44BE-9854-4BCC09CB1095}" type="datetimeFigureOut">
               <a:rPr lang="en-US" smtClean="0"/>
-              <a:t>12/11/2023</a:t>
+              <a:t>12/17/2023</a:t>
             </a:fld>
             <a:endParaRPr lang="en-US"/>
           </a:p>
@@ -464,7 +464,7 @@
     </p:spTree>
     <p:extLst>
       <p:ext uri="{BB962C8B-B14F-4D97-AF65-F5344CB8AC3E}">
-        <p14:creationId xmlns:p14="http://schemas.microsoft.com/office/powerpoint/2010/main" val="1423541537"/>
+        <p14:creationId xmlns:p14="http://schemas.microsoft.com/office/powerpoint/2010/main" val="3156057746"/>
       </p:ext>
     </p:extLst>
   </p:cSld>
@@ -503,8 +503,8 @@
         </p:nvSpPr>
         <p:spPr>
           <a:xfrm>
-            <a:off x="13217998" y="803275"/>
-            <a:ext cx="3982715" cy="12786044"/>
+            <a:off x="14461977" y="803275"/>
+            <a:ext cx="4357539" cy="12786044"/>
           </a:xfrm>
         </p:spPr>
         <p:txBody>
@@ -531,8 +531,8 @@
         </p:nvSpPr>
         <p:spPr>
           <a:xfrm>
-            <a:off x="1269852" y="803275"/>
-            <a:ext cx="11717263" cy="12786044"/>
+            <a:off x="1389361" y="803275"/>
+            <a:ext cx="12820005" cy="12786044"/>
           </a:xfrm>
         </p:spPr>
         <p:txBody>
@@ -593,7 +593,7 @@
           <a:p>
             <a:fld id="{9989B3A2-2388-44BE-9854-4BCC09CB1095}" type="datetimeFigureOut">
               <a:rPr lang="en-US" smtClean="0"/>
-              <a:t>12/11/2023</a:t>
+              <a:t>12/17/2023</a:t>
             </a:fld>
             <a:endParaRPr lang="en-US"/>
           </a:p>
@@ -644,7 +644,7 @@
     </p:spTree>
     <p:extLst>
       <p:ext uri="{BB962C8B-B14F-4D97-AF65-F5344CB8AC3E}">
-        <p14:creationId xmlns:p14="http://schemas.microsoft.com/office/powerpoint/2010/main" val="569265482"/>
+        <p14:creationId xmlns:p14="http://schemas.microsoft.com/office/powerpoint/2010/main" val="3149386759"/>
       </p:ext>
     </p:extLst>
   </p:cSld>
@@ -763,7 +763,7 @@
           <a:p>
             <a:fld id="{9989B3A2-2388-44BE-9854-4BCC09CB1095}" type="datetimeFigureOut">
               <a:rPr lang="en-US" smtClean="0"/>
-              <a:t>12/11/2023</a:t>
+              <a:t>12/17/2023</a:t>
             </a:fld>
             <a:endParaRPr lang="en-US"/>
           </a:p>
@@ -814,7 +814,7 @@
     </p:spTree>
     <p:extLst>
       <p:ext uri="{BB962C8B-B14F-4D97-AF65-F5344CB8AC3E}">
-        <p14:creationId xmlns:p14="http://schemas.microsoft.com/office/powerpoint/2010/main" val="1927022969"/>
+        <p14:creationId xmlns:p14="http://schemas.microsoft.com/office/powerpoint/2010/main" val="1294869117"/>
       </p:ext>
     </p:extLst>
   </p:cSld>
@@ -853,15 +853,15 @@
         </p:nvSpPr>
         <p:spPr>
           <a:xfrm>
-            <a:off x="1260232" y="3761427"/>
-            <a:ext cx="15930861" cy="6276021"/>
+            <a:off x="1378836" y="3761427"/>
+            <a:ext cx="17430155" cy="6276021"/>
           </a:xfrm>
         </p:spPr>
         <p:txBody>
           <a:bodyPr anchor="b"/>
           <a:lstStyle>
             <a:lvl1pPr>
-              <a:defRPr sz="12120"/>
+              <a:defRPr sz="13200"/>
             </a:lvl1pPr>
           </a:lstStyle>
           <a:p>
@@ -885,8 +885,8 @@
         </p:nvSpPr>
         <p:spPr>
           <a:xfrm>
-            <a:off x="1260232" y="10096822"/>
-            <a:ext cx="15930861" cy="3300411"/>
+            <a:off x="1378836" y="10096822"/>
+            <a:ext cx="17430155" cy="3300411"/>
           </a:xfrm>
         </p:spPr>
         <p:txBody>
@@ -894,15 +894,15 @@
           <a:lstStyle>
             <a:lvl1pPr marL="0" indent="0">
               <a:buNone/>
-              <a:defRPr sz="4848">
+              <a:defRPr sz="5280">
                 <a:solidFill>
                   <a:schemeClr val="tx1"/>
                 </a:solidFill>
               </a:defRPr>
             </a:lvl1pPr>
-            <a:lvl2pPr marL="923544" indent="0">
-              <a:buNone/>
-              <a:defRPr sz="4040">
+            <a:lvl2pPr marL="1005840" indent="0">
+              <a:buNone/>
+              <a:defRPr sz="4400">
                 <a:solidFill>
                   <a:schemeClr val="tx1">
                     <a:tint val="75000"/>
@@ -910,9 +910,9 @@
                 </a:solidFill>
               </a:defRPr>
             </a:lvl2pPr>
-            <a:lvl3pPr marL="1847088" indent="0">
-              <a:buNone/>
-              <a:defRPr sz="3636">
+            <a:lvl3pPr marL="2011680" indent="0">
+              <a:buNone/>
+              <a:defRPr sz="3960">
                 <a:solidFill>
                   <a:schemeClr val="tx1">
                     <a:tint val="75000"/>
@@ -920,9 +920,9 @@
                 </a:solidFill>
               </a:defRPr>
             </a:lvl3pPr>
-            <a:lvl4pPr marL="2770632" indent="0">
-              <a:buNone/>
-              <a:defRPr sz="3232">
+            <a:lvl4pPr marL="3017520" indent="0">
+              <a:buNone/>
+              <a:defRPr sz="3520">
                 <a:solidFill>
                   <a:schemeClr val="tx1">
                     <a:tint val="75000"/>
@@ -930,9 +930,9 @@
                 </a:solidFill>
               </a:defRPr>
             </a:lvl4pPr>
-            <a:lvl5pPr marL="3694176" indent="0">
-              <a:buNone/>
-              <a:defRPr sz="3232">
+            <a:lvl5pPr marL="4023360" indent="0">
+              <a:buNone/>
+              <a:defRPr sz="3520">
                 <a:solidFill>
                   <a:schemeClr val="tx1">
                     <a:tint val="75000"/>
@@ -940,9 +940,9 @@
                 </a:solidFill>
               </a:defRPr>
             </a:lvl5pPr>
-            <a:lvl6pPr marL="4617720" indent="0">
-              <a:buNone/>
-              <a:defRPr sz="3232">
+            <a:lvl6pPr marL="5029200" indent="0">
+              <a:buNone/>
+              <a:defRPr sz="3520">
                 <a:solidFill>
                   <a:schemeClr val="tx1">
                     <a:tint val="75000"/>
@@ -950,9 +950,9 @@
                 </a:solidFill>
               </a:defRPr>
             </a:lvl6pPr>
-            <a:lvl7pPr marL="5541264" indent="0">
-              <a:buNone/>
-              <a:defRPr sz="3232">
+            <a:lvl7pPr marL="6035040" indent="0">
+              <a:buNone/>
+              <a:defRPr sz="3520">
                 <a:solidFill>
                   <a:schemeClr val="tx1">
                     <a:tint val="75000"/>
@@ -960,9 +960,9 @@
                 </a:solidFill>
               </a:defRPr>
             </a:lvl7pPr>
-            <a:lvl8pPr marL="6464808" indent="0">
-              <a:buNone/>
-              <a:defRPr sz="3232">
+            <a:lvl8pPr marL="7040880" indent="0">
+              <a:buNone/>
+              <a:defRPr sz="3520">
                 <a:solidFill>
                   <a:schemeClr val="tx1">
                     <a:tint val="75000"/>
@@ -970,9 +970,9 @@
                 </a:solidFill>
               </a:defRPr>
             </a:lvl8pPr>
-            <a:lvl9pPr marL="7388352" indent="0">
-              <a:buNone/>
-              <a:defRPr sz="3232">
+            <a:lvl9pPr marL="8046720" indent="0">
+              <a:buNone/>
+              <a:defRPr sz="3520">
                 <a:solidFill>
                   <a:schemeClr val="tx1">
                     <a:tint val="75000"/>
@@ -1007,7 +1007,7 @@
           <a:p>
             <a:fld id="{9989B3A2-2388-44BE-9854-4BCC09CB1095}" type="datetimeFigureOut">
               <a:rPr lang="en-US" smtClean="0"/>
-              <a:t>12/11/2023</a:t>
+              <a:t>12/17/2023</a:t>
             </a:fld>
             <a:endParaRPr lang="en-US"/>
           </a:p>
@@ -1058,7 +1058,7 @@
     </p:spTree>
     <p:extLst>
       <p:ext uri="{BB962C8B-B14F-4D97-AF65-F5344CB8AC3E}">
-        <p14:creationId xmlns:p14="http://schemas.microsoft.com/office/powerpoint/2010/main" val="4052721136"/>
+        <p14:creationId xmlns:p14="http://schemas.microsoft.com/office/powerpoint/2010/main" val="1934269958"/>
       </p:ext>
     </p:extLst>
   </p:cSld>
@@ -1120,8 +1120,8 @@
         </p:nvSpPr>
         <p:spPr>
           <a:xfrm>
-            <a:off x="1269851" y="4016375"/>
-            <a:ext cx="7849989" cy="9572944"/>
+            <a:off x="1389360" y="4016375"/>
+            <a:ext cx="8588772" cy="9572944"/>
           </a:xfrm>
         </p:spPr>
         <p:txBody>
@@ -1177,8 +1177,8 @@
         </p:nvSpPr>
         <p:spPr>
           <a:xfrm>
-            <a:off x="9350723" y="4016375"/>
-            <a:ext cx="7849989" cy="9572944"/>
+            <a:off x="10230743" y="4016375"/>
+            <a:ext cx="8588772" cy="9572944"/>
           </a:xfrm>
         </p:spPr>
         <p:txBody>
@@ -1239,7 +1239,7 @@
           <a:p>
             <a:fld id="{9989B3A2-2388-44BE-9854-4BCC09CB1095}" type="datetimeFigureOut">
               <a:rPr lang="en-US" smtClean="0"/>
-              <a:t>12/11/2023</a:t>
+              <a:t>12/17/2023</a:t>
             </a:fld>
             <a:endParaRPr lang="en-US"/>
           </a:p>
@@ -1290,7 +1290,7 @@
     </p:spTree>
     <p:extLst>
       <p:ext uri="{BB962C8B-B14F-4D97-AF65-F5344CB8AC3E}">
-        <p14:creationId xmlns:p14="http://schemas.microsoft.com/office/powerpoint/2010/main" val="2579461958"/>
+        <p14:creationId xmlns:p14="http://schemas.microsoft.com/office/powerpoint/2010/main" val="784238238"/>
       </p:ext>
     </p:extLst>
   </p:cSld>
@@ -1329,8 +1329,8 @@
         </p:nvSpPr>
         <p:spPr>
           <a:xfrm>
-            <a:off x="1272257" y="803278"/>
-            <a:ext cx="15930861" cy="2916239"/>
+            <a:off x="1391992" y="803278"/>
+            <a:ext cx="17430155" cy="2916239"/>
           </a:xfrm>
         </p:spPr>
         <p:txBody>
@@ -1357,8 +1357,8 @@
         </p:nvSpPr>
         <p:spPr>
           <a:xfrm>
-            <a:off x="1272259" y="3698559"/>
-            <a:ext cx="7813913" cy="1812606"/>
+            <a:off x="1391995" y="3698559"/>
+            <a:ext cx="8549300" cy="1812606"/>
           </a:xfrm>
         </p:spPr>
         <p:txBody>
@@ -1366,39 +1366,39 @@
           <a:lstStyle>
             <a:lvl1pPr marL="0" indent="0">
               <a:buNone/>
-              <a:defRPr sz="4848" b="1"/>
+              <a:defRPr sz="5280" b="1"/>
             </a:lvl1pPr>
-            <a:lvl2pPr marL="923544" indent="0">
-              <a:buNone/>
-              <a:defRPr sz="4040" b="1"/>
+            <a:lvl2pPr marL="1005840" indent="0">
+              <a:buNone/>
+              <a:defRPr sz="4400" b="1"/>
             </a:lvl2pPr>
-            <a:lvl3pPr marL="1847088" indent="0">
-              <a:buNone/>
-              <a:defRPr sz="3636" b="1"/>
+            <a:lvl3pPr marL="2011680" indent="0">
+              <a:buNone/>
+              <a:defRPr sz="3960" b="1"/>
             </a:lvl3pPr>
-            <a:lvl4pPr marL="2770632" indent="0">
-              <a:buNone/>
-              <a:defRPr sz="3232" b="1"/>
+            <a:lvl4pPr marL="3017520" indent="0">
+              <a:buNone/>
+              <a:defRPr sz="3520" b="1"/>
             </a:lvl4pPr>
-            <a:lvl5pPr marL="3694176" indent="0">
-              <a:buNone/>
-              <a:defRPr sz="3232" b="1"/>
+            <a:lvl5pPr marL="4023360" indent="0">
+              <a:buNone/>
+              <a:defRPr sz="3520" b="1"/>
             </a:lvl5pPr>
-            <a:lvl6pPr marL="4617720" indent="0">
-              <a:buNone/>
-              <a:defRPr sz="3232" b="1"/>
+            <a:lvl6pPr marL="5029200" indent="0">
+              <a:buNone/>
+              <a:defRPr sz="3520" b="1"/>
             </a:lvl6pPr>
-            <a:lvl7pPr marL="5541264" indent="0">
-              <a:buNone/>
-              <a:defRPr sz="3232" b="1"/>
+            <a:lvl7pPr marL="6035040" indent="0">
+              <a:buNone/>
+              <a:defRPr sz="3520" b="1"/>
             </a:lvl7pPr>
-            <a:lvl8pPr marL="6464808" indent="0">
-              <a:buNone/>
-              <a:defRPr sz="3232" b="1"/>
+            <a:lvl8pPr marL="7040880" indent="0">
+              <a:buNone/>
+              <a:defRPr sz="3520" b="1"/>
             </a:lvl8pPr>
-            <a:lvl9pPr marL="7388352" indent="0">
-              <a:buNone/>
-              <a:defRPr sz="3232" b="1"/>
+            <a:lvl9pPr marL="8046720" indent="0">
+              <a:buNone/>
+              <a:defRPr sz="3520" b="1"/>
             </a:lvl9pPr>
           </a:lstStyle>
           <a:p>
@@ -1422,8 +1422,8 @@
         </p:nvSpPr>
         <p:spPr>
           <a:xfrm>
-            <a:off x="1272259" y="5511165"/>
-            <a:ext cx="7813913" cy="8106094"/>
+            <a:off x="1391995" y="5511165"/>
+            <a:ext cx="8549300" cy="8106094"/>
           </a:xfrm>
         </p:spPr>
         <p:txBody>
@@ -1479,8 +1479,8 @@
         </p:nvSpPr>
         <p:spPr>
           <a:xfrm>
-            <a:off x="9350724" y="3698559"/>
-            <a:ext cx="7852395" cy="1812606"/>
+            <a:off x="10230744" y="3698559"/>
+            <a:ext cx="8591404" cy="1812606"/>
           </a:xfrm>
         </p:spPr>
         <p:txBody>
@@ -1488,39 +1488,39 @@
           <a:lstStyle>
             <a:lvl1pPr marL="0" indent="0">
               <a:buNone/>
-              <a:defRPr sz="4848" b="1"/>
+              <a:defRPr sz="5280" b="1"/>
             </a:lvl1pPr>
-            <a:lvl2pPr marL="923544" indent="0">
-              <a:buNone/>
-              <a:defRPr sz="4040" b="1"/>
+            <a:lvl2pPr marL="1005840" indent="0">
+              <a:buNone/>
+              <a:defRPr sz="4400" b="1"/>
             </a:lvl2pPr>
-            <a:lvl3pPr marL="1847088" indent="0">
-              <a:buNone/>
-              <a:defRPr sz="3636" b="1"/>
+            <a:lvl3pPr marL="2011680" indent="0">
+              <a:buNone/>
+              <a:defRPr sz="3960" b="1"/>
             </a:lvl3pPr>
-            <a:lvl4pPr marL="2770632" indent="0">
-              <a:buNone/>
-              <a:defRPr sz="3232" b="1"/>
+            <a:lvl4pPr marL="3017520" indent="0">
+              <a:buNone/>
+              <a:defRPr sz="3520" b="1"/>
             </a:lvl4pPr>
-            <a:lvl5pPr marL="3694176" indent="0">
-              <a:buNone/>
-              <a:defRPr sz="3232" b="1"/>
+            <a:lvl5pPr marL="4023360" indent="0">
+              <a:buNone/>
+              <a:defRPr sz="3520" b="1"/>
             </a:lvl5pPr>
-            <a:lvl6pPr marL="4617720" indent="0">
-              <a:buNone/>
-              <a:defRPr sz="3232" b="1"/>
+            <a:lvl6pPr marL="5029200" indent="0">
+              <a:buNone/>
+              <a:defRPr sz="3520" b="1"/>
             </a:lvl6pPr>
-            <a:lvl7pPr marL="5541264" indent="0">
-              <a:buNone/>
-              <a:defRPr sz="3232" b="1"/>
+            <a:lvl7pPr marL="6035040" indent="0">
+              <a:buNone/>
+              <a:defRPr sz="3520" b="1"/>
             </a:lvl7pPr>
-            <a:lvl8pPr marL="6464808" indent="0">
-              <a:buNone/>
-              <a:defRPr sz="3232" b="1"/>
+            <a:lvl8pPr marL="7040880" indent="0">
+              <a:buNone/>
+              <a:defRPr sz="3520" b="1"/>
             </a:lvl8pPr>
-            <a:lvl9pPr marL="7388352" indent="0">
-              <a:buNone/>
-              <a:defRPr sz="3232" b="1"/>
+            <a:lvl9pPr marL="8046720" indent="0">
+              <a:buNone/>
+              <a:defRPr sz="3520" b="1"/>
             </a:lvl9pPr>
           </a:lstStyle>
           <a:p>
@@ -1544,8 +1544,8 @@
         </p:nvSpPr>
         <p:spPr>
           <a:xfrm>
-            <a:off x="9350724" y="5511165"/>
-            <a:ext cx="7852395" cy="8106094"/>
+            <a:off x="10230744" y="5511165"/>
+            <a:ext cx="8591404" cy="8106094"/>
           </a:xfrm>
         </p:spPr>
         <p:txBody>
@@ -1606,7 +1606,7 @@
           <a:p>
             <a:fld id="{9989B3A2-2388-44BE-9854-4BCC09CB1095}" type="datetimeFigureOut">
               <a:rPr lang="en-US" smtClean="0"/>
-              <a:t>12/11/2023</a:t>
+              <a:t>12/17/2023</a:t>
             </a:fld>
             <a:endParaRPr lang="en-US"/>
           </a:p>
@@ -1657,7 +1657,7 @@
     </p:spTree>
     <p:extLst>
       <p:ext uri="{BB962C8B-B14F-4D97-AF65-F5344CB8AC3E}">
-        <p14:creationId xmlns:p14="http://schemas.microsoft.com/office/powerpoint/2010/main" val="521290829"/>
+        <p14:creationId xmlns:p14="http://schemas.microsoft.com/office/powerpoint/2010/main" val="2980056448"/>
       </p:ext>
     </p:extLst>
   </p:cSld>
@@ -1724,7 +1724,7 @@
           <a:p>
             <a:fld id="{9989B3A2-2388-44BE-9854-4BCC09CB1095}" type="datetimeFigureOut">
               <a:rPr lang="en-US" smtClean="0"/>
-              <a:t>12/11/2023</a:t>
+              <a:t>12/17/2023</a:t>
             </a:fld>
             <a:endParaRPr lang="en-US"/>
           </a:p>
@@ -1775,7 +1775,7 @@
     </p:spTree>
     <p:extLst>
       <p:ext uri="{BB962C8B-B14F-4D97-AF65-F5344CB8AC3E}">
-        <p14:creationId xmlns:p14="http://schemas.microsoft.com/office/powerpoint/2010/main" val="2873803401"/>
+        <p14:creationId xmlns:p14="http://schemas.microsoft.com/office/powerpoint/2010/main" val="4003538736"/>
       </p:ext>
     </p:extLst>
   </p:cSld>
@@ -1819,7 +1819,7 @@
           <a:p>
             <a:fld id="{9989B3A2-2388-44BE-9854-4BCC09CB1095}" type="datetimeFigureOut">
               <a:rPr lang="en-US" smtClean="0"/>
-              <a:t>12/11/2023</a:t>
+              <a:t>12/17/2023</a:t>
             </a:fld>
             <a:endParaRPr lang="en-US"/>
           </a:p>
@@ -1870,7 +1870,7 @@
     </p:spTree>
     <p:extLst>
       <p:ext uri="{BB962C8B-B14F-4D97-AF65-F5344CB8AC3E}">
-        <p14:creationId xmlns:p14="http://schemas.microsoft.com/office/powerpoint/2010/main" val="1560532299"/>
+        <p14:creationId xmlns:p14="http://schemas.microsoft.com/office/powerpoint/2010/main" val="1464905005"/>
       </p:ext>
     </p:extLst>
   </p:cSld>
@@ -1909,15 +1909,15 @@
         </p:nvSpPr>
         <p:spPr>
           <a:xfrm>
-            <a:off x="1272257" y="1005840"/>
-            <a:ext cx="5957237" cy="3520440"/>
+            <a:off x="1391992" y="1005840"/>
+            <a:ext cx="6517888" cy="3520440"/>
           </a:xfrm>
         </p:spPr>
         <p:txBody>
           <a:bodyPr anchor="b"/>
           <a:lstStyle>
             <a:lvl1pPr>
-              <a:defRPr sz="6464"/>
+              <a:defRPr sz="7040"/>
             </a:lvl1pPr>
           </a:lstStyle>
           <a:p>
@@ -1941,39 +1941,39 @@
         </p:nvSpPr>
         <p:spPr>
           <a:xfrm>
-            <a:off x="7852395" y="2172338"/>
-            <a:ext cx="9350723" cy="10721975"/>
+            <a:off x="8591404" y="2172338"/>
+            <a:ext cx="10230743" cy="10721975"/>
           </a:xfrm>
         </p:spPr>
         <p:txBody>
           <a:bodyPr/>
           <a:lstStyle>
             <a:lvl1pPr>
-              <a:defRPr sz="6464"/>
+              <a:defRPr sz="7040"/>
             </a:lvl1pPr>
             <a:lvl2pPr>
-              <a:defRPr sz="5656"/>
+              <a:defRPr sz="6160"/>
             </a:lvl2pPr>
             <a:lvl3pPr>
-              <a:defRPr sz="4848"/>
+              <a:defRPr sz="5280"/>
             </a:lvl3pPr>
             <a:lvl4pPr>
-              <a:defRPr sz="4040"/>
+              <a:defRPr sz="4400"/>
             </a:lvl4pPr>
             <a:lvl5pPr>
-              <a:defRPr sz="4040"/>
+              <a:defRPr sz="4400"/>
             </a:lvl5pPr>
             <a:lvl6pPr>
-              <a:defRPr sz="4040"/>
+              <a:defRPr sz="4400"/>
             </a:lvl6pPr>
             <a:lvl7pPr>
-              <a:defRPr sz="4040"/>
+              <a:defRPr sz="4400"/>
             </a:lvl7pPr>
             <a:lvl8pPr>
-              <a:defRPr sz="4040"/>
+              <a:defRPr sz="4400"/>
             </a:lvl8pPr>
             <a:lvl9pPr>
-              <a:defRPr sz="4040"/>
+              <a:defRPr sz="4400"/>
             </a:lvl9pPr>
           </a:lstStyle>
           <a:p>
@@ -2026,8 +2026,8 @@
         </p:nvSpPr>
         <p:spPr>
           <a:xfrm>
-            <a:off x="1272257" y="4526280"/>
-            <a:ext cx="5957237" cy="8385494"/>
+            <a:off x="1391992" y="4526280"/>
+            <a:ext cx="6517888" cy="8385494"/>
           </a:xfrm>
         </p:spPr>
         <p:txBody>
@@ -2035,39 +2035,39 @@
           <a:lstStyle>
             <a:lvl1pPr marL="0" indent="0">
               <a:buNone/>
-              <a:defRPr sz="3232"/>
+              <a:defRPr sz="3520"/>
             </a:lvl1pPr>
-            <a:lvl2pPr marL="923544" indent="0">
-              <a:buNone/>
-              <a:defRPr sz="2828"/>
+            <a:lvl2pPr marL="1005840" indent="0">
+              <a:buNone/>
+              <a:defRPr sz="3080"/>
             </a:lvl2pPr>
-            <a:lvl3pPr marL="1847088" indent="0">
-              <a:buNone/>
-              <a:defRPr sz="2424"/>
+            <a:lvl3pPr marL="2011680" indent="0">
+              <a:buNone/>
+              <a:defRPr sz="2640"/>
             </a:lvl3pPr>
-            <a:lvl4pPr marL="2770632" indent="0">
-              <a:buNone/>
-              <a:defRPr sz="2020"/>
+            <a:lvl4pPr marL="3017520" indent="0">
+              <a:buNone/>
+              <a:defRPr sz="2200"/>
             </a:lvl4pPr>
-            <a:lvl5pPr marL="3694176" indent="0">
-              <a:buNone/>
-              <a:defRPr sz="2020"/>
+            <a:lvl5pPr marL="4023360" indent="0">
+              <a:buNone/>
+              <a:defRPr sz="2200"/>
             </a:lvl5pPr>
-            <a:lvl6pPr marL="4617720" indent="0">
-              <a:buNone/>
-              <a:defRPr sz="2020"/>
+            <a:lvl6pPr marL="5029200" indent="0">
+              <a:buNone/>
+              <a:defRPr sz="2200"/>
             </a:lvl6pPr>
-            <a:lvl7pPr marL="5541264" indent="0">
-              <a:buNone/>
-              <a:defRPr sz="2020"/>
+            <a:lvl7pPr marL="6035040" indent="0">
+              <a:buNone/>
+              <a:defRPr sz="2200"/>
             </a:lvl7pPr>
-            <a:lvl8pPr marL="6464808" indent="0">
-              <a:buNone/>
-              <a:defRPr sz="2020"/>
+            <a:lvl8pPr marL="7040880" indent="0">
+              <a:buNone/>
+              <a:defRPr sz="2200"/>
             </a:lvl8pPr>
-            <a:lvl9pPr marL="7388352" indent="0">
-              <a:buNone/>
-              <a:defRPr sz="2020"/>
+            <a:lvl9pPr marL="8046720" indent="0">
+              <a:buNone/>
+              <a:defRPr sz="2200"/>
             </a:lvl9pPr>
           </a:lstStyle>
           <a:p>
@@ -2096,7 +2096,7 @@
           <a:p>
             <a:fld id="{9989B3A2-2388-44BE-9854-4BCC09CB1095}" type="datetimeFigureOut">
               <a:rPr lang="en-US" smtClean="0"/>
-              <a:t>12/11/2023</a:t>
+              <a:t>12/17/2023</a:t>
             </a:fld>
             <a:endParaRPr lang="en-US"/>
           </a:p>
@@ -2147,7 +2147,7 @@
     </p:spTree>
     <p:extLst>
       <p:ext uri="{BB962C8B-B14F-4D97-AF65-F5344CB8AC3E}">
-        <p14:creationId xmlns:p14="http://schemas.microsoft.com/office/powerpoint/2010/main" val="1541475944"/>
+        <p14:creationId xmlns:p14="http://schemas.microsoft.com/office/powerpoint/2010/main" val="938483629"/>
       </p:ext>
     </p:extLst>
   </p:cSld>
@@ -2186,15 +2186,15 @@
         </p:nvSpPr>
         <p:spPr>
           <a:xfrm>
-            <a:off x="1272257" y="1005840"/>
-            <a:ext cx="5957237" cy="3520440"/>
+            <a:off x="1391992" y="1005840"/>
+            <a:ext cx="6517888" cy="3520440"/>
           </a:xfrm>
         </p:spPr>
         <p:txBody>
           <a:bodyPr anchor="b"/>
           <a:lstStyle>
             <a:lvl1pPr>
-              <a:defRPr sz="6464"/>
+              <a:defRPr sz="7040"/>
             </a:lvl1pPr>
           </a:lstStyle>
           <a:p>
@@ -2218,8 +2218,8 @@
         </p:nvSpPr>
         <p:spPr>
           <a:xfrm>
-            <a:off x="7852395" y="2172338"/>
-            <a:ext cx="9350723" cy="10721975"/>
+            <a:off x="8591404" y="2172338"/>
+            <a:ext cx="10230743" cy="10721975"/>
           </a:xfrm>
         </p:spPr>
         <p:txBody>
@@ -2227,39 +2227,39 @@
           <a:lstStyle>
             <a:lvl1pPr marL="0" indent="0">
               <a:buNone/>
-              <a:defRPr sz="6464"/>
+              <a:defRPr sz="7040"/>
             </a:lvl1pPr>
-            <a:lvl2pPr marL="923544" indent="0">
-              <a:buNone/>
-              <a:defRPr sz="5656"/>
+            <a:lvl2pPr marL="1005840" indent="0">
+              <a:buNone/>
+              <a:defRPr sz="6160"/>
             </a:lvl2pPr>
-            <a:lvl3pPr marL="1847088" indent="0">
-              <a:buNone/>
-              <a:defRPr sz="4848"/>
+            <a:lvl3pPr marL="2011680" indent="0">
+              <a:buNone/>
+              <a:defRPr sz="5280"/>
             </a:lvl3pPr>
-            <a:lvl4pPr marL="2770632" indent="0">
-              <a:buNone/>
-              <a:defRPr sz="4040"/>
+            <a:lvl4pPr marL="3017520" indent="0">
+              <a:buNone/>
+              <a:defRPr sz="4400"/>
             </a:lvl4pPr>
-            <a:lvl5pPr marL="3694176" indent="0">
-              <a:buNone/>
-              <a:defRPr sz="4040"/>
+            <a:lvl5pPr marL="4023360" indent="0">
+              <a:buNone/>
+              <a:defRPr sz="4400"/>
             </a:lvl5pPr>
-            <a:lvl6pPr marL="4617720" indent="0">
-              <a:buNone/>
-              <a:defRPr sz="4040"/>
+            <a:lvl6pPr marL="5029200" indent="0">
+              <a:buNone/>
+              <a:defRPr sz="4400"/>
             </a:lvl6pPr>
-            <a:lvl7pPr marL="5541264" indent="0">
-              <a:buNone/>
-              <a:defRPr sz="4040"/>
+            <a:lvl7pPr marL="6035040" indent="0">
+              <a:buNone/>
+              <a:defRPr sz="4400"/>
             </a:lvl7pPr>
-            <a:lvl8pPr marL="6464808" indent="0">
-              <a:buNone/>
-              <a:defRPr sz="4040"/>
+            <a:lvl8pPr marL="7040880" indent="0">
+              <a:buNone/>
+              <a:defRPr sz="4400"/>
             </a:lvl8pPr>
-            <a:lvl9pPr marL="7388352" indent="0">
-              <a:buNone/>
-              <a:defRPr sz="4040"/>
+            <a:lvl9pPr marL="8046720" indent="0">
+              <a:buNone/>
+              <a:defRPr sz="4400"/>
             </a:lvl9pPr>
           </a:lstStyle>
           <a:p>
@@ -2283,8 +2283,8 @@
         </p:nvSpPr>
         <p:spPr>
           <a:xfrm>
-            <a:off x="1272257" y="4526280"/>
-            <a:ext cx="5957237" cy="8385494"/>
+            <a:off x="1391992" y="4526280"/>
+            <a:ext cx="6517888" cy="8385494"/>
           </a:xfrm>
         </p:spPr>
         <p:txBody>
@@ -2292,39 +2292,39 @@
           <a:lstStyle>
             <a:lvl1pPr marL="0" indent="0">
               <a:buNone/>
-              <a:defRPr sz="3232"/>
+              <a:defRPr sz="3520"/>
             </a:lvl1pPr>
-            <a:lvl2pPr marL="923544" indent="0">
-              <a:buNone/>
-              <a:defRPr sz="2828"/>
+            <a:lvl2pPr marL="1005840" indent="0">
+              <a:buNone/>
+              <a:defRPr sz="3080"/>
             </a:lvl2pPr>
-            <a:lvl3pPr marL="1847088" indent="0">
-              <a:buNone/>
-              <a:defRPr sz="2424"/>
+            <a:lvl3pPr marL="2011680" indent="0">
+              <a:buNone/>
+              <a:defRPr sz="2640"/>
             </a:lvl3pPr>
-            <a:lvl4pPr marL="2770632" indent="0">
-              <a:buNone/>
-              <a:defRPr sz="2020"/>
+            <a:lvl4pPr marL="3017520" indent="0">
+              <a:buNone/>
+              <a:defRPr sz="2200"/>
             </a:lvl4pPr>
-            <a:lvl5pPr marL="3694176" indent="0">
-              <a:buNone/>
-              <a:defRPr sz="2020"/>
+            <a:lvl5pPr marL="4023360" indent="0">
+              <a:buNone/>
+              <a:defRPr sz="2200"/>
             </a:lvl5pPr>
-            <a:lvl6pPr marL="4617720" indent="0">
-              <a:buNone/>
-              <a:defRPr sz="2020"/>
+            <a:lvl6pPr marL="5029200" indent="0">
+              <a:buNone/>
+              <a:defRPr sz="2200"/>
             </a:lvl6pPr>
-            <a:lvl7pPr marL="5541264" indent="0">
-              <a:buNone/>
-              <a:defRPr sz="2020"/>
+            <a:lvl7pPr marL="6035040" indent="0">
+              <a:buNone/>
+              <a:defRPr sz="2200"/>
             </a:lvl7pPr>
-            <a:lvl8pPr marL="6464808" indent="0">
-              <a:buNone/>
-              <a:defRPr sz="2020"/>
+            <a:lvl8pPr marL="7040880" indent="0">
+              <a:buNone/>
+              <a:defRPr sz="2200"/>
             </a:lvl8pPr>
-            <a:lvl9pPr marL="7388352" indent="0">
-              <a:buNone/>
-              <a:defRPr sz="2020"/>
+            <a:lvl9pPr marL="8046720" indent="0">
+              <a:buNone/>
+              <a:defRPr sz="2200"/>
             </a:lvl9pPr>
           </a:lstStyle>
           <a:p>
@@ -2353,7 +2353,7 @@
           <a:p>
             <a:fld id="{9989B3A2-2388-44BE-9854-4BCC09CB1095}" type="datetimeFigureOut">
               <a:rPr lang="en-US" smtClean="0"/>
-              <a:t>12/11/2023</a:t>
+              <a:t>12/17/2023</a:t>
             </a:fld>
             <a:endParaRPr lang="en-US"/>
           </a:p>
@@ -2404,7 +2404,7 @@
     </p:spTree>
     <p:extLst>
       <p:ext uri="{BB962C8B-B14F-4D97-AF65-F5344CB8AC3E}">
-        <p14:creationId xmlns:p14="http://schemas.microsoft.com/office/powerpoint/2010/main" val="162472343"/>
+        <p14:creationId xmlns:p14="http://schemas.microsoft.com/office/powerpoint/2010/main" val="949309237"/>
       </p:ext>
     </p:extLst>
   </p:cSld>
@@ -2448,8 +2448,8 @@
         </p:nvSpPr>
         <p:spPr>
           <a:xfrm>
-            <a:off x="1269851" y="803278"/>
-            <a:ext cx="15930861" cy="2916239"/>
+            <a:off x="1389360" y="803278"/>
+            <a:ext cx="17430155" cy="2916239"/>
           </a:xfrm>
           <a:prstGeom prst="rect">
             <a:avLst/>
@@ -2481,8 +2481,8 @@
         </p:nvSpPr>
         <p:spPr>
           <a:xfrm>
-            <a:off x="1269851" y="4016375"/>
-            <a:ext cx="15930861" cy="9572944"/>
+            <a:off x="1389360" y="4016375"/>
+            <a:ext cx="17430155" cy="9572944"/>
           </a:xfrm>
           <a:prstGeom prst="rect">
             <a:avLst/>
@@ -2543,8 +2543,8 @@
         </p:nvSpPr>
         <p:spPr>
           <a:xfrm>
-            <a:off x="1269851" y="13983973"/>
-            <a:ext cx="4155877" cy="803275"/>
+            <a:off x="1389360" y="13983973"/>
+            <a:ext cx="4546997" cy="803275"/>
           </a:xfrm>
           <a:prstGeom prst="rect">
             <a:avLst/>
@@ -2554,7 +2554,7 @@
           <a:bodyPr vert="horz" lIns="91440" tIns="45720" rIns="91440" bIns="45720" rtlCol="0" anchor="ctr"/>
           <a:lstStyle>
             <a:lvl1pPr algn="l">
-              <a:defRPr sz="2424">
+              <a:defRPr sz="2640">
                 <a:solidFill>
                   <a:schemeClr val="tx1">
                     <a:tint val="75000"/>
@@ -2566,7 +2566,7 @@
           <a:p>
             <a:fld id="{9989B3A2-2388-44BE-9854-4BCC09CB1095}" type="datetimeFigureOut">
               <a:rPr lang="en-US" smtClean="0"/>
-              <a:t>12/11/2023</a:t>
+              <a:t>12/17/2023</a:t>
             </a:fld>
             <a:endParaRPr lang="en-US"/>
           </a:p>
@@ -2584,8 +2584,8 @@
         </p:nvSpPr>
         <p:spPr>
           <a:xfrm>
-            <a:off x="6118374" y="13983973"/>
-            <a:ext cx="6233815" cy="803275"/>
+            <a:off x="6694190" y="13983973"/>
+            <a:ext cx="6820495" cy="803275"/>
           </a:xfrm>
           <a:prstGeom prst="rect">
             <a:avLst/>
@@ -2595,7 +2595,7 @@
           <a:bodyPr vert="horz" lIns="91440" tIns="45720" rIns="91440" bIns="45720" rtlCol="0" anchor="ctr"/>
           <a:lstStyle>
             <a:lvl1pPr algn="ctr">
-              <a:defRPr sz="2424">
+              <a:defRPr sz="2640">
                 <a:solidFill>
                   <a:schemeClr val="tx1">
                     <a:tint val="75000"/>
@@ -2621,8 +2621,8 @@
         </p:nvSpPr>
         <p:spPr>
           <a:xfrm>
-            <a:off x="13044835" y="13983973"/>
-            <a:ext cx="4155877" cy="803275"/>
+            <a:off x="14272518" y="13983973"/>
+            <a:ext cx="4546997" cy="803275"/>
           </a:xfrm>
           <a:prstGeom prst="rect">
             <a:avLst/>
@@ -2632,7 +2632,7 @@
           <a:bodyPr vert="horz" lIns="91440" tIns="45720" rIns="91440" bIns="45720" rtlCol="0" anchor="ctr"/>
           <a:lstStyle>
             <a:lvl1pPr algn="r">
-              <a:defRPr sz="2424">
+              <a:defRPr sz="2640">
                 <a:solidFill>
                   <a:schemeClr val="tx1">
                     <a:tint val="75000"/>
@@ -2653,27 +2653,27 @@
     </p:spTree>
     <p:extLst>
       <p:ext uri="{BB962C8B-B14F-4D97-AF65-F5344CB8AC3E}">
-        <p14:creationId xmlns:p14="http://schemas.microsoft.com/office/powerpoint/2010/main" val="1246474400"/>
+        <p14:creationId xmlns:p14="http://schemas.microsoft.com/office/powerpoint/2010/main" val="640368632"/>
       </p:ext>
     </p:extLst>
   </p:cSld>
   <p:clrMap bg1="lt1" tx1="dk1" bg2="lt2" tx2="dk2" accent1="accent1" accent2="accent2" accent3="accent3" accent4="accent4" accent5="accent5" accent6="accent6" hlink="hlink" folHlink="folHlink"/>
   <p:sldLayoutIdLst>
-    <p:sldLayoutId id="2147483673" r:id="rId1"/>
-    <p:sldLayoutId id="2147483674" r:id="rId2"/>
-    <p:sldLayoutId id="2147483675" r:id="rId3"/>
-    <p:sldLayoutId id="2147483676" r:id="rId4"/>
-    <p:sldLayoutId id="2147483677" r:id="rId5"/>
-    <p:sldLayoutId id="2147483678" r:id="rId6"/>
-    <p:sldLayoutId id="2147483679" r:id="rId7"/>
-    <p:sldLayoutId id="2147483680" r:id="rId8"/>
-    <p:sldLayoutId id="2147483681" r:id="rId9"/>
-    <p:sldLayoutId id="2147483682" r:id="rId10"/>
-    <p:sldLayoutId id="2147483683" r:id="rId11"/>
+    <p:sldLayoutId id="2147483685" r:id="rId1"/>
+    <p:sldLayoutId id="2147483686" r:id="rId2"/>
+    <p:sldLayoutId id="2147483687" r:id="rId3"/>
+    <p:sldLayoutId id="2147483688" r:id="rId4"/>
+    <p:sldLayoutId id="2147483689" r:id="rId5"/>
+    <p:sldLayoutId id="2147483690" r:id="rId6"/>
+    <p:sldLayoutId id="2147483691" r:id="rId7"/>
+    <p:sldLayoutId id="2147483692" r:id="rId8"/>
+    <p:sldLayoutId id="2147483693" r:id="rId9"/>
+    <p:sldLayoutId id="2147483694" r:id="rId10"/>
+    <p:sldLayoutId id="2147483695" r:id="rId11"/>
   </p:sldLayoutIdLst>
   <p:txStyles>
     <p:titleStyle>
-      <a:lvl1pPr algn="l" defTabSz="1847088" rtl="0" eaLnBrk="1" latinLnBrk="0" hangingPunct="1">
+      <a:lvl1pPr algn="l" defTabSz="2011680" rtl="0" eaLnBrk="1" latinLnBrk="0" hangingPunct="1">
         <a:lnSpc>
           <a:spcPct val="90000"/>
         </a:lnSpc>
@@ -2681,7 +2681,7 @@
           <a:spcPct val="0"/>
         </a:spcBef>
         <a:buNone/>
-        <a:defRPr sz="8888" kern="1200">
+        <a:defRPr sz="9680" kern="1200">
           <a:solidFill>
             <a:schemeClr val="tx1"/>
           </a:solidFill>
@@ -2692,16 +2692,16 @@
       </a:lvl1pPr>
     </p:titleStyle>
     <p:bodyStyle>
-      <a:lvl1pPr marL="461772" indent="-461772" algn="l" defTabSz="1847088" rtl="0" eaLnBrk="1" latinLnBrk="0" hangingPunct="1">
+      <a:lvl1pPr marL="502920" indent="-502920" algn="l" defTabSz="2011680" rtl="0" eaLnBrk="1" latinLnBrk="0" hangingPunct="1">
         <a:lnSpc>
           <a:spcPct val="90000"/>
         </a:lnSpc>
         <a:spcBef>
-          <a:spcPts val="2020"/>
+          <a:spcPts val="2200"/>
         </a:spcBef>
         <a:buFont typeface="Arial" panose="020B0604020202020204" pitchFamily="34" charset="0"/>
         <a:buChar char="•"/>
-        <a:defRPr sz="5656" kern="1200">
+        <a:defRPr sz="6160" kern="1200">
           <a:solidFill>
             <a:schemeClr val="tx1"/>
           </a:solidFill>
@@ -2710,16 +2710,16 @@
           <a:cs typeface="+mn-cs"/>
         </a:defRPr>
       </a:lvl1pPr>
-      <a:lvl2pPr marL="1385316" indent="-461772" algn="l" defTabSz="1847088" rtl="0" eaLnBrk="1" latinLnBrk="0" hangingPunct="1">
+      <a:lvl2pPr marL="1508760" indent="-502920" algn="l" defTabSz="2011680" rtl="0" eaLnBrk="1" latinLnBrk="0" hangingPunct="1">
         <a:lnSpc>
           <a:spcPct val="90000"/>
         </a:lnSpc>
         <a:spcBef>
-          <a:spcPts val="1010"/>
+          <a:spcPts val="1100"/>
         </a:spcBef>
         <a:buFont typeface="Arial" panose="020B0604020202020204" pitchFamily="34" charset="0"/>
         <a:buChar char="•"/>
-        <a:defRPr sz="4848" kern="1200">
+        <a:defRPr sz="5280" kern="1200">
           <a:solidFill>
             <a:schemeClr val="tx1"/>
           </a:solidFill>
@@ -2728,16 +2728,16 @@
           <a:cs typeface="+mn-cs"/>
         </a:defRPr>
       </a:lvl2pPr>
-      <a:lvl3pPr marL="2308860" indent="-461772" algn="l" defTabSz="1847088" rtl="0" eaLnBrk="1" latinLnBrk="0" hangingPunct="1">
+      <a:lvl3pPr marL="2514600" indent="-502920" algn="l" defTabSz="2011680" rtl="0" eaLnBrk="1" latinLnBrk="0" hangingPunct="1">
         <a:lnSpc>
           <a:spcPct val="90000"/>
         </a:lnSpc>
         <a:spcBef>
-          <a:spcPts val="1010"/>
+          <a:spcPts val="1100"/>
         </a:spcBef>
         <a:buFont typeface="Arial" panose="020B0604020202020204" pitchFamily="34" charset="0"/>
         <a:buChar char="•"/>
-        <a:defRPr sz="4040" kern="1200">
+        <a:defRPr sz="4400" kern="1200">
           <a:solidFill>
             <a:schemeClr val="tx1"/>
           </a:solidFill>
@@ -2746,16 +2746,16 @@
           <a:cs typeface="+mn-cs"/>
         </a:defRPr>
       </a:lvl3pPr>
-      <a:lvl4pPr marL="3232404" indent="-461772" algn="l" defTabSz="1847088" rtl="0" eaLnBrk="1" latinLnBrk="0" hangingPunct="1">
+      <a:lvl4pPr marL="3520440" indent="-502920" algn="l" defTabSz="2011680" rtl="0" eaLnBrk="1" latinLnBrk="0" hangingPunct="1">
         <a:lnSpc>
           <a:spcPct val="90000"/>
         </a:lnSpc>
         <a:spcBef>
-          <a:spcPts val="1010"/>
+          <a:spcPts val="1100"/>
         </a:spcBef>
         <a:buFont typeface="Arial" panose="020B0604020202020204" pitchFamily="34" charset="0"/>
         <a:buChar char="•"/>
-        <a:defRPr sz="3636" kern="1200">
+        <a:defRPr sz="3960" kern="1200">
           <a:solidFill>
             <a:schemeClr val="tx1"/>
           </a:solidFill>
@@ -2764,16 +2764,16 @@
           <a:cs typeface="+mn-cs"/>
         </a:defRPr>
       </a:lvl4pPr>
-      <a:lvl5pPr marL="4155948" indent="-461772" algn="l" defTabSz="1847088" rtl="0" eaLnBrk="1" latinLnBrk="0" hangingPunct="1">
+      <a:lvl5pPr marL="4526280" indent="-502920" algn="l" defTabSz="2011680" rtl="0" eaLnBrk="1" latinLnBrk="0" hangingPunct="1">
         <a:lnSpc>
           <a:spcPct val="90000"/>
         </a:lnSpc>
         <a:spcBef>
-          <a:spcPts val="1010"/>
+          <a:spcPts val="1100"/>
         </a:spcBef>
         <a:buFont typeface="Arial" panose="020B0604020202020204" pitchFamily="34" charset="0"/>
         <a:buChar char="•"/>
-        <a:defRPr sz="3636" kern="1200">
+        <a:defRPr sz="3960" kern="1200">
           <a:solidFill>
             <a:schemeClr val="tx1"/>
           </a:solidFill>
@@ -2782,16 +2782,16 @@
           <a:cs typeface="+mn-cs"/>
         </a:defRPr>
       </a:lvl5pPr>
-      <a:lvl6pPr marL="5079492" indent="-461772" algn="l" defTabSz="1847088" rtl="0" eaLnBrk="1" latinLnBrk="0" hangingPunct="1">
+      <a:lvl6pPr marL="5532120" indent="-502920" algn="l" defTabSz="2011680" rtl="0" eaLnBrk="1" latinLnBrk="0" hangingPunct="1">
         <a:lnSpc>
           <a:spcPct val="90000"/>
         </a:lnSpc>
         <a:spcBef>
-          <a:spcPts val="1010"/>
+          <a:spcPts val="1100"/>
         </a:spcBef>
         <a:buFont typeface="Arial" panose="020B0604020202020204" pitchFamily="34" charset="0"/>
         <a:buChar char="•"/>
-        <a:defRPr sz="3636" kern="1200">
+        <a:defRPr sz="3960" kern="1200">
           <a:solidFill>
             <a:schemeClr val="tx1"/>
           </a:solidFill>
@@ -2800,16 +2800,16 @@
           <a:cs typeface="+mn-cs"/>
         </a:defRPr>
       </a:lvl6pPr>
-      <a:lvl7pPr marL="6003036" indent="-461772" algn="l" defTabSz="1847088" rtl="0" eaLnBrk="1" latinLnBrk="0" hangingPunct="1">
+      <a:lvl7pPr marL="6537960" indent="-502920" algn="l" defTabSz="2011680" rtl="0" eaLnBrk="1" latinLnBrk="0" hangingPunct="1">
         <a:lnSpc>
           <a:spcPct val="90000"/>
         </a:lnSpc>
         <a:spcBef>
-          <a:spcPts val="1010"/>
+          <a:spcPts val="1100"/>
         </a:spcBef>
         <a:buFont typeface="Arial" panose="020B0604020202020204" pitchFamily="34" charset="0"/>
         <a:buChar char="•"/>
-        <a:defRPr sz="3636" kern="1200">
+        <a:defRPr sz="3960" kern="1200">
           <a:solidFill>
             <a:schemeClr val="tx1"/>
           </a:solidFill>
@@ -2818,16 +2818,16 @@
           <a:cs typeface="+mn-cs"/>
         </a:defRPr>
       </a:lvl7pPr>
-      <a:lvl8pPr marL="6926580" indent="-461772" algn="l" defTabSz="1847088" rtl="0" eaLnBrk="1" latinLnBrk="0" hangingPunct="1">
+      <a:lvl8pPr marL="7543800" indent="-502920" algn="l" defTabSz="2011680" rtl="0" eaLnBrk="1" latinLnBrk="0" hangingPunct="1">
         <a:lnSpc>
           <a:spcPct val="90000"/>
         </a:lnSpc>
         <a:spcBef>
-          <a:spcPts val="1010"/>
+          <a:spcPts val="1100"/>
         </a:spcBef>
         <a:buFont typeface="Arial" panose="020B0604020202020204" pitchFamily="34" charset="0"/>
         <a:buChar char="•"/>
-        <a:defRPr sz="3636" kern="1200">
+        <a:defRPr sz="3960" kern="1200">
           <a:solidFill>
             <a:schemeClr val="tx1"/>
           </a:solidFill>
@@ -2836,16 +2836,16 @@
           <a:cs typeface="+mn-cs"/>
         </a:defRPr>
       </a:lvl8pPr>
-      <a:lvl9pPr marL="7850124" indent="-461772" algn="l" defTabSz="1847088" rtl="0" eaLnBrk="1" latinLnBrk="0" hangingPunct="1">
+      <a:lvl9pPr marL="8549640" indent="-502920" algn="l" defTabSz="2011680" rtl="0" eaLnBrk="1" latinLnBrk="0" hangingPunct="1">
         <a:lnSpc>
           <a:spcPct val="90000"/>
         </a:lnSpc>
         <a:spcBef>
-          <a:spcPts val="1010"/>
+          <a:spcPts val="1100"/>
         </a:spcBef>
         <a:buFont typeface="Arial" panose="020B0604020202020204" pitchFamily="34" charset="0"/>
         <a:buChar char="•"/>
-        <a:defRPr sz="3636" kern="1200">
+        <a:defRPr sz="3960" kern="1200">
           <a:solidFill>
             <a:schemeClr val="tx1"/>
           </a:solidFill>
@@ -2859,8 +2859,8 @@
       <a:defPPr>
         <a:defRPr lang="en-US"/>
       </a:defPPr>
-      <a:lvl1pPr marL="0" algn="l" defTabSz="1847088" rtl="0" eaLnBrk="1" latinLnBrk="0" hangingPunct="1">
-        <a:defRPr sz="3636" kern="1200">
+      <a:lvl1pPr marL="0" algn="l" defTabSz="2011680" rtl="0" eaLnBrk="1" latinLnBrk="0" hangingPunct="1">
+        <a:defRPr sz="3960" kern="1200">
           <a:solidFill>
             <a:schemeClr val="tx1"/>
           </a:solidFill>
@@ -2869,8 +2869,8 @@
           <a:cs typeface="+mn-cs"/>
         </a:defRPr>
       </a:lvl1pPr>
-      <a:lvl2pPr marL="923544" algn="l" defTabSz="1847088" rtl="0" eaLnBrk="1" latinLnBrk="0" hangingPunct="1">
-        <a:defRPr sz="3636" kern="1200">
+      <a:lvl2pPr marL="1005840" algn="l" defTabSz="2011680" rtl="0" eaLnBrk="1" latinLnBrk="0" hangingPunct="1">
+        <a:defRPr sz="3960" kern="1200">
           <a:solidFill>
             <a:schemeClr val="tx1"/>
           </a:solidFill>
@@ -2879,8 +2879,8 @@
           <a:cs typeface="+mn-cs"/>
         </a:defRPr>
       </a:lvl2pPr>
-      <a:lvl3pPr marL="1847088" algn="l" defTabSz="1847088" rtl="0" eaLnBrk="1" latinLnBrk="0" hangingPunct="1">
-        <a:defRPr sz="3636" kern="1200">
+      <a:lvl3pPr marL="2011680" algn="l" defTabSz="2011680" rtl="0" eaLnBrk="1" latinLnBrk="0" hangingPunct="1">
+        <a:defRPr sz="3960" kern="1200">
           <a:solidFill>
             <a:schemeClr val="tx1"/>
           </a:solidFill>
@@ -2889,8 +2889,8 @@
           <a:cs typeface="+mn-cs"/>
         </a:defRPr>
       </a:lvl3pPr>
-      <a:lvl4pPr marL="2770632" algn="l" defTabSz="1847088" rtl="0" eaLnBrk="1" latinLnBrk="0" hangingPunct="1">
-        <a:defRPr sz="3636" kern="1200">
+      <a:lvl4pPr marL="3017520" algn="l" defTabSz="2011680" rtl="0" eaLnBrk="1" latinLnBrk="0" hangingPunct="1">
+        <a:defRPr sz="3960" kern="1200">
           <a:solidFill>
             <a:schemeClr val="tx1"/>
           </a:solidFill>
@@ -2899,8 +2899,8 @@
           <a:cs typeface="+mn-cs"/>
         </a:defRPr>
       </a:lvl4pPr>
-      <a:lvl5pPr marL="3694176" algn="l" defTabSz="1847088" rtl="0" eaLnBrk="1" latinLnBrk="0" hangingPunct="1">
-        <a:defRPr sz="3636" kern="1200">
+      <a:lvl5pPr marL="4023360" algn="l" defTabSz="2011680" rtl="0" eaLnBrk="1" latinLnBrk="0" hangingPunct="1">
+        <a:defRPr sz="3960" kern="1200">
           <a:solidFill>
             <a:schemeClr val="tx1"/>
           </a:solidFill>
@@ -2909,8 +2909,8 @@
           <a:cs typeface="+mn-cs"/>
         </a:defRPr>
       </a:lvl5pPr>
-      <a:lvl6pPr marL="4617720" algn="l" defTabSz="1847088" rtl="0" eaLnBrk="1" latinLnBrk="0" hangingPunct="1">
-        <a:defRPr sz="3636" kern="1200">
+      <a:lvl6pPr marL="5029200" algn="l" defTabSz="2011680" rtl="0" eaLnBrk="1" latinLnBrk="0" hangingPunct="1">
+        <a:defRPr sz="3960" kern="1200">
           <a:solidFill>
             <a:schemeClr val="tx1"/>
           </a:solidFill>
@@ -2919,8 +2919,8 @@
           <a:cs typeface="+mn-cs"/>
         </a:defRPr>
       </a:lvl6pPr>
-      <a:lvl7pPr marL="5541264" algn="l" defTabSz="1847088" rtl="0" eaLnBrk="1" latinLnBrk="0" hangingPunct="1">
-        <a:defRPr sz="3636" kern="1200">
+      <a:lvl7pPr marL="6035040" algn="l" defTabSz="2011680" rtl="0" eaLnBrk="1" latinLnBrk="0" hangingPunct="1">
+        <a:defRPr sz="3960" kern="1200">
           <a:solidFill>
             <a:schemeClr val="tx1"/>
           </a:solidFill>
@@ -2929,8 +2929,8 @@
           <a:cs typeface="+mn-cs"/>
         </a:defRPr>
       </a:lvl7pPr>
-      <a:lvl8pPr marL="6464808" algn="l" defTabSz="1847088" rtl="0" eaLnBrk="1" latinLnBrk="0" hangingPunct="1">
-        <a:defRPr sz="3636" kern="1200">
+      <a:lvl8pPr marL="7040880" algn="l" defTabSz="2011680" rtl="0" eaLnBrk="1" latinLnBrk="0" hangingPunct="1">
+        <a:defRPr sz="3960" kern="1200">
           <a:solidFill>
             <a:schemeClr val="tx1"/>
           </a:solidFill>
@@ -2939,8 +2939,8 @@
           <a:cs typeface="+mn-cs"/>
         </a:defRPr>
       </a:lvl8pPr>
-      <a:lvl9pPr marL="7388352" algn="l" defTabSz="1847088" rtl="0" eaLnBrk="1" latinLnBrk="0" hangingPunct="1">
-        <a:defRPr sz="3636" kern="1200">
+      <a:lvl9pPr marL="8046720" algn="l" defTabSz="2011680" rtl="0" eaLnBrk="1" latinLnBrk="0" hangingPunct="1">
+        <a:defRPr sz="3960" kern="1200">
           <a:solidFill>
             <a:schemeClr val="tx1"/>
           </a:solidFill>
@@ -2971,6 +2971,146 @@
           <a:chExt cx="0" cy="0"/>
         </a:xfrm>
       </p:grpSpPr>
+      <p:pic>
+        <p:nvPicPr>
+          <p:cNvPr id="8" name="Picture 7" descr="A collage of graphs&#10;&#10;Description automatically generated">
+            <a:extLst>
+              <a:ext uri="{FF2B5EF4-FFF2-40B4-BE49-F238E27FC236}">
+                <a16:creationId xmlns:a16="http://schemas.microsoft.com/office/drawing/2014/main" id="{0AC0009E-8ED7-4894-DE3E-8014FDFCA2CD}"/>
+              </a:ext>
+            </a:extLst>
+          </p:cNvPr>
+          <p:cNvPicPr>
+            <a:picLocks noChangeAspect="1"/>
+          </p:cNvPicPr>
+          <p:nvPr/>
+        </p:nvPicPr>
+        <p:blipFill rotWithShape="1">
+          <a:blip r:embed="rId2">
+            <a:extLst>
+              <a:ext uri="{28A0092B-C50C-407E-A947-70E740481C1C}">
+                <a14:useLocalDpi xmlns:a14="http://schemas.microsoft.com/office/drawing/2010/main" val="0"/>
+              </a:ext>
+            </a:extLst>
+          </a:blip>
+          <a:srcRect t="66158" r="50547"/>
+          <a:stretch/>
+        </p:blipFill>
+        <p:spPr>
+          <a:xfrm>
+            <a:off x="767675" y="10364047"/>
+            <a:ext cx="9134131" cy="4688086"/>
+          </a:xfrm>
+          <a:prstGeom prst="rect">
+            <a:avLst/>
+          </a:prstGeom>
+        </p:spPr>
+      </p:pic>
+      <p:pic>
+        <p:nvPicPr>
+          <p:cNvPr id="5" name="Picture 4" descr="A collage of graphs&#10;&#10;Description automatically generated">
+            <a:extLst>
+              <a:ext uri="{FF2B5EF4-FFF2-40B4-BE49-F238E27FC236}">
+                <a16:creationId xmlns:a16="http://schemas.microsoft.com/office/drawing/2014/main" id="{4EE9D7E2-8F20-FA74-04F8-8E498EBBF85B}"/>
+              </a:ext>
+            </a:extLst>
+          </p:cNvPr>
+          <p:cNvPicPr>
+            <a:picLocks noChangeAspect="1"/>
+          </p:cNvPicPr>
+          <p:nvPr/>
+        </p:nvPicPr>
+        <p:blipFill rotWithShape="1">
+          <a:blip r:embed="rId2">
+            <a:extLst>
+              <a:ext uri="{28A0092B-C50C-407E-A947-70E740481C1C}">
+                <a14:useLocalDpi xmlns:a14="http://schemas.microsoft.com/office/drawing/2010/main" val="0"/>
+              </a:ext>
+            </a:extLst>
+          </a:blip>
+          <a:srcRect l="49135" t="66933"/>
+          <a:stretch/>
+        </p:blipFill>
+        <p:spPr>
+          <a:xfrm>
+            <a:off x="9901806" y="10148211"/>
+            <a:ext cx="9394988" cy="4580711"/>
+          </a:xfrm>
+          <a:prstGeom prst="rect">
+            <a:avLst/>
+          </a:prstGeom>
+        </p:spPr>
+      </p:pic>
+      <p:pic>
+        <p:nvPicPr>
+          <p:cNvPr id="9" name="Picture 8" descr="A collage of graphs&#10;&#10;Description automatically generated">
+            <a:extLst>
+              <a:ext uri="{FF2B5EF4-FFF2-40B4-BE49-F238E27FC236}">
+                <a16:creationId xmlns:a16="http://schemas.microsoft.com/office/drawing/2014/main" id="{A1BB55E6-D4E2-5EFB-7446-0FED22307B7C}"/>
+              </a:ext>
+            </a:extLst>
+          </p:cNvPr>
+          <p:cNvPicPr>
+            <a:picLocks noChangeAspect="1"/>
+          </p:cNvPicPr>
+          <p:nvPr/>
+        </p:nvPicPr>
+        <p:blipFill rotWithShape="1">
+          <a:blip r:embed="rId2">
+            <a:extLst>
+              <a:ext uri="{28A0092B-C50C-407E-A947-70E740481C1C}">
+                <a14:useLocalDpi xmlns:a14="http://schemas.microsoft.com/office/drawing/2010/main" val="0"/>
+              </a:ext>
+            </a:extLst>
+          </a:blip>
+          <a:srcRect t="33325" r="15945" b="33608"/>
+          <a:stretch/>
+        </p:blipFill>
+        <p:spPr>
+          <a:xfrm>
+            <a:off x="639725" y="5360632"/>
+            <a:ext cx="15525347" cy="4580710"/>
+          </a:xfrm>
+          <a:prstGeom prst="rect">
+            <a:avLst/>
+          </a:prstGeom>
+        </p:spPr>
+      </p:pic>
+      <p:pic>
+        <p:nvPicPr>
+          <p:cNvPr id="10" name="Picture 9" descr="A collage of graphs&#10;&#10;Description automatically generated">
+            <a:extLst>
+              <a:ext uri="{FF2B5EF4-FFF2-40B4-BE49-F238E27FC236}">
+                <a16:creationId xmlns:a16="http://schemas.microsoft.com/office/drawing/2014/main" id="{C7F9C2E9-F6D4-ED46-CEE9-24C0F0313276}"/>
+              </a:ext>
+            </a:extLst>
+          </p:cNvPr>
+          <p:cNvPicPr>
+            <a:picLocks noChangeAspect="1"/>
+          </p:cNvPicPr>
+          <p:nvPr/>
+        </p:nvPicPr>
+        <p:blipFill rotWithShape="1">
+          <a:blip r:embed="rId2">
+            <a:extLst>
+              <a:ext uri="{28A0092B-C50C-407E-A947-70E740481C1C}">
+                <a14:useLocalDpi xmlns:a14="http://schemas.microsoft.com/office/drawing/2010/main" val="0"/>
+              </a:ext>
+            </a:extLst>
+          </a:blip>
+          <a:srcRect r="15945" b="67492"/>
+          <a:stretch/>
+        </p:blipFill>
+        <p:spPr>
+          <a:xfrm>
+            <a:off x="588137" y="555185"/>
+            <a:ext cx="15525346" cy="4503301"/>
+          </a:xfrm>
+          <a:prstGeom prst="rect">
+            <a:avLst/>
+          </a:prstGeom>
+        </p:spPr>
+      </p:pic>
       <p:grpSp>
         <p:nvGrpSpPr>
           <p:cNvPr id="7" name="Group 6">
@@ -2985,41 +3125,12 @@
         </p:nvGrpSpPr>
         <p:grpSpPr>
           <a:xfrm>
-            <a:off x="147889" y="200667"/>
-            <a:ext cx="18174784" cy="14686265"/>
-            <a:chOff x="1" y="0"/>
-            <a:chExt cx="18174784" cy="14686265"/>
+            <a:off x="636366" y="478261"/>
+            <a:ext cx="13176648" cy="10140479"/>
+            <a:chOff x="292422" y="0"/>
+            <a:chExt cx="13176648" cy="10140479"/>
           </a:xfrm>
         </p:grpSpPr>
-        <p:pic>
-          <p:nvPicPr>
-            <p:cNvPr id="3" name="Picture 2">
-              <a:extLst>
-                <a:ext uri="{FF2B5EF4-FFF2-40B4-BE49-F238E27FC236}">
-                  <a16:creationId xmlns:a16="http://schemas.microsoft.com/office/drawing/2014/main" id="{95381C81-1480-BD42-2F45-708F3C7DB13B}"/>
-                </a:ext>
-              </a:extLst>
-            </p:cNvPr>
-            <p:cNvPicPr>
-              <a:picLocks noChangeAspect="1"/>
-            </p:cNvPicPr>
-            <p:nvPr/>
-          </p:nvPicPr>
-          <p:blipFill rotWithShape="1">
-            <a:blip r:embed="rId2"/>
-            <a:srcRect b="33258"/>
-            <a:stretch/>
-          </p:blipFill>
-          <p:spPr>
-            <a:xfrm>
-              <a:off x="1" y="355686"/>
-              <a:ext cx="18174784" cy="9073422"/>
-            </a:xfrm>
-            <a:prstGeom prst="rect">
-              <a:avLst/>
-            </a:prstGeom>
-          </p:spPr>
-        </p:pic>
         <p:pic>
           <p:nvPicPr>
             <p:cNvPr id="22" name="Picture 21">
@@ -3042,7 +3153,7 @@
           </p:blipFill>
           <p:spPr>
             <a:xfrm>
-              <a:off x="11539694" y="6730915"/>
+              <a:off x="12026483" y="6890136"/>
               <a:ext cx="1442587" cy="1669510"/>
             </a:xfrm>
             <a:prstGeom prst="corner">
@@ -3050,35 +3161,6 @@
                 <a:gd name="adj1" fmla="val 50000"/>
                 <a:gd name="adj2" fmla="val 61608"/>
               </a:avLst>
-            </a:prstGeom>
-          </p:spPr>
-        </p:pic>
-        <p:pic>
-          <p:nvPicPr>
-            <p:cNvPr id="6" name="Picture 5">
-              <a:extLst>
-                <a:ext uri="{FF2B5EF4-FFF2-40B4-BE49-F238E27FC236}">
-                  <a16:creationId xmlns:a16="http://schemas.microsoft.com/office/drawing/2014/main" id="{DFF9BB04-EC72-BE7A-E344-BC4FA60DC190}"/>
-                </a:ext>
-              </a:extLst>
-            </p:cNvPr>
-            <p:cNvPicPr>
-              <a:picLocks noChangeAspect="1"/>
-            </p:cNvPicPr>
-            <p:nvPr/>
-          </p:nvPicPr>
-          <p:blipFill rotWithShape="1">
-            <a:blip r:embed="rId2"/>
-            <a:srcRect l="49910" t="66374"/>
-            <a:stretch/>
-          </p:blipFill>
-          <p:spPr>
-            <a:xfrm>
-              <a:off x="8789530" y="9784793"/>
-              <a:ext cx="9103723" cy="4571272"/>
-            </a:xfrm>
-            <a:prstGeom prst="rect">
-              <a:avLst/>
             </a:prstGeom>
           </p:spPr>
         </p:pic>
@@ -3132,7 +3214,7 @@
           </p:nvSpPr>
           <p:spPr>
             <a:xfrm>
-              <a:off x="9247100" y="9429108"/>
+              <a:off x="292422" y="9429108"/>
               <a:ext cx="523263" cy="711371"/>
             </a:xfrm>
             <a:prstGeom prst="rect">
@@ -3168,7 +3250,7 @@
           </p:nvSpPr>
           <p:spPr>
             <a:xfrm>
-              <a:off x="295778" y="9429108"/>
+              <a:off x="299408" y="4334364"/>
               <a:ext cx="523263" cy="711371"/>
             </a:xfrm>
             <a:prstGeom prst="rect">
@@ -3190,36 +3272,78 @@
             </a:p>
           </p:txBody>
         </p:sp>
-        <p:pic>
-          <p:nvPicPr>
-            <p:cNvPr id="4" name="Picture 3">
-              <a:extLst>
-                <a:ext uri="{FF2B5EF4-FFF2-40B4-BE49-F238E27FC236}">
-                  <a16:creationId xmlns:a16="http://schemas.microsoft.com/office/drawing/2014/main" id="{705CEE61-6546-7039-F8F2-994F4A5C9BE3}"/>
-                </a:ext>
-              </a:extLst>
-            </p:cNvPr>
-            <p:cNvPicPr>
-              <a:picLocks noChangeAspect="1"/>
-            </p:cNvPicPr>
-            <p:nvPr/>
-          </p:nvPicPr>
-          <p:blipFill rotWithShape="1">
-            <a:blip r:embed="rId2"/>
-            <a:srcRect t="66374" r="49910"/>
-            <a:stretch/>
-          </p:blipFill>
-          <p:spPr>
-            <a:xfrm>
-              <a:off x="23639" y="10114993"/>
-              <a:ext cx="9103723" cy="4571272"/>
-            </a:xfrm>
-            <a:prstGeom prst="rect">
-              <a:avLst/>
-            </a:prstGeom>
-          </p:spPr>
-        </p:pic>
       </p:grpSp>
+      <p:sp>
+        <p:nvSpPr>
+          <p:cNvPr id="12" name="TextBox 11">
+            <a:extLst>
+              <a:ext uri="{FF2B5EF4-FFF2-40B4-BE49-F238E27FC236}">
+                <a16:creationId xmlns:a16="http://schemas.microsoft.com/office/drawing/2014/main" id="{FBFF246D-610B-4374-EB67-17CF1BF15B54}"/>
+              </a:ext>
+            </a:extLst>
+          </p:cNvPr>
+          <p:cNvSpPr txBox="1"/>
+          <p:nvPr/>
+        </p:nvSpPr>
+        <p:spPr>
+          <a:xfrm>
+            <a:off x="9775262" y="9911289"/>
+            <a:ext cx="523263" cy="711371"/>
+          </a:xfrm>
+          <a:prstGeom prst="rect">
+            <a:avLst/>
+          </a:prstGeom>
+          <a:noFill/>
+        </p:spPr>
+        <p:txBody>
+          <a:bodyPr wrap="square" rtlCol="0">
+            <a:spAutoFit/>
+          </a:bodyPr>
+          <a:lstStyle/>
+          <a:p>
+            <a:pPr algn="ctr"/>
+            <a:r>
+              <a:rPr lang="en-US" sz="4020" dirty="0"/>
+              <a:t>D</a:t>
+            </a:r>
+          </a:p>
+        </p:txBody>
+      </p:sp>
+      <p:pic>
+        <p:nvPicPr>
+          <p:cNvPr id="3" name="Picture 2" descr="A collage of graphs&#10;&#10;Description automatically generated">
+            <a:extLst>
+              <a:ext uri="{FF2B5EF4-FFF2-40B4-BE49-F238E27FC236}">
+                <a16:creationId xmlns:a16="http://schemas.microsoft.com/office/drawing/2014/main" id="{214DF0C1-288E-7D0A-549F-71CABD41543F}"/>
+              </a:ext>
+            </a:extLst>
+          </p:cNvPr>
+          <p:cNvPicPr>
+            <a:picLocks noChangeAspect="1"/>
+          </p:cNvPicPr>
+          <p:nvPr/>
+        </p:nvPicPr>
+        <p:blipFill rotWithShape="1">
+          <a:blip r:embed="rId4">
+            <a:extLst>
+              <a:ext uri="{28A0092B-C50C-407E-A947-70E740481C1C}">
+                <a14:useLocalDpi xmlns:a14="http://schemas.microsoft.com/office/drawing/2010/main" val="0"/>
+              </a:ext>
+            </a:extLst>
+          </a:blip>
+          <a:srcRect l="84241" t="14478" b="48148"/>
+          <a:stretch/>
+        </p:blipFill>
+        <p:spPr>
+          <a:xfrm>
+            <a:off x="16267524" y="2076358"/>
+            <a:ext cx="3353214" cy="5964255"/>
+          </a:xfrm>
+          <a:prstGeom prst="rect">
+            <a:avLst/>
+          </a:prstGeom>
+        </p:spPr>
+      </p:pic>
     </p:spTree>
     <p:extLst>
       <p:ext uri="{BB962C8B-B14F-4D97-AF65-F5344CB8AC3E}">
@@ -3234,9 +3358,9 @@
 </file>
 
 <file path=ppt/theme/theme1.xml><?xml version="1.0" encoding="utf-8"?>
-<a:theme xmlns:a="http://schemas.openxmlformats.org/drawingml/2006/main" name="Office Theme">
+<a:theme xmlns:a="http://schemas.openxmlformats.org/drawingml/2006/main" name="Office 2013 - 2022 Theme">
   <a:themeElements>
-    <a:clrScheme name="Office Theme">
+    <a:clrScheme name="Office 2013 - 2022 Theme">
       <a:dk1>
         <a:sysClr val="windowText" lastClr="000000"/>
       </a:dk1>
@@ -3274,7 +3398,7 @@
         <a:srgbClr val="954F72"/>
       </a:folHlink>
     </a:clrScheme>
-    <a:fontScheme name="Office Theme">
+    <a:fontScheme name="Office 2013 - 2022 Theme">
       <a:majorFont>
         <a:latin typeface="Calibri Light" panose="020F0302020204030204"/>
         <a:ea typeface=""/>
@@ -3346,7 +3470,7 @@
         <a:font script="Geor" typeface="Sylfaen"/>
       </a:minorFont>
     </a:fontScheme>
-    <a:fmtScheme name="Office Theme">
+    <a:fmtScheme name="Office 2013 - 2022 Theme">
       <a:fillStyleLst>
         <a:solidFill>
           <a:schemeClr val="phClr"/>

</xml_diff>

<commit_message>
updates after friendly reviews
</commit_message>
<xml_diff>
--- a/manuscript/final_figures/Figure_Box1_cleanup.pptx
+++ b/manuscript/final_figures/Figure_Box1_cleanup.pptx
@@ -2,12 +2,12 @@
 <file path=ppt/presentation.xml><?xml version="1.0" encoding="utf-8"?>
 <p:presentation xmlns:a="http://schemas.openxmlformats.org/drawingml/2006/main" xmlns:r="http://schemas.openxmlformats.org/officeDocument/2006/relationships" xmlns:p="http://schemas.openxmlformats.org/presentationml/2006/main" saveSubsetFonts="1">
   <p:sldMasterIdLst>
-    <p:sldMasterId id="2147483684" r:id="rId1"/>
+    <p:sldMasterId id="2147483720" r:id="rId1"/>
   </p:sldMasterIdLst>
   <p:sldIdLst>
     <p:sldId id="256" r:id="rId2"/>
   </p:sldIdLst>
-  <p:sldSz cx="20208875" cy="15087600"/>
+  <p:sldSz cx="23409275" cy="19202400"/>
   <p:notesSz cx="6858000" cy="9144000"/>
   <p:defaultTextStyle>
     <a:defPPr>
@@ -141,15 +141,15 @@
         </p:nvSpPr>
         <p:spPr>
           <a:xfrm>
-            <a:off x="1515666" y="2469199"/>
-            <a:ext cx="17177544" cy="5252720"/>
+            <a:off x="1755696" y="3142616"/>
+            <a:ext cx="19897884" cy="6685280"/>
           </a:xfrm>
         </p:spPr>
         <p:txBody>
           <a:bodyPr anchor="b"/>
           <a:lstStyle>
             <a:lvl1pPr algn="ctr">
-              <a:defRPr sz="13200"/>
+              <a:defRPr sz="15361"/>
             </a:lvl1pPr>
           </a:lstStyle>
           <a:p>
@@ -173,8 +173,8 @@
         </p:nvSpPr>
         <p:spPr>
           <a:xfrm>
-            <a:off x="2526110" y="7924484"/>
-            <a:ext cx="15156656" cy="3642676"/>
+            <a:off x="2926160" y="10085706"/>
+            <a:ext cx="17556956" cy="4636134"/>
           </a:xfrm>
         </p:spPr>
         <p:txBody>
@@ -182,39 +182,39 @@
           <a:lstStyle>
             <a:lvl1pPr marL="0" indent="0" algn="ctr">
               <a:buNone/>
-              <a:defRPr sz="5280"/>
+              <a:defRPr sz="6144"/>
             </a:lvl1pPr>
-            <a:lvl2pPr marL="1005840" indent="0" algn="ctr">
-              <a:buNone/>
-              <a:defRPr sz="4400"/>
+            <a:lvl2pPr marL="1170478" indent="0" algn="ctr">
+              <a:buNone/>
+              <a:defRPr sz="5120"/>
             </a:lvl2pPr>
-            <a:lvl3pPr marL="2011680" indent="0" algn="ctr">
-              <a:buNone/>
-              <a:defRPr sz="3960"/>
+            <a:lvl3pPr marL="2340955" indent="0" algn="ctr">
+              <a:buNone/>
+              <a:defRPr sz="4608"/>
             </a:lvl3pPr>
-            <a:lvl4pPr marL="3017520" indent="0" algn="ctr">
-              <a:buNone/>
-              <a:defRPr sz="3520"/>
+            <a:lvl4pPr marL="3511433" indent="0" algn="ctr">
+              <a:buNone/>
+              <a:defRPr sz="4096"/>
             </a:lvl4pPr>
-            <a:lvl5pPr marL="4023360" indent="0" algn="ctr">
-              <a:buNone/>
-              <a:defRPr sz="3520"/>
+            <a:lvl5pPr marL="4681911" indent="0" algn="ctr">
+              <a:buNone/>
+              <a:defRPr sz="4096"/>
             </a:lvl5pPr>
-            <a:lvl6pPr marL="5029200" indent="0" algn="ctr">
-              <a:buNone/>
-              <a:defRPr sz="3520"/>
+            <a:lvl6pPr marL="5852389" indent="0" algn="ctr">
+              <a:buNone/>
+              <a:defRPr sz="4096"/>
             </a:lvl6pPr>
-            <a:lvl7pPr marL="6035040" indent="0" algn="ctr">
-              <a:buNone/>
-              <a:defRPr sz="3520"/>
+            <a:lvl7pPr marL="7022866" indent="0" algn="ctr">
+              <a:buNone/>
+              <a:defRPr sz="4096"/>
             </a:lvl7pPr>
-            <a:lvl8pPr marL="7040880" indent="0" algn="ctr">
-              <a:buNone/>
-              <a:defRPr sz="3520"/>
+            <a:lvl8pPr marL="8193344" indent="0" algn="ctr">
+              <a:buNone/>
+              <a:defRPr sz="4096"/>
             </a:lvl8pPr>
-            <a:lvl9pPr marL="8046720" indent="0" algn="ctr">
-              <a:buNone/>
-              <a:defRPr sz="3520"/>
+            <a:lvl9pPr marL="9363822" indent="0" algn="ctr">
+              <a:buNone/>
+              <a:defRPr sz="4096"/>
             </a:lvl9pPr>
           </a:lstStyle>
           <a:p>
@@ -243,7 +243,7 @@
           <a:p>
             <a:fld id="{9989B3A2-2388-44BE-9854-4BCC09CB1095}" type="datetimeFigureOut">
               <a:rPr lang="en-US" smtClean="0"/>
-              <a:t>12/17/2023</a:t>
+              <a:t>1/15/2024</a:t>
             </a:fld>
             <a:endParaRPr lang="en-US"/>
           </a:p>
@@ -294,7 +294,7 @@
     </p:spTree>
     <p:extLst>
       <p:ext uri="{BB962C8B-B14F-4D97-AF65-F5344CB8AC3E}">
-        <p14:creationId xmlns:p14="http://schemas.microsoft.com/office/powerpoint/2010/main" val="3185662121"/>
+        <p14:creationId xmlns:p14="http://schemas.microsoft.com/office/powerpoint/2010/main" val="1407973400"/>
       </p:ext>
     </p:extLst>
   </p:cSld>
@@ -413,7 +413,7 @@
           <a:p>
             <a:fld id="{9989B3A2-2388-44BE-9854-4BCC09CB1095}" type="datetimeFigureOut">
               <a:rPr lang="en-US" smtClean="0"/>
-              <a:t>12/17/2023</a:t>
+              <a:t>1/15/2024</a:t>
             </a:fld>
             <a:endParaRPr lang="en-US"/>
           </a:p>
@@ -464,7 +464,7 @@
     </p:spTree>
     <p:extLst>
       <p:ext uri="{BB962C8B-B14F-4D97-AF65-F5344CB8AC3E}">
-        <p14:creationId xmlns:p14="http://schemas.microsoft.com/office/powerpoint/2010/main" val="3156057746"/>
+        <p14:creationId xmlns:p14="http://schemas.microsoft.com/office/powerpoint/2010/main" val="3327965461"/>
       </p:ext>
     </p:extLst>
   </p:cSld>
@@ -503,8 +503,8 @@
         </p:nvSpPr>
         <p:spPr>
           <a:xfrm>
-            <a:off x="14461977" y="803275"/>
-            <a:ext cx="4357539" cy="12786044"/>
+            <a:off x="16752264" y="1022350"/>
+            <a:ext cx="5047625" cy="16273146"/>
           </a:xfrm>
         </p:spPr>
         <p:txBody>
@@ -531,8 +531,8 @@
         </p:nvSpPr>
         <p:spPr>
           <a:xfrm>
-            <a:off x="1389361" y="803275"/>
-            <a:ext cx="12820005" cy="12786044"/>
+            <a:off x="1609389" y="1022350"/>
+            <a:ext cx="14850259" cy="16273146"/>
           </a:xfrm>
         </p:spPr>
         <p:txBody>
@@ -593,7 +593,7 @@
           <a:p>
             <a:fld id="{9989B3A2-2388-44BE-9854-4BCC09CB1095}" type="datetimeFigureOut">
               <a:rPr lang="en-US" smtClean="0"/>
-              <a:t>12/17/2023</a:t>
+              <a:t>1/15/2024</a:t>
             </a:fld>
             <a:endParaRPr lang="en-US"/>
           </a:p>
@@ -644,7 +644,7 @@
     </p:spTree>
     <p:extLst>
       <p:ext uri="{BB962C8B-B14F-4D97-AF65-F5344CB8AC3E}">
-        <p14:creationId xmlns:p14="http://schemas.microsoft.com/office/powerpoint/2010/main" val="3149386759"/>
+        <p14:creationId xmlns:p14="http://schemas.microsoft.com/office/powerpoint/2010/main" val="3207882821"/>
       </p:ext>
     </p:extLst>
   </p:cSld>
@@ -763,7 +763,7 @@
           <a:p>
             <a:fld id="{9989B3A2-2388-44BE-9854-4BCC09CB1095}" type="datetimeFigureOut">
               <a:rPr lang="en-US" smtClean="0"/>
-              <a:t>12/17/2023</a:t>
+              <a:t>1/15/2024</a:t>
             </a:fld>
             <a:endParaRPr lang="en-US"/>
           </a:p>
@@ -814,7 +814,7 @@
     </p:spTree>
     <p:extLst>
       <p:ext uri="{BB962C8B-B14F-4D97-AF65-F5344CB8AC3E}">
-        <p14:creationId xmlns:p14="http://schemas.microsoft.com/office/powerpoint/2010/main" val="1294869117"/>
+        <p14:creationId xmlns:p14="http://schemas.microsoft.com/office/powerpoint/2010/main" val="3139788133"/>
       </p:ext>
     </p:extLst>
   </p:cSld>
@@ -853,15 +853,15 @@
         </p:nvSpPr>
         <p:spPr>
           <a:xfrm>
-            <a:off x="1378836" y="3761427"/>
-            <a:ext cx="17430155" cy="6276021"/>
+            <a:off x="1597196" y="4787270"/>
+            <a:ext cx="20190500" cy="7987664"/>
           </a:xfrm>
         </p:spPr>
         <p:txBody>
           <a:bodyPr anchor="b"/>
           <a:lstStyle>
             <a:lvl1pPr>
-              <a:defRPr sz="13200"/>
+              <a:defRPr sz="15361"/>
             </a:lvl1pPr>
           </a:lstStyle>
           <a:p>
@@ -885,8 +885,8 @@
         </p:nvSpPr>
         <p:spPr>
           <a:xfrm>
-            <a:off x="1378836" y="10096822"/>
-            <a:ext cx="17430155" cy="3300411"/>
+            <a:off x="1597196" y="12850500"/>
+            <a:ext cx="20190500" cy="4200524"/>
           </a:xfrm>
         </p:spPr>
         <p:txBody>
@@ -894,15 +894,15 @@
           <a:lstStyle>
             <a:lvl1pPr marL="0" indent="0">
               <a:buNone/>
-              <a:defRPr sz="5280">
+              <a:defRPr sz="6144">
                 <a:solidFill>
                   <a:schemeClr val="tx1"/>
                 </a:solidFill>
               </a:defRPr>
             </a:lvl1pPr>
-            <a:lvl2pPr marL="1005840" indent="0">
-              <a:buNone/>
-              <a:defRPr sz="4400">
+            <a:lvl2pPr marL="1170478" indent="0">
+              <a:buNone/>
+              <a:defRPr sz="5120">
                 <a:solidFill>
                   <a:schemeClr val="tx1">
                     <a:tint val="75000"/>
@@ -910,9 +910,9 @@
                 </a:solidFill>
               </a:defRPr>
             </a:lvl2pPr>
-            <a:lvl3pPr marL="2011680" indent="0">
-              <a:buNone/>
-              <a:defRPr sz="3960">
+            <a:lvl3pPr marL="2340955" indent="0">
+              <a:buNone/>
+              <a:defRPr sz="4608">
                 <a:solidFill>
                   <a:schemeClr val="tx1">
                     <a:tint val="75000"/>
@@ -920,9 +920,9 @@
                 </a:solidFill>
               </a:defRPr>
             </a:lvl3pPr>
-            <a:lvl4pPr marL="3017520" indent="0">
-              <a:buNone/>
-              <a:defRPr sz="3520">
+            <a:lvl4pPr marL="3511433" indent="0">
+              <a:buNone/>
+              <a:defRPr sz="4096">
                 <a:solidFill>
                   <a:schemeClr val="tx1">
                     <a:tint val="75000"/>
@@ -930,9 +930,9 @@
                 </a:solidFill>
               </a:defRPr>
             </a:lvl4pPr>
-            <a:lvl5pPr marL="4023360" indent="0">
-              <a:buNone/>
-              <a:defRPr sz="3520">
+            <a:lvl5pPr marL="4681911" indent="0">
+              <a:buNone/>
+              <a:defRPr sz="4096">
                 <a:solidFill>
                   <a:schemeClr val="tx1">
                     <a:tint val="75000"/>
@@ -940,9 +940,9 @@
                 </a:solidFill>
               </a:defRPr>
             </a:lvl5pPr>
-            <a:lvl6pPr marL="5029200" indent="0">
-              <a:buNone/>
-              <a:defRPr sz="3520">
+            <a:lvl6pPr marL="5852389" indent="0">
+              <a:buNone/>
+              <a:defRPr sz="4096">
                 <a:solidFill>
                   <a:schemeClr val="tx1">
                     <a:tint val="75000"/>
@@ -950,9 +950,9 @@
                 </a:solidFill>
               </a:defRPr>
             </a:lvl6pPr>
-            <a:lvl7pPr marL="6035040" indent="0">
-              <a:buNone/>
-              <a:defRPr sz="3520">
+            <a:lvl7pPr marL="7022866" indent="0">
+              <a:buNone/>
+              <a:defRPr sz="4096">
                 <a:solidFill>
                   <a:schemeClr val="tx1">
                     <a:tint val="75000"/>
@@ -960,9 +960,9 @@
                 </a:solidFill>
               </a:defRPr>
             </a:lvl7pPr>
-            <a:lvl8pPr marL="7040880" indent="0">
-              <a:buNone/>
-              <a:defRPr sz="3520">
+            <a:lvl8pPr marL="8193344" indent="0">
+              <a:buNone/>
+              <a:defRPr sz="4096">
                 <a:solidFill>
                   <a:schemeClr val="tx1">
                     <a:tint val="75000"/>
@@ -970,9 +970,9 @@
                 </a:solidFill>
               </a:defRPr>
             </a:lvl8pPr>
-            <a:lvl9pPr marL="8046720" indent="0">
-              <a:buNone/>
-              <a:defRPr sz="3520">
+            <a:lvl9pPr marL="9363822" indent="0">
+              <a:buNone/>
+              <a:defRPr sz="4096">
                 <a:solidFill>
                   <a:schemeClr val="tx1">
                     <a:tint val="75000"/>
@@ -1007,7 +1007,7 @@
           <a:p>
             <a:fld id="{9989B3A2-2388-44BE-9854-4BCC09CB1095}" type="datetimeFigureOut">
               <a:rPr lang="en-US" smtClean="0"/>
-              <a:t>12/17/2023</a:t>
+              <a:t>1/15/2024</a:t>
             </a:fld>
             <a:endParaRPr lang="en-US"/>
           </a:p>
@@ -1058,7 +1058,7 @@
     </p:spTree>
     <p:extLst>
       <p:ext uri="{BB962C8B-B14F-4D97-AF65-F5344CB8AC3E}">
-        <p14:creationId xmlns:p14="http://schemas.microsoft.com/office/powerpoint/2010/main" val="1934269958"/>
+        <p14:creationId xmlns:p14="http://schemas.microsoft.com/office/powerpoint/2010/main" val="1199570316"/>
       </p:ext>
     </p:extLst>
   </p:cSld>
@@ -1120,8 +1120,8 @@
         </p:nvSpPr>
         <p:spPr>
           <a:xfrm>
-            <a:off x="1389360" y="4016375"/>
-            <a:ext cx="8588772" cy="9572944"/>
+            <a:off x="1609388" y="5111750"/>
+            <a:ext cx="9948942" cy="12183746"/>
           </a:xfrm>
         </p:spPr>
         <p:txBody>
@@ -1177,8 +1177,8 @@
         </p:nvSpPr>
         <p:spPr>
           <a:xfrm>
-            <a:off x="10230743" y="4016375"/>
-            <a:ext cx="8588772" cy="9572944"/>
+            <a:off x="11850945" y="5111750"/>
+            <a:ext cx="9948942" cy="12183746"/>
           </a:xfrm>
         </p:spPr>
         <p:txBody>
@@ -1239,7 +1239,7 @@
           <a:p>
             <a:fld id="{9989B3A2-2388-44BE-9854-4BCC09CB1095}" type="datetimeFigureOut">
               <a:rPr lang="en-US" smtClean="0"/>
-              <a:t>12/17/2023</a:t>
+              <a:t>1/15/2024</a:t>
             </a:fld>
             <a:endParaRPr lang="en-US"/>
           </a:p>
@@ -1290,7 +1290,7 @@
     </p:spTree>
     <p:extLst>
       <p:ext uri="{BB962C8B-B14F-4D97-AF65-F5344CB8AC3E}">
-        <p14:creationId xmlns:p14="http://schemas.microsoft.com/office/powerpoint/2010/main" val="784238238"/>
+        <p14:creationId xmlns:p14="http://schemas.microsoft.com/office/powerpoint/2010/main" val="3314965289"/>
       </p:ext>
     </p:extLst>
   </p:cSld>
@@ -1329,8 +1329,8 @@
         </p:nvSpPr>
         <p:spPr>
           <a:xfrm>
-            <a:off x="1391992" y="803278"/>
-            <a:ext cx="17430155" cy="2916239"/>
+            <a:off x="1612437" y="1022354"/>
+            <a:ext cx="20190500" cy="3711576"/>
           </a:xfrm>
         </p:spPr>
         <p:txBody>
@@ -1357,8 +1357,8 @@
         </p:nvSpPr>
         <p:spPr>
           <a:xfrm>
-            <a:off x="1391995" y="3698559"/>
-            <a:ext cx="8549300" cy="1812606"/>
+            <a:off x="1612439" y="4707256"/>
+            <a:ext cx="9903219" cy="2306954"/>
           </a:xfrm>
         </p:spPr>
         <p:txBody>
@@ -1366,39 +1366,39 @@
           <a:lstStyle>
             <a:lvl1pPr marL="0" indent="0">
               <a:buNone/>
-              <a:defRPr sz="5280" b="1"/>
+              <a:defRPr sz="6144" b="1"/>
             </a:lvl1pPr>
-            <a:lvl2pPr marL="1005840" indent="0">
-              <a:buNone/>
-              <a:defRPr sz="4400" b="1"/>
+            <a:lvl2pPr marL="1170478" indent="0">
+              <a:buNone/>
+              <a:defRPr sz="5120" b="1"/>
             </a:lvl2pPr>
-            <a:lvl3pPr marL="2011680" indent="0">
-              <a:buNone/>
-              <a:defRPr sz="3960" b="1"/>
+            <a:lvl3pPr marL="2340955" indent="0">
+              <a:buNone/>
+              <a:defRPr sz="4608" b="1"/>
             </a:lvl3pPr>
-            <a:lvl4pPr marL="3017520" indent="0">
-              <a:buNone/>
-              <a:defRPr sz="3520" b="1"/>
+            <a:lvl4pPr marL="3511433" indent="0">
+              <a:buNone/>
+              <a:defRPr sz="4096" b="1"/>
             </a:lvl4pPr>
-            <a:lvl5pPr marL="4023360" indent="0">
-              <a:buNone/>
-              <a:defRPr sz="3520" b="1"/>
+            <a:lvl5pPr marL="4681911" indent="0">
+              <a:buNone/>
+              <a:defRPr sz="4096" b="1"/>
             </a:lvl5pPr>
-            <a:lvl6pPr marL="5029200" indent="0">
-              <a:buNone/>
-              <a:defRPr sz="3520" b="1"/>
+            <a:lvl6pPr marL="5852389" indent="0">
+              <a:buNone/>
+              <a:defRPr sz="4096" b="1"/>
             </a:lvl6pPr>
-            <a:lvl7pPr marL="6035040" indent="0">
-              <a:buNone/>
-              <a:defRPr sz="3520" b="1"/>
+            <a:lvl7pPr marL="7022866" indent="0">
+              <a:buNone/>
+              <a:defRPr sz="4096" b="1"/>
             </a:lvl7pPr>
-            <a:lvl8pPr marL="7040880" indent="0">
-              <a:buNone/>
-              <a:defRPr sz="3520" b="1"/>
+            <a:lvl8pPr marL="8193344" indent="0">
+              <a:buNone/>
+              <a:defRPr sz="4096" b="1"/>
             </a:lvl8pPr>
-            <a:lvl9pPr marL="8046720" indent="0">
-              <a:buNone/>
-              <a:defRPr sz="3520" b="1"/>
+            <a:lvl9pPr marL="9363822" indent="0">
+              <a:buNone/>
+              <a:defRPr sz="4096" b="1"/>
             </a:lvl9pPr>
           </a:lstStyle>
           <a:p>
@@ -1422,8 +1422,8 @@
         </p:nvSpPr>
         <p:spPr>
           <a:xfrm>
-            <a:off x="1391995" y="5511165"/>
-            <a:ext cx="8549300" cy="8106094"/>
+            <a:off x="1612439" y="7014210"/>
+            <a:ext cx="9903219" cy="10316846"/>
           </a:xfrm>
         </p:spPr>
         <p:txBody>
@@ -1479,8 +1479,8 @@
         </p:nvSpPr>
         <p:spPr>
           <a:xfrm>
-            <a:off x="10230744" y="3698559"/>
-            <a:ext cx="8591404" cy="1812606"/>
+            <a:off x="11850947" y="4707256"/>
+            <a:ext cx="9951991" cy="2306954"/>
           </a:xfrm>
         </p:spPr>
         <p:txBody>
@@ -1488,39 +1488,39 @@
           <a:lstStyle>
             <a:lvl1pPr marL="0" indent="0">
               <a:buNone/>
-              <a:defRPr sz="5280" b="1"/>
+              <a:defRPr sz="6144" b="1"/>
             </a:lvl1pPr>
-            <a:lvl2pPr marL="1005840" indent="0">
-              <a:buNone/>
-              <a:defRPr sz="4400" b="1"/>
+            <a:lvl2pPr marL="1170478" indent="0">
+              <a:buNone/>
+              <a:defRPr sz="5120" b="1"/>
             </a:lvl2pPr>
-            <a:lvl3pPr marL="2011680" indent="0">
-              <a:buNone/>
-              <a:defRPr sz="3960" b="1"/>
+            <a:lvl3pPr marL="2340955" indent="0">
+              <a:buNone/>
+              <a:defRPr sz="4608" b="1"/>
             </a:lvl3pPr>
-            <a:lvl4pPr marL="3017520" indent="0">
-              <a:buNone/>
-              <a:defRPr sz="3520" b="1"/>
+            <a:lvl4pPr marL="3511433" indent="0">
+              <a:buNone/>
+              <a:defRPr sz="4096" b="1"/>
             </a:lvl4pPr>
-            <a:lvl5pPr marL="4023360" indent="0">
-              <a:buNone/>
-              <a:defRPr sz="3520" b="1"/>
+            <a:lvl5pPr marL="4681911" indent="0">
+              <a:buNone/>
+              <a:defRPr sz="4096" b="1"/>
             </a:lvl5pPr>
-            <a:lvl6pPr marL="5029200" indent="0">
-              <a:buNone/>
-              <a:defRPr sz="3520" b="1"/>
+            <a:lvl6pPr marL="5852389" indent="0">
+              <a:buNone/>
+              <a:defRPr sz="4096" b="1"/>
             </a:lvl6pPr>
-            <a:lvl7pPr marL="6035040" indent="0">
-              <a:buNone/>
-              <a:defRPr sz="3520" b="1"/>
+            <a:lvl7pPr marL="7022866" indent="0">
+              <a:buNone/>
+              <a:defRPr sz="4096" b="1"/>
             </a:lvl7pPr>
-            <a:lvl8pPr marL="7040880" indent="0">
-              <a:buNone/>
-              <a:defRPr sz="3520" b="1"/>
+            <a:lvl8pPr marL="8193344" indent="0">
+              <a:buNone/>
+              <a:defRPr sz="4096" b="1"/>
             </a:lvl8pPr>
-            <a:lvl9pPr marL="8046720" indent="0">
-              <a:buNone/>
-              <a:defRPr sz="3520" b="1"/>
+            <a:lvl9pPr marL="9363822" indent="0">
+              <a:buNone/>
+              <a:defRPr sz="4096" b="1"/>
             </a:lvl9pPr>
           </a:lstStyle>
           <a:p>
@@ -1544,8 +1544,8 @@
         </p:nvSpPr>
         <p:spPr>
           <a:xfrm>
-            <a:off x="10230744" y="5511165"/>
-            <a:ext cx="8591404" cy="8106094"/>
+            <a:off x="11850947" y="7014210"/>
+            <a:ext cx="9951991" cy="10316846"/>
           </a:xfrm>
         </p:spPr>
         <p:txBody>
@@ -1606,7 +1606,7 @@
           <a:p>
             <a:fld id="{9989B3A2-2388-44BE-9854-4BCC09CB1095}" type="datetimeFigureOut">
               <a:rPr lang="en-US" smtClean="0"/>
-              <a:t>12/17/2023</a:t>
+              <a:t>1/15/2024</a:t>
             </a:fld>
             <a:endParaRPr lang="en-US"/>
           </a:p>
@@ -1657,7 +1657,7 @@
     </p:spTree>
     <p:extLst>
       <p:ext uri="{BB962C8B-B14F-4D97-AF65-F5344CB8AC3E}">
-        <p14:creationId xmlns:p14="http://schemas.microsoft.com/office/powerpoint/2010/main" val="2980056448"/>
+        <p14:creationId xmlns:p14="http://schemas.microsoft.com/office/powerpoint/2010/main" val="1648259647"/>
       </p:ext>
     </p:extLst>
   </p:cSld>
@@ -1724,7 +1724,7 @@
           <a:p>
             <a:fld id="{9989B3A2-2388-44BE-9854-4BCC09CB1095}" type="datetimeFigureOut">
               <a:rPr lang="en-US" smtClean="0"/>
-              <a:t>12/17/2023</a:t>
+              <a:t>1/15/2024</a:t>
             </a:fld>
             <a:endParaRPr lang="en-US"/>
           </a:p>
@@ -1775,7 +1775,7 @@
     </p:spTree>
     <p:extLst>
       <p:ext uri="{BB962C8B-B14F-4D97-AF65-F5344CB8AC3E}">
-        <p14:creationId xmlns:p14="http://schemas.microsoft.com/office/powerpoint/2010/main" val="4003538736"/>
+        <p14:creationId xmlns:p14="http://schemas.microsoft.com/office/powerpoint/2010/main" val="3031704273"/>
       </p:ext>
     </p:extLst>
   </p:cSld>
@@ -1819,7 +1819,7 @@
           <a:p>
             <a:fld id="{9989B3A2-2388-44BE-9854-4BCC09CB1095}" type="datetimeFigureOut">
               <a:rPr lang="en-US" smtClean="0"/>
-              <a:t>12/17/2023</a:t>
+              <a:t>1/15/2024</a:t>
             </a:fld>
             <a:endParaRPr lang="en-US"/>
           </a:p>
@@ -1870,7 +1870,7 @@
     </p:spTree>
     <p:extLst>
       <p:ext uri="{BB962C8B-B14F-4D97-AF65-F5344CB8AC3E}">
-        <p14:creationId xmlns:p14="http://schemas.microsoft.com/office/powerpoint/2010/main" val="1464905005"/>
+        <p14:creationId xmlns:p14="http://schemas.microsoft.com/office/powerpoint/2010/main" val="2151955738"/>
       </p:ext>
     </p:extLst>
   </p:cSld>
@@ -1909,15 +1909,15 @@
         </p:nvSpPr>
         <p:spPr>
           <a:xfrm>
-            <a:off x="1391992" y="1005840"/>
-            <a:ext cx="6517888" cy="3520440"/>
+            <a:off x="1612437" y="1280160"/>
+            <a:ext cx="7550100" cy="4480560"/>
           </a:xfrm>
         </p:spPr>
         <p:txBody>
           <a:bodyPr anchor="b"/>
           <a:lstStyle>
             <a:lvl1pPr>
-              <a:defRPr sz="7040"/>
+              <a:defRPr sz="8192"/>
             </a:lvl1pPr>
           </a:lstStyle>
           <a:p>
@@ -1941,39 +1941,39 @@
         </p:nvSpPr>
         <p:spPr>
           <a:xfrm>
-            <a:off x="8591404" y="2172338"/>
-            <a:ext cx="10230743" cy="10721975"/>
+            <a:off x="9951991" y="2764794"/>
+            <a:ext cx="11850945" cy="13646150"/>
           </a:xfrm>
         </p:spPr>
         <p:txBody>
           <a:bodyPr/>
           <a:lstStyle>
             <a:lvl1pPr>
-              <a:defRPr sz="7040"/>
+              <a:defRPr sz="8192"/>
             </a:lvl1pPr>
             <a:lvl2pPr>
-              <a:defRPr sz="6160"/>
+              <a:defRPr sz="7168"/>
             </a:lvl2pPr>
             <a:lvl3pPr>
-              <a:defRPr sz="5280"/>
+              <a:defRPr sz="6144"/>
             </a:lvl3pPr>
             <a:lvl4pPr>
-              <a:defRPr sz="4400"/>
+              <a:defRPr sz="5120"/>
             </a:lvl4pPr>
             <a:lvl5pPr>
-              <a:defRPr sz="4400"/>
+              <a:defRPr sz="5120"/>
             </a:lvl5pPr>
             <a:lvl6pPr>
-              <a:defRPr sz="4400"/>
+              <a:defRPr sz="5120"/>
             </a:lvl6pPr>
             <a:lvl7pPr>
-              <a:defRPr sz="4400"/>
+              <a:defRPr sz="5120"/>
             </a:lvl7pPr>
             <a:lvl8pPr>
-              <a:defRPr sz="4400"/>
+              <a:defRPr sz="5120"/>
             </a:lvl8pPr>
             <a:lvl9pPr>
-              <a:defRPr sz="4400"/>
+              <a:defRPr sz="5120"/>
             </a:lvl9pPr>
           </a:lstStyle>
           <a:p>
@@ -2026,8 +2026,8 @@
         </p:nvSpPr>
         <p:spPr>
           <a:xfrm>
-            <a:off x="1391992" y="4526280"/>
-            <a:ext cx="6517888" cy="8385494"/>
+            <a:off x="1612437" y="5760720"/>
+            <a:ext cx="7550100" cy="10672446"/>
           </a:xfrm>
         </p:spPr>
         <p:txBody>
@@ -2035,39 +2035,39 @@
           <a:lstStyle>
             <a:lvl1pPr marL="0" indent="0">
               <a:buNone/>
-              <a:defRPr sz="3520"/>
+              <a:defRPr sz="4096"/>
             </a:lvl1pPr>
-            <a:lvl2pPr marL="1005840" indent="0">
-              <a:buNone/>
-              <a:defRPr sz="3080"/>
+            <a:lvl2pPr marL="1170478" indent="0">
+              <a:buNone/>
+              <a:defRPr sz="3584"/>
             </a:lvl2pPr>
-            <a:lvl3pPr marL="2011680" indent="0">
-              <a:buNone/>
-              <a:defRPr sz="2640"/>
+            <a:lvl3pPr marL="2340955" indent="0">
+              <a:buNone/>
+              <a:defRPr sz="3072"/>
             </a:lvl3pPr>
-            <a:lvl4pPr marL="3017520" indent="0">
-              <a:buNone/>
-              <a:defRPr sz="2200"/>
+            <a:lvl4pPr marL="3511433" indent="0">
+              <a:buNone/>
+              <a:defRPr sz="2560"/>
             </a:lvl4pPr>
-            <a:lvl5pPr marL="4023360" indent="0">
-              <a:buNone/>
-              <a:defRPr sz="2200"/>
+            <a:lvl5pPr marL="4681911" indent="0">
+              <a:buNone/>
+              <a:defRPr sz="2560"/>
             </a:lvl5pPr>
-            <a:lvl6pPr marL="5029200" indent="0">
-              <a:buNone/>
-              <a:defRPr sz="2200"/>
+            <a:lvl6pPr marL="5852389" indent="0">
+              <a:buNone/>
+              <a:defRPr sz="2560"/>
             </a:lvl6pPr>
-            <a:lvl7pPr marL="6035040" indent="0">
-              <a:buNone/>
-              <a:defRPr sz="2200"/>
+            <a:lvl7pPr marL="7022866" indent="0">
+              <a:buNone/>
+              <a:defRPr sz="2560"/>
             </a:lvl7pPr>
-            <a:lvl8pPr marL="7040880" indent="0">
-              <a:buNone/>
-              <a:defRPr sz="2200"/>
+            <a:lvl8pPr marL="8193344" indent="0">
+              <a:buNone/>
+              <a:defRPr sz="2560"/>
             </a:lvl8pPr>
-            <a:lvl9pPr marL="8046720" indent="0">
-              <a:buNone/>
-              <a:defRPr sz="2200"/>
+            <a:lvl9pPr marL="9363822" indent="0">
+              <a:buNone/>
+              <a:defRPr sz="2560"/>
             </a:lvl9pPr>
           </a:lstStyle>
           <a:p>
@@ -2096,7 +2096,7 @@
           <a:p>
             <a:fld id="{9989B3A2-2388-44BE-9854-4BCC09CB1095}" type="datetimeFigureOut">
               <a:rPr lang="en-US" smtClean="0"/>
-              <a:t>12/17/2023</a:t>
+              <a:t>1/15/2024</a:t>
             </a:fld>
             <a:endParaRPr lang="en-US"/>
           </a:p>
@@ -2147,7 +2147,7 @@
     </p:spTree>
     <p:extLst>
       <p:ext uri="{BB962C8B-B14F-4D97-AF65-F5344CB8AC3E}">
-        <p14:creationId xmlns:p14="http://schemas.microsoft.com/office/powerpoint/2010/main" val="938483629"/>
+        <p14:creationId xmlns:p14="http://schemas.microsoft.com/office/powerpoint/2010/main" val="3487057580"/>
       </p:ext>
     </p:extLst>
   </p:cSld>
@@ -2186,15 +2186,15 @@
         </p:nvSpPr>
         <p:spPr>
           <a:xfrm>
-            <a:off x="1391992" y="1005840"/>
-            <a:ext cx="6517888" cy="3520440"/>
+            <a:off x="1612437" y="1280160"/>
+            <a:ext cx="7550100" cy="4480560"/>
           </a:xfrm>
         </p:spPr>
         <p:txBody>
           <a:bodyPr anchor="b"/>
           <a:lstStyle>
             <a:lvl1pPr>
-              <a:defRPr sz="7040"/>
+              <a:defRPr sz="8192"/>
             </a:lvl1pPr>
           </a:lstStyle>
           <a:p>
@@ -2218,8 +2218,8 @@
         </p:nvSpPr>
         <p:spPr>
           <a:xfrm>
-            <a:off x="8591404" y="2172338"/>
-            <a:ext cx="10230743" cy="10721975"/>
+            <a:off x="9951991" y="2764794"/>
+            <a:ext cx="11850945" cy="13646150"/>
           </a:xfrm>
         </p:spPr>
         <p:txBody>
@@ -2227,39 +2227,39 @@
           <a:lstStyle>
             <a:lvl1pPr marL="0" indent="0">
               <a:buNone/>
-              <a:defRPr sz="7040"/>
+              <a:defRPr sz="8192"/>
             </a:lvl1pPr>
-            <a:lvl2pPr marL="1005840" indent="0">
-              <a:buNone/>
-              <a:defRPr sz="6160"/>
+            <a:lvl2pPr marL="1170478" indent="0">
+              <a:buNone/>
+              <a:defRPr sz="7168"/>
             </a:lvl2pPr>
-            <a:lvl3pPr marL="2011680" indent="0">
-              <a:buNone/>
-              <a:defRPr sz="5280"/>
+            <a:lvl3pPr marL="2340955" indent="0">
+              <a:buNone/>
+              <a:defRPr sz="6144"/>
             </a:lvl3pPr>
-            <a:lvl4pPr marL="3017520" indent="0">
-              <a:buNone/>
-              <a:defRPr sz="4400"/>
+            <a:lvl4pPr marL="3511433" indent="0">
+              <a:buNone/>
+              <a:defRPr sz="5120"/>
             </a:lvl4pPr>
-            <a:lvl5pPr marL="4023360" indent="0">
-              <a:buNone/>
-              <a:defRPr sz="4400"/>
+            <a:lvl5pPr marL="4681911" indent="0">
+              <a:buNone/>
+              <a:defRPr sz="5120"/>
             </a:lvl5pPr>
-            <a:lvl6pPr marL="5029200" indent="0">
-              <a:buNone/>
-              <a:defRPr sz="4400"/>
+            <a:lvl6pPr marL="5852389" indent="0">
+              <a:buNone/>
+              <a:defRPr sz="5120"/>
             </a:lvl6pPr>
-            <a:lvl7pPr marL="6035040" indent="0">
-              <a:buNone/>
-              <a:defRPr sz="4400"/>
+            <a:lvl7pPr marL="7022866" indent="0">
+              <a:buNone/>
+              <a:defRPr sz="5120"/>
             </a:lvl7pPr>
-            <a:lvl8pPr marL="7040880" indent="0">
-              <a:buNone/>
-              <a:defRPr sz="4400"/>
+            <a:lvl8pPr marL="8193344" indent="0">
+              <a:buNone/>
+              <a:defRPr sz="5120"/>
             </a:lvl8pPr>
-            <a:lvl9pPr marL="8046720" indent="0">
-              <a:buNone/>
-              <a:defRPr sz="4400"/>
+            <a:lvl9pPr marL="9363822" indent="0">
+              <a:buNone/>
+              <a:defRPr sz="5120"/>
             </a:lvl9pPr>
           </a:lstStyle>
           <a:p>
@@ -2283,8 +2283,8 @@
         </p:nvSpPr>
         <p:spPr>
           <a:xfrm>
-            <a:off x="1391992" y="4526280"/>
-            <a:ext cx="6517888" cy="8385494"/>
+            <a:off x="1612437" y="5760720"/>
+            <a:ext cx="7550100" cy="10672446"/>
           </a:xfrm>
         </p:spPr>
         <p:txBody>
@@ -2292,39 +2292,39 @@
           <a:lstStyle>
             <a:lvl1pPr marL="0" indent="0">
               <a:buNone/>
-              <a:defRPr sz="3520"/>
+              <a:defRPr sz="4096"/>
             </a:lvl1pPr>
-            <a:lvl2pPr marL="1005840" indent="0">
-              <a:buNone/>
-              <a:defRPr sz="3080"/>
+            <a:lvl2pPr marL="1170478" indent="0">
+              <a:buNone/>
+              <a:defRPr sz="3584"/>
             </a:lvl2pPr>
-            <a:lvl3pPr marL="2011680" indent="0">
-              <a:buNone/>
-              <a:defRPr sz="2640"/>
+            <a:lvl3pPr marL="2340955" indent="0">
+              <a:buNone/>
+              <a:defRPr sz="3072"/>
             </a:lvl3pPr>
-            <a:lvl4pPr marL="3017520" indent="0">
-              <a:buNone/>
-              <a:defRPr sz="2200"/>
+            <a:lvl4pPr marL="3511433" indent="0">
+              <a:buNone/>
+              <a:defRPr sz="2560"/>
             </a:lvl4pPr>
-            <a:lvl5pPr marL="4023360" indent="0">
-              <a:buNone/>
-              <a:defRPr sz="2200"/>
+            <a:lvl5pPr marL="4681911" indent="0">
+              <a:buNone/>
+              <a:defRPr sz="2560"/>
             </a:lvl5pPr>
-            <a:lvl6pPr marL="5029200" indent="0">
-              <a:buNone/>
-              <a:defRPr sz="2200"/>
+            <a:lvl6pPr marL="5852389" indent="0">
+              <a:buNone/>
+              <a:defRPr sz="2560"/>
             </a:lvl6pPr>
-            <a:lvl7pPr marL="6035040" indent="0">
-              <a:buNone/>
-              <a:defRPr sz="2200"/>
+            <a:lvl7pPr marL="7022866" indent="0">
+              <a:buNone/>
+              <a:defRPr sz="2560"/>
             </a:lvl7pPr>
-            <a:lvl8pPr marL="7040880" indent="0">
-              <a:buNone/>
-              <a:defRPr sz="2200"/>
+            <a:lvl8pPr marL="8193344" indent="0">
+              <a:buNone/>
+              <a:defRPr sz="2560"/>
             </a:lvl8pPr>
-            <a:lvl9pPr marL="8046720" indent="0">
-              <a:buNone/>
-              <a:defRPr sz="2200"/>
+            <a:lvl9pPr marL="9363822" indent="0">
+              <a:buNone/>
+              <a:defRPr sz="2560"/>
             </a:lvl9pPr>
           </a:lstStyle>
           <a:p>
@@ -2353,7 +2353,7 @@
           <a:p>
             <a:fld id="{9989B3A2-2388-44BE-9854-4BCC09CB1095}" type="datetimeFigureOut">
               <a:rPr lang="en-US" smtClean="0"/>
-              <a:t>12/17/2023</a:t>
+              <a:t>1/15/2024</a:t>
             </a:fld>
             <a:endParaRPr lang="en-US"/>
           </a:p>
@@ -2404,7 +2404,7 @@
     </p:spTree>
     <p:extLst>
       <p:ext uri="{BB962C8B-B14F-4D97-AF65-F5344CB8AC3E}">
-        <p14:creationId xmlns:p14="http://schemas.microsoft.com/office/powerpoint/2010/main" val="949309237"/>
+        <p14:creationId xmlns:p14="http://schemas.microsoft.com/office/powerpoint/2010/main" val="4059251474"/>
       </p:ext>
     </p:extLst>
   </p:cSld>
@@ -2448,8 +2448,8 @@
         </p:nvSpPr>
         <p:spPr>
           <a:xfrm>
-            <a:off x="1389360" y="803278"/>
-            <a:ext cx="17430155" cy="2916239"/>
+            <a:off x="1609388" y="1022354"/>
+            <a:ext cx="20190500" cy="3711576"/>
           </a:xfrm>
           <a:prstGeom prst="rect">
             <a:avLst/>
@@ -2481,8 +2481,8 @@
         </p:nvSpPr>
         <p:spPr>
           <a:xfrm>
-            <a:off x="1389360" y="4016375"/>
-            <a:ext cx="17430155" cy="9572944"/>
+            <a:off x="1609388" y="5111750"/>
+            <a:ext cx="20190500" cy="12183746"/>
           </a:xfrm>
           <a:prstGeom prst="rect">
             <a:avLst/>
@@ -2543,8 +2543,8 @@
         </p:nvSpPr>
         <p:spPr>
           <a:xfrm>
-            <a:off x="1389360" y="13983973"/>
-            <a:ext cx="4546997" cy="803275"/>
+            <a:off x="1609388" y="17797784"/>
+            <a:ext cx="5267087" cy="1022350"/>
           </a:xfrm>
           <a:prstGeom prst="rect">
             <a:avLst/>
@@ -2554,7 +2554,7 @@
           <a:bodyPr vert="horz" lIns="91440" tIns="45720" rIns="91440" bIns="45720" rtlCol="0" anchor="ctr"/>
           <a:lstStyle>
             <a:lvl1pPr algn="l">
-              <a:defRPr sz="2640">
+              <a:defRPr sz="3072">
                 <a:solidFill>
                   <a:schemeClr val="tx1">
                     <a:tint val="75000"/>
@@ -2566,7 +2566,7 @@
           <a:p>
             <a:fld id="{9989B3A2-2388-44BE-9854-4BCC09CB1095}" type="datetimeFigureOut">
               <a:rPr lang="en-US" smtClean="0"/>
-              <a:t>12/17/2023</a:t>
+              <a:t>1/15/2024</a:t>
             </a:fld>
             <a:endParaRPr lang="en-US"/>
           </a:p>
@@ -2584,8 +2584,8 @@
         </p:nvSpPr>
         <p:spPr>
           <a:xfrm>
-            <a:off x="6694190" y="13983973"/>
-            <a:ext cx="6820495" cy="803275"/>
+            <a:off x="7754323" y="17797784"/>
+            <a:ext cx="7900630" cy="1022350"/>
           </a:xfrm>
           <a:prstGeom prst="rect">
             <a:avLst/>
@@ -2595,7 +2595,7 @@
           <a:bodyPr vert="horz" lIns="91440" tIns="45720" rIns="91440" bIns="45720" rtlCol="0" anchor="ctr"/>
           <a:lstStyle>
             <a:lvl1pPr algn="ctr">
-              <a:defRPr sz="2640">
+              <a:defRPr sz="3072">
                 <a:solidFill>
                   <a:schemeClr val="tx1">
                     <a:tint val="75000"/>
@@ -2621,8 +2621,8 @@
         </p:nvSpPr>
         <p:spPr>
           <a:xfrm>
-            <a:off x="14272518" y="13983973"/>
-            <a:ext cx="4546997" cy="803275"/>
+            <a:off x="16532800" y="17797784"/>
+            <a:ext cx="5267087" cy="1022350"/>
           </a:xfrm>
           <a:prstGeom prst="rect">
             <a:avLst/>
@@ -2632,7 +2632,7 @@
           <a:bodyPr vert="horz" lIns="91440" tIns="45720" rIns="91440" bIns="45720" rtlCol="0" anchor="ctr"/>
           <a:lstStyle>
             <a:lvl1pPr algn="r">
-              <a:defRPr sz="2640">
+              <a:defRPr sz="3072">
                 <a:solidFill>
                   <a:schemeClr val="tx1">
                     <a:tint val="75000"/>
@@ -2653,27 +2653,27 @@
     </p:spTree>
     <p:extLst>
       <p:ext uri="{BB962C8B-B14F-4D97-AF65-F5344CB8AC3E}">
-        <p14:creationId xmlns:p14="http://schemas.microsoft.com/office/powerpoint/2010/main" val="640368632"/>
+        <p14:creationId xmlns:p14="http://schemas.microsoft.com/office/powerpoint/2010/main" val="682669044"/>
       </p:ext>
     </p:extLst>
   </p:cSld>
   <p:clrMap bg1="lt1" tx1="dk1" bg2="lt2" tx2="dk2" accent1="accent1" accent2="accent2" accent3="accent3" accent4="accent4" accent5="accent5" accent6="accent6" hlink="hlink" folHlink="folHlink"/>
   <p:sldLayoutIdLst>
-    <p:sldLayoutId id="2147483685" r:id="rId1"/>
-    <p:sldLayoutId id="2147483686" r:id="rId2"/>
-    <p:sldLayoutId id="2147483687" r:id="rId3"/>
-    <p:sldLayoutId id="2147483688" r:id="rId4"/>
-    <p:sldLayoutId id="2147483689" r:id="rId5"/>
-    <p:sldLayoutId id="2147483690" r:id="rId6"/>
-    <p:sldLayoutId id="2147483691" r:id="rId7"/>
-    <p:sldLayoutId id="2147483692" r:id="rId8"/>
-    <p:sldLayoutId id="2147483693" r:id="rId9"/>
-    <p:sldLayoutId id="2147483694" r:id="rId10"/>
-    <p:sldLayoutId id="2147483695" r:id="rId11"/>
+    <p:sldLayoutId id="2147483721" r:id="rId1"/>
+    <p:sldLayoutId id="2147483722" r:id="rId2"/>
+    <p:sldLayoutId id="2147483723" r:id="rId3"/>
+    <p:sldLayoutId id="2147483724" r:id="rId4"/>
+    <p:sldLayoutId id="2147483725" r:id="rId5"/>
+    <p:sldLayoutId id="2147483726" r:id="rId6"/>
+    <p:sldLayoutId id="2147483727" r:id="rId7"/>
+    <p:sldLayoutId id="2147483728" r:id="rId8"/>
+    <p:sldLayoutId id="2147483729" r:id="rId9"/>
+    <p:sldLayoutId id="2147483730" r:id="rId10"/>
+    <p:sldLayoutId id="2147483731" r:id="rId11"/>
   </p:sldLayoutIdLst>
   <p:txStyles>
     <p:titleStyle>
-      <a:lvl1pPr algn="l" defTabSz="2011680" rtl="0" eaLnBrk="1" latinLnBrk="0" hangingPunct="1">
+      <a:lvl1pPr algn="l" defTabSz="2340955" rtl="0" eaLnBrk="1" latinLnBrk="0" hangingPunct="1">
         <a:lnSpc>
           <a:spcPct val="90000"/>
         </a:lnSpc>
@@ -2681,7 +2681,7 @@
           <a:spcPct val="0"/>
         </a:spcBef>
         <a:buNone/>
-        <a:defRPr sz="9680" kern="1200">
+        <a:defRPr sz="11264" kern="1200">
           <a:solidFill>
             <a:schemeClr val="tx1"/>
           </a:solidFill>
@@ -2692,16 +2692,16 @@
       </a:lvl1pPr>
     </p:titleStyle>
     <p:bodyStyle>
-      <a:lvl1pPr marL="502920" indent="-502920" algn="l" defTabSz="2011680" rtl="0" eaLnBrk="1" latinLnBrk="0" hangingPunct="1">
+      <a:lvl1pPr marL="585239" indent="-585239" algn="l" defTabSz="2340955" rtl="0" eaLnBrk="1" latinLnBrk="0" hangingPunct="1">
         <a:lnSpc>
           <a:spcPct val="90000"/>
         </a:lnSpc>
         <a:spcBef>
-          <a:spcPts val="2200"/>
+          <a:spcPts val="2560"/>
         </a:spcBef>
         <a:buFont typeface="Arial" panose="020B0604020202020204" pitchFamily="34" charset="0"/>
         <a:buChar char="•"/>
-        <a:defRPr sz="6160" kern="1200">
+        <a:defRPr sz="7168" kern="1200">
           <a:solidFill>
             <a:schemeClr val="tx1"/>
           </a:solidFill>
@@ -2710,16 +2710,16 @@
           <a:cs typeface="+mn-cs"/>
         </a:defRPr>
       </a:lvl1pPr>
-      <a:lvl2pPr marL="1508760" indent="-502920" algn="l" defTabSz="2011680" rtl="0" eaLnBrk="1" latinLnBrk="0" hangingPunct="1">
+      <a:lvl2pPr marL="1755717" indent="-585239" algn="l" defTabSz="2340955" rtl="0" eaLnBrk="1" latinLnBrk="0" hangingPunct="1">
         <a:lnSpc>
           <a:spcPct val="90000"/>
         </a:lnSpc>
         <a:spcBef>
-          <a:spcPts val="1100"/>
+          <a:spcPts val="1280"/>
         </a:spcBef>
         <a:buFont typeface="Arial" panose="020B0604020202020204" pitchFamily="34" charset="0"/>
         <a:buChar char="•"/>
-        <a:defRPr sz="5280" kern="1200">
+        <a:defRPr sz="6144" kern="1200">
           <a:solidFill>
             <a:schemeClr val="tx1"/>
           </a:solidFill>
@@ -2728,16 +2728,16 @@
           <a:cs typeface="+mn-cs"/>
         </a:defRPr>
       </a:lvl2pPr>
-      <a:lvl3pPr marL="2514600" indent="-502920" algn="l" defTabSz="2011680" rtl="0" eaLnBrk="1" latinLnBrk="0" hangingPunct="1">
+      <a:lvl3pPr marL="2926194" indent="-585239" algn="l" defTabSz="2340955" rtl="0" eaLnBrk="1" latinLnBrk="0" hangingPunct="1">
         <a:lnSpc>
           <a:spcPct val="90000"/>
         </a:lnSpc>
         <a:spcBef>
-          <a:spcPts val="1100"/>
+          <a:spcPts val="1280"/>
         </a:spcBef>
         <a:buFont typeface="Arial" panose="020B0604020202020204" pitchFamily="34" charset="0"/>
         <a:buChar char="•"/>
-        <a:defRPr sz="4400" kern="1200">
+        <a:defRPr sz="5120" kern="1200">
           <a:solidFill>
             <a:schemeClr val="tx1"/>
           </a:solidFill>
@@ -2746,16 +2746,16 @@
           <a:cs typeface="+mn-cs"/>
         </a:defRPr>
       </a:lvl3pPr>
-      <a:lvl4pPr marL="3520440" indent="-502920" algn="l" defTabSz="2011680" rtl="0" eaLnBrk="1" latinLnBrk="0" hangingPunct="1">
+      <a:lvl4pPr marL="4096672" indent="-585239" algn="l" defTabSz="2340955" rtl="0" eaLnBrk="1" latinLnBrk="0" hangingPunct="1">
         <a:lnSpc>
           <a:spcPct val="90000"/>
         </a:lnSpc>
         <a:spcBef>
-          <a:spcPts val="1100"/>
+          <a:spcPts val="1280"/>
         </a:spcBef>
         <a:buFont typeface="Arial" panose="020B0604020202020204" pitchFamily="34" charset="0"/>
         <a:buChar char="•"/>
-        <a:defRPr sz="3960" kern="1200">
+        <a:defRPr sz="4608" kern="1200">
           <a:solidFill>
             <a:schemeClr val="tx1"/>
           </a:solidFill>
@@ -2764,16 +2764,16 @@
           <a:cs typeface="+mn-cs"/>
         </a:defRPr>
       </a:lvl4pPr>
-      <a:lvl5pPr marL="4526280" indent="-502920" algn="l" defTabSz="2011680" rtl="0" eaLnBrk="1" latinLnBrk="0" hangingPunct="1">
+      <a:lvl5pPr marL="5267150" indent="-585239" algn="l" defTabSz="2340955" rtl="0" eaLnBrk="1" latinLnBrk="0" hangingPunct="1">
         <a:lnSpc>
           <a:spcPct val="90000"/>
         </a:lnSpc>
         <a:spcBef>
-          <a:spcPts val="1100"/>
+          <a:spcPts val="1280"/>
         </a:spcBef>
         <a:buFont typeface="Arial" panose="020B0604020202020204" pitchFamily="34" charset="0"/>
         <a:buChar char="•"/>
-        <a:defRPr sz="3960" kern="1200">
+        <a:defRPr sz="4608" kern="1200">
           <a:solidFill>
             <a:schemeClr val="tx1"/>
           </a:solidFill>
@@ -2782,16 +2782,16 @@
           <a:cs typeface="+mn-cs"/>
         </a:defRPr>
       </a:lvl5pPr>
-      <a:lvl6pPr marL="5532120" indent="-502920" algn="l" defTabSz="2011680" rtl="0" eaLnBrk="1" latinLnBrk="0" hangingPunct="1">
+      <a:lvl6pPr marL="6437627" indent="-585239" algn="l" defTabSz="2340955" rtl="0" eaLnBrk="1" latinLnBrk="0" hangingPunct="1">
         <a:lnSpc>
           <a:spcPct val="90000"/>
         </a:lnSpc>
         <a:spcBef>
-          <a:spcPts val="1100"/>
+          <a:spcPts val="1280"/>
         </a:spcBef>
         <a:buFont typeface="Arial" panose="020B0604020202020204" pitchFamily="34" charset="0"/>
         <a:buChar char="•"/>
-        <a:defRPr sz="3960" kern="1200">
+        <a:defRPr sz="4608" kern="1200">
           <a:solidFill>
             <a:schemeClr val="tx1"/>
           </a:solidFill>
@@ -2800,16 +2800,16 @@
           <a:cs typeface="+mn-cs"/>
         </a:defRPr>
       </a:lvl6pPr>
-      <a:lvl7pPr marL="6537960" indent="-502920" algn="l" defTabSz="2011680" rtl="0" eaLnBrk="1" latinLnBrk="0" hangingPunct="1">
+      <a:lvl7pPr marL="7608105" indent="-585239" algn="l" defTabSz="2340955" rtl="0" eaLnBrk="1" latinLnBrk="0" hangingPunct="1">
         <a:lnSpc>
           <a:spcPct val="90000"/>
         </a:lnSpc>
         <a:spcBef>
-          <a:spcPts val="1100"/>
+          <a:spcPts val="1280"/>
         </a:spcBef>
         <a:buFont typeface="Arial" panose="020B0604020202020204" pitchFamily="34" charset="0"/>
         <a:buChar char="•"/>
-        <a:defRPr sz="3960" kern="1200">
+        <a:defRPr sz="4608" kern="1200">
           <a:solidFill>
             <a:schemeClr val="tx1"/>
           </a:solidFill>
@@ -2818,16 +2818,16 @@
           <a:cs typeface="+mn-cs"/>
         </a:defRPr>
       </a:lvl7pPr>
-      <a:lvl8pPr marL="7543800" indent="-502920" algn="l" defTabSz="2011680" rtl="0" eaLnBrk="1" latinLnBrk="0" hangingPunct="1">
+      <a:lvl8pPr marL="8778583" indent="-585239" algn="l" defTabSz="2340955" rtl="0" eaLnBrk="1" latinLnBrk="0" hangingPunct="1">
         <a:lnSpc>
           <a:spcPct val="90000"/>
         </a:lnSpc>
         <a:spcBef>
-          <a:spcPts val="1100"/>
+          <a:spcPts val="1280"/>
         </a:spcBef>
         <a:buFont typeface="Arial" panose="020B0604020202020204" pitchFamily="34" charset="0"/>
         <a:buChar char="•"/>
-        <a:defRPr sz="3960" kern="1200">
+        <a:defRPr sz="4608" kern="1200">
           <a:solidFill>
             <a:schemeClr val="tx1"/>
           </a:solidFill>
@@ -2836,16 +2836,16 @@
           <a:cs typeface="+mn-cs"/>
         </a:defRPr>
       </a:lvl8pPr>
-      <a:lvl9pPr marL="8549640" indent="-502920" algn="l" defTabSz="2011680" rtl="0" eaLnBrk="1" latinLnBrk="0" hangingPunct="1">
+      <a:lvl9pPr marL="9949061" indent="-585239" algn="l" defTabSz="2340955" rtl="0" eaLnBrk="1" latinLnBrk="0" hangingPunct="1">
         <a:lnSpc>
           <a:spcPct val="90000"/>
         </a:lnSpc>
         <a:spcBef>
-          <a:spcPts val="1100"/>
+          <a:spcPts val="1280"/>
         </a:spcBef>
         <a:buFont typeface="Arial" panose="020B0604020202020204" pitchFamily="34" charset="0"/>
         <a:buChar char="•"/>
-        <a:defRPr sz="3960" kern="1200">
+        <a:defRPr sz="4608" kern="1200">
           <a:solidFill>
             <a:schemeClr val="tx1"/>
           </a:solidFill>
@@ -2859,8 +2859,8 @@
       <a:defPPr>
         <a:defRPr lang="en-US"/>
       </a:defPPr>
-      <a:lvl1pPr marL="0" algn="l" defTabSz="2011680" rtl="0" eaLnBrk="1" latinLnBrk="0" hangingPunct="1">
-        <a:defRPr sz="3960" kern="1200">
+      <a:lvl1pPr marL="0" algn="l" defTabSz="2340955" rtl="0" eaLnBrk="1" latinLnBrk="0" hangingPunct="1">
+        <a:defRPr sz="4608" kern="1200">
           <a:solidFill>
             <a:schemeClr val="tx1"/>
           </a:solidFill>
@@ -2869,8 +2869,8 @@
           <a:cs typeface="+mn-cs"/>
         </a:defRPr>
       </a:lvl1pPr>
-      <a:lvl2pPr marL="1005840" algn="l" defTabSz="2011680" rtl="0" eaLnBrk="1" latinLnBrk="0" hangingPunct="1">
-        <a:defRPr sz="3960" kern="1200">
+      <a:lvl2pPr marL="1170478" algn="l" defTabSz="2340955" rtl="0" eaLnBrk="1" latinLnBrk="0" hangingPunct="1">
+        <a:defRPr sz="4608" kern="1200">
           <a:solidFill>
             <a:schemeClr val="tx1"/>
           </a:solidFill>
@@ -2879,8 +2879,8 @@
           <a:cs typeface="+mn-cs"/>
         </a:defRPr>
       </a:lvl2pPr>
-      <a:lvl3pPr marL="2011680" algn="l" defTabSz="2011680" rtl="0" eaLnBrk="1" latinLnBrk="0" hangingPunct="1">
-        <a:defRPr sz="3960" kern="1200">
+      <a:lvl3pPr marL="2340955" algn="l" defTabSz="2340955" rtl="0" eaLnBrk="1" latinLnBrk="0" hangingPunct="1">
+        <a:defRPr sz="4608" kern="1200">
           <a:solidFill>
             <a:schemeClr val="tx1"/>
           </a:solidFill>
@@ -2889,8 +2889,8 @@
           <a:cs typeface="+mn-cs"/>
         </a:defRPr>
       </a:lvl3pPr>
-      <a:lvl4pPr marL="3017520" algn="l" defTabSz="2011680" rtl="0" eaLnBrk="1" latinLnBrk="0" hangingPunct="1">
-        <a:defRPr sz="3960" kern="1200">
+      <a:lvl4pPr marL="3511433" algn="l" defTabSz="2340955" rtl="0" eaLnBrk="1" latinLnBrk="0" hangingPunct="1">
+        <a:defRPr sz="4608" kern="1200">
           <a:solidFill>
             <a:schemeClr val="tx1"/>
           </a:solidFill>
@@ -2899,8 +2899,8 @@
           <a:cs typeface="+mn-cs"/>
         </a:defRPr>
       </a:lvl4pPr>
-      <a:lvl5pPr marL="4023360" algn="l" defTabSz="2011680" rtl="0" eaLnBrk="1" latinLnBrk="0" hangingPunct="1">
-        <a:defRPr sz="3960" kern="1200">
+      <a:lvl5pPr marL="4681911" algn="l" defTabSz="2340955" rtl="0" eaLnBrk="1" latinLnBrk="0" hangingPunct="1">
+        <a:defRPr sz="4608" kern="1200">
           <a:solidFill>
             <a:schemeClr val="tx1"/>
           </a:solidFill>
@@ -2909,8 +2909,8 @@
           <a:cs typeface="+mn-cs"/>
         </a:defRPr>
       </a:lvl5pPr>
-      <a:lvl6pPr marL="5029200" algn="l" defTabSz="2011680" rtl="0" eaLnBrk="1" latinLnBrk="0" hangingPunct="1">
-        <a:defRPr sz="3960" kern="1200">
+      <a:lvl6pPr marL="5852389" algn="l" defTabSz="2340955" rtl="0" eaLnBrk="1" latinLnBrk="0" hangingPunct="1">
+        <a:defRPr sz="4608" kern="1200">
           <a:solidFill>
             <a:schemeClr val="tx1"/>
           </a:solidFill>
@@ -2919,8 +2919,8 @@
           <a:cs typeface="+mn-cs"/>
         </a:defRPr>
       </a:lvl6pPr>
-      <a:lvl7pPr marL="6035040" algn="l" defTabSz="2011680" rtl="0" eaLnBrk="1" latinLnBrk="0" hangingPunct="1">
-        <a:defRPr sz="3960" kern="1200">
+      <a:lvl7pPr marL="7022866" algn="l" defTabSz="2340955" rtl="0" eaLnBrk="1" latinLnBrk="0" hangingPunct="1">
+        <a:defRPr sz="4608" kern="1200">
           <a:solidFill>
             <a:schemeClr val="tx1"/>
           </a:solidFill>
@@ -2929,8 +2929,8 @@
           <a:cs typeface="+mn-cs"/>
         </a:defRPr>
       </a:lvl7pPr>
-      <a:lvl8pPr marL="7040880" algn="l" defTabSz="2011680" rtl="0" eaLnBrk="1" latinLnBrk="0" hangingPunct="1">
-        <a:defRPr sz="3960" kern="1200">
+      <a:lvl8pPr marL="8193344" algn="l" defTabSz="2340955" rtl="0" eaLnBrk="1" latinLnBrk="0" hangingPunct="1">
+        <a:defRPr sz="4608" kern="1200">
           <a:solidFill>
             <a:schemeClr val="tx1"/>
           </a:solidFill>
@@ -2939,8 +2939,8 @@
           <a:cs typeface="+mn-cs"/>
         </a:defRPr>
       </a:lvl8pPr>
-      <a:lvl9pPr marL="8046720" algn="l" defTabSz="2011680" rtl="0" eaLnBrk="1" latinLnBrk="0" hangingPunct="1">
-        <a:defRPr sz="3960" kern="1200">
+      <a:lvl9pPr marL="9363822" algn="l" defTabSz="2340955" rtl="0" eaLnBrk="1" latinLnBrk="0" hangingPunct="1">
+        <a:defRPr sz="4608" kern="1200">
           <a:solidFill>
             <a:schemeClr val="tx1"/>
           </a:solidFill>
@@ -2971,152 +2971,12 @@
           <a:chExt cx="0" cy="0"/>
         </a:xfrm>
       </p:grpSpPr>
-      <p:pic>
-        <p:nvPicPr>
-          <p:cNvPr id="8" name="Picture 7" descr="A collage of graphs&#10;&#10;Description automatically generated">
+      <p:grpSp>
+        <p:nvGrpSpPr>
+          <p:cNvPr id="29" name="Group 28">
             <a:extLst>
               <a:ext uri="{FF2B5EF4-FFF2-40B4-BE49-F238E27FC236}">
-                <a16:creationId xmlns:a16="http://schemas.microsoft.com/office/drawing/2014/main" id="{0AC0009E-8ED7-4894-DE3E-8014FDFCA2CD}"/>
-              </a:ext>
-            </a:extLst>
-          </p:cNvPr>
-          <p:cNvPicPr>
-            <a:picLocks noChangeAspect="1"/>
-          </p:cNvPicPr>
-          <p:nvPr/>
-        </p:nvPicPr>
-        <p:blipFill rotWithShape="1">
-          <a:blip r:embed="rId2">
-            <a:extLst>
-              <a:ext uri="{28A0092B-C50C-407E-A947-70E740481C1C}">
-                <a14:useLocalDpi xmlns:a14="http://schemas.microsoft.com/office/drawing/2010/main" val="0"/>
-              </a:ext>
-            </a:extLst>
-          </a:blip>
-          <a:srcRect t="66158" r="50547"/>
-          <a:stretch/>
-        </p:blipFill>
-        <p:spPr>
-          <a:xfrm>
-            <a:off x="767675" y="10364047"/>
-            <a:ext cx="9134131" cy="4688086"/>
-          </a:xfrm>
-          <a:prstGeom prst="rect">
-            <a:avLst/>
-          </a:prstGeom>
-        </p:spPr>
-      </p:pic>
-      <p:pic>
-        <p:nvPicPr>
-          <p:cNvPr id="5" name="Picture 4" descr="A collage of graphs&#10;&#10;Description automatically generated">
-            <a:extLst>
-              <a:ext uri="{FF2B5EF4-FFF2-40B4-BE49-F238E27FC236}">
-                <a16:creationId xmlns:a16="http://schemas.microsoft.com/office/drawing/2014/main" id="{4EE9D7E2-8F20-FA74-04F8-8E498EBBF85B}"/>
-              </a:ext>
-            </a:extLst>
-          </p:cNvPr>
-          <p:cNvPicPr>
-            <a:picLocks noChangeAspect="1"/>
-          </p:cNvPicPr>
-          <p:nvPr/>
-        </p:nvPicPr>
-        <p:blipFill rotWithShape="1">
-          <a:blip r:embed="rId2">
-            <a:extLst>
-              <a:ext uri="{28A0092B-C50C-407E-A947-70E740481C1C}">
-                <a14:useLocalDpi xmlns:a14="http://schemas.microsoft.com/office/drawing/2010/main" val="0"/>
-              </a:ext>
-            </a:extLst>
-          </a:blip>
-          <a:srcRect l="49135" t="66933"/>
-          <a:stretch/>
-        </p:blipFill>
-        <p:spPr>
-          <a:xfrm>
-            <a:off x="9901806" y="10148211"/>
-            <a:ext cx="9394988" cy="4580711"/>
-          </a:xfrm>
-          <a:prstGeom prst="rect">
-            <a:avLst/>
-          </a:prstGeom>
-        </p:spPr>
-      </p:pic>
-      <p:pic>
-        <p:nvPicPr>
-          <p:cNvPr id="9" name="Picture 8" descr="A collage of graphs&#10;&#10;Description automatically generated">
-            <a:extLst>
-              <a:ext uri="{FF2B5EF4-FFF2-40B4-BE49-F238E27FC236}">
-                <a16:creationId xmlns:a16="http://schemas.microsoft.com/office/drawing/2014/main" id="{A1BB55E6-D4E2-5EFB-7446-0FED22307B7C}"/>
-              </a:ext>
-            </a:extLst>
-          </p:cNvPr>
-          <p:cNvPicPr>
-            <a:picLocks noChangeAspect="1"/>
-          </p:cNvPicPr>
-          <p:nvPr/>
-        </p:nvPicPr>
-        <p:blipFill rotWithShape="1">
-          <a:blip r:embed="rId2">
-            <a:extLst>
-              <a:ext uri="{28A0092B-C50C-407E-A947-70E740481C1C}">
-                <a14:useLocalDpi xmlns:a14="http://schemas.microsoft.com/office/drawing/2010/main" val="0"/>
-              </a:ext>
-            </a:extLst>
-          </a:blip>
-          <a:srcRect t="33325" r="15945" b="33608"/>
-          <a:stretch/>
-        </p:blipFill>
-        <p:spPr>
-          <a:xfrm>
-            <a:off x="639725" y="5360632"/>
-            <a:ext cx="15525347" cy="4580710"/>
-          </a:xfrm>
-          <a:prstGeom prst="rect">
-            <a:avLst/>
-          </a:prstGeom>
-        </p:spPr>
-      </p:pic>
-      <p:pic>
-        <p:nvPicPr>
-          <p:cNvPr id="10" name="Picture 9" descr="A collage of graphs&#10;&#10;Description automatically generated">
-            <a:extLst>
-              <a:ext uri="{FF2B5EF4-FFF2-40B4-BE49-F238E27FC236}">
-                <a16:creationId xmlns:a16="http://schemas.microsoft.com/office/drawing/2014/main" id="{C7F9C2E9-F6D4-ED46-CEE9-24C0F0313276}"/>
-              </a:ext>
-            </a:extLst>
-          </p:cNvPr>
-          <p:cNvPicPr>
-            <a:picLocks noChangeAspect="1"/>
-          </p:cNvPicPr>
-          <p:nvPr/>
-        </p:nvPicPr>
-        <p:blipFill rotWithShape="1">
-          <a:blip r:embed="rId2">
-            <a:extLst>
-              <a:ext uri="{28A0092B-C50C-407E-A947-70E740481C1C}">
-                <a14:useLocalDpi xmlns:a14="http://schemas.microsoft.com/office/drawing/2010/main" val="0"/>
-              </a:ext>
-            </a:extLst>
-          </a:blip>
-          <a:srcRect r="15945" b="67492"/>
-          <a:stretch/>
-        </p:blipFill>
-        <p:spPr>
-          <a:xfrm>
-            <a:off x="588137" y="555185"/>
-            <a:ext cx="15525346" cy="4503301"/>
-          </a:xfrm>
-          <a:prstGeom prst="rect">
-            <a:avLst/>
-          </a:prstGeom>
-        </p:spPr>
-      </p:pic>
-      <p:grpSp>
-        <p:nvGrpSpPr>
-          <p:cNvPr id="7" name="Group 6">
-            <a:extLst>
-              <a:ext uri="{FF2B5EF4-FFF2-40B4-BE49-F238E27FC236}">
-                <a16:creationId xmlns:a16="http://schemas.microsoft.com/office/drawing/2014/main" id="{B7F00C9A-50F7-CE98-D92D-93781964996E}"/>
+                <a16:creationId xmlns:a16="http://schemas.microsoft.com/office/drawing/2014/main" id="{4ED352B1-8471-138B-DD03-8FB44E698C80}"/>
               </a:ext>
             </a:extLst>
           </p:cNvPr>
@@ -3125,18 +2985,18 @@
         </p:nvGrpSpPr>
         <p:grpSpPr>
           <a:xfrm>
-            <a:off x="636366" y="478261"/>
-            <a:ext cx="13176648" cy="10140479"/>
-            <a:chOff x="292422" y="0"/>
-            <a:chExt cx="13176648" cy="10140479"/>
+            <a:off x="388593" y="743570"/>
+            <a:ext cx="22632088" cy="17715260"/>
+            <a:chOff x="329750" y="486382"/>
+            <a:chExt cx="22632088" cy="17715260"/>
           </a:xfrm>
         </p:grpSpPr>
         <p:pic>
           <p:nvPicPr>
-            <p:cNvPr id="22" name="Picture 21">
+            <p:cNvPr id="8" name="Picture 7" descr="A collage of graphs and diagrams&#10;&#10;Description automatically generated">
               <a:extLst>
                 <a:ext uri="{FF2B5EF4-FFF2-40B4-BE49-F238E27FC236}">
-                  <a16:creationId xmlns:a16="http://schemas.microsoft.com/office/drawing/2014/main" id="{860B0FC7-9579-8A13-6C92-20AA193D1264}"/>
+                  <a16:creationId xmlns:a16="http://schemas.microsoft.com/office/drawing/2014/main" id="{A5F046DD-3009-235D-442A-8034DA2F7AC7}"/>
                 </a:ext>
               </a:extLst>
             </p:cNvPr>
@@ -3145,22 +3005,164 @@
             </p:cNvPicPr>
             <p:nvPr/>
           </p:nvPicPr>
-          <p:blipFill>
-            <a:blip r:embed="rId3"/>
-            <a:stretch>
-              <a:fillRect/>
-            </a:stretch>
+          <p:blipFill rotWithShape="1">
+            <a:blip r:embed="rId2">
+              <a:extLst>
+                <a:ext uri="{28A0092B-C50C-407E-A947-70E740481C1C}">
+                  <a14:useLocalDpi xmlns:a14="http://schemas.microsoft.com/office/drawing/2010/main" val="0"/>
+                </a:ext>
+              </a:extLst>
+            </a:blip>
+            <a:srcRect t="32879" r="16706" b="33682"/>
+            <a:stretch/>
           </p:blipFill>
           <p:spPr>
             <a:xfrm>
-              <a:off x="12026483" y="6890136"/>
-              <a:ext cx="1442587" cy="1669510"/>
+              <a:off x="586738" y="6504242"/>
+              <a:ext cx="18480612" cy="5564389"/>
             </a:xfrm>
-            <a:prstGeom prst="corner">
-              <a:avLst>
-                <a:gd name="adj1" fmla="val 50000"/>
-                <a:gd name="adj2" fmla="val 61608"/>
-              </a:avLst>
+            <a:prstGeom prst="rect">
+              <a:avLst/>
+            </a:prstGeom>
+          </p:spPr>
+        </p:pic>
+        <p:pic>
+          <p:nvPicPr>
+            <p:cNvPr id="12" name="Picture 11" descr="A collage of graphs and diagrams&#10;&#10;Description automatically generated">
+              <a:extLst>
+                <a:ext uri="{FF2B5EF4-FFF2-40B4-BE49-F238E27FC236}">
+                  <a16:creationId xmlns:a16="http://schemas.microsoft.com/office/drawing/2014/main" id="{75A9D681-6545-C058-6441-375D8784E9F8}"/>
+                </a:ext>
+              </a:extLst>
+            </p:cNvPr>
+            <p:cNvPicPr>
+              <a:picLocks noChangeAspect="1"/>
+            </p:cNvPicPr>
+            <p:nvPr/>
+          </p:nvPicPr>
+          <p:blipFill rotWithShape="1">
+            <a:blip r:embed="rId2">
+              <a:extLst>
+                <a:ext uri="{28A0092B-C50C-407E-A947-70E740481C1C}">
+                  <a14:useLocalDpi xmlns:a14="http://schemas.microsoft.com/office/drawing/2010/main" val="0"/>
+                </a:ext>
+              </a:extLst>
+            </a:blip>
+            <a:srcRect r="16706" b="66561"/>
+            <a:stretch/>
+          </p:blipFill>
+          <p:spPr>
+            <a:xfrm>
+              <a:off x="586738" y="939853"/>
+              <a:ext cx="18480612" cy="5564389"/>
+            </a:xfrm>
+            <a:prstGeom prst="rect">
+              <a:avLst/>
+            </a:prstGeom>
+          </p:spPr>
+        </p:pic>
+        <p:pic>
+          <p:nvPicPr>
+            <p:cNvPr id="13" name="Picture 12" descr="A collage of graphs and diagrams&#10;&#10;Description automatically generated">
+              <a:extLst>
+                <a:ext uri="{FF2B5EF4-FFF2-40B4-BE49-F238E27FC236}">
+                  <a16:creationId xmlns:a16="http://schemas.microsoft.com/office/drawing/2014/main" id="{58CF229D-DA55-03C2-11D8-67C383E21943}"/>
+                </a:ext>
+              </a:extLst>
+            </p:cNvPr>
+            <p:cNvPicPr>
+              <a:picLocks noChangeAspect="1"/>
+            </p:cNvPicPr>
+            <p:nvPr/>
+          </p:nvPicPr>
+          <p:blipFill rotWithShape="1">
+            <a:blip r:embed="rId2">
+              <a:extLst>
+                <a:ext uri="{28A0092B-C50C-407E-A947-70E740481C1C}">
+                  <a14:useLocalDpi xmlns:a14="http://schemas.microsoft.com/office/drawing/2010/main" val="0"/>
+                </a:ext>
+              </a:extLst>
+            </a:blip>
+            <a:srcRect l="50037" t="66341"/>
+            <a:stretch/>
+          </p:blipFill>
+          <p:spPr>
+            <a:xfrm>
+              <a:off x="11876494" y="12177998"/>
+              <a:ext cx="11085344" cy="5600969"/>
+            </a:xfrm>
+            <a:prstGeom prst="rect">
+              <a:avLst/>
+            </a:prstGeom>
+          </p:spPr>
+        </p:pic>
+        <p:pic>
+          <p:nvPicPr>
+            <p:cNvPr id="14" name="Picture 13" descr="A collage of graphs and diagrams&#10;&#10;Description automatically generated">
+              <a:extLst>
+                <a:ext uri="{FF2B5EF4-FFF2-40B4-BE49-F238E27FC236}">
+                  <a16:creationId xmlns:a16="http://schemas.microsoft.com/office/drawing/2014/main" id="{80CA01F1-946B-03CD-84D8-2B1F5589C0F9}"/>
+                </a:ext>
+              </a:extLst>
+            </p:cNvPr>
+            <p:cNvPicPr>
+              <a:picLocks noChangeAspect="1"/>
+            </p:cNvPicPr>
+            <p:nvPr/>
+          </p:nvPicPr>
+          <p:blipFill rotWithShape="1">
+            <a:blip r:embed="rId2">
+              <a:extLst>
+                <a:ext uri="{28A0092B-C50C-407E-A947-70E740481C1C}">
+                  <a14:useLocalDpi xmlns:a14="http://schemas.microsoft.com/office/drawing/2010/main" val="0"/>
+                </a:ext>
+              </a:extLst>
+            </a:blip>
+            <a:srcRect t="66903" r="50421"/>
+            <a:stretch/>
+          </p:blipFill>
+          <p:spPr>
+            <a:xfrm>
+              <a:off x="619373" y="12694173"/>
+              <a:ext cx="11000134" cy="5507469"/>
+            </a:xfrm>
+            <a:prstGeom prst="rect">
+              <a:avLst/>
+            </a:prstGeom>
+          </p:spPr>
+        </p:pic>
+        <p:pic>
+          <p:nvPicPr>
+            <p:cNvPr id="15" name="Picture 14" descr="A collage of graphs and diagrams&#10;&#10;Description automatically generated">
+              <a:extLst>
+                <a:ext uri="{FF2B5EF4-FFF2-40B4-BE49-F238E27FC236}">
+                  <a16:creationId xmlns:a16="http://schemas.microsoft.com/office/drawing/2014/main" id="{BC009E0C-FE68-35C3-083B-60EA303E79BF}"/>
+                </a:ext>
+              </a:extLst>
+            </p:cNvPr>
+            <p:cNvPicPr>
+              <a:picLocks noChangeAspect="1"/>
+            </p:cNvPicPr>
+            <p:nvPr/>
+          </p:nvPicPr>
+          <p:blipFill rotWithShape="1">
+            <a:blip r:embed="rId2">
+              <a:extLst>
+                <a:ext uri="{28A0092B-C50C-407E-A947-70E740481C1C}">
+                  <a14:useLocalDpi xmlns:a14="http://schemas.microsoft.com/office/drawing/2010/main" val="0"/>
+                </a:ext>
+              </a:extLst>
+            </a:blip>
+            <a:srcRect l="83605" t="14770" b="46764"/>
+            <a:stretch/>
+          </p:blipFill>
+          <p:spPr>
+            <a:xfrm>
+              <a:off x="19324337" y="3303842"/>
+              <a:ext cx="3637501" cy="6400800"/>
+            </a:xfrm>
+            <a:prstGeom prst="rect">
+              <a:avLst/>
             </a:prstGeom>
           </p:spPr>
         </p:pic>
@@ -3178,8 +3180,8 @@
           </p:nvSpPr>
           <p:spPr>
             <a:xfrm>
-              <a:off x="297185" y="0"/>
-              <a:ext cx="523263" cy="711371"/>
+              <a:off x="329751" y="486382"/>
+              <a:ext cx="513977" cy="908582"/>
             </a:xfrm>
             <a:prstGeom prst="rect">
               <a:avLst/>
@@ -3194,18 +3196,19 @@
             <a:p>
               <a:pPr algn="ctr"/>
               <a:r>
-                <a:rPr lang="en-US" sz="4020" dirty="0"/>
+                <a:rPr lang="en-US" sz="5304" dirty="0"/>
                 <a:t>A</a:t>
               </a:r>
+              <a:endParaRPr lang="en-US" sz="3949" dirty="0"/>
             </a:p>
           </p:txBody>
         </p:sp>
         <p:sp>
           <p:nvSpPr>
-            <p:cNvPr id="19" name="TextBox 18">
+            <p:cNvPr id="26" name="TextBox 25">
               <a:extLst>
                 <a:ext uri="{FF2B5EF4-FFF2-40B4-BE49-F238E27FC236}">
-                  <a16:creationId xmlns:a16="http://schemas.microsoft.com/office/drawing/2014/main" id="{9EC1C235-9F4E-04F8-ED25-31E84C2CCE5C}"/>
+                  <a16:creationId xmlns:a16="http://schemas.microsoft.com/office/drawing/2014/main" id="{7D39908C-CE31-21A8-DB00-AFEF0331C99B}"/>
                 </a:ext>
               </a:extLst>
             </p:cNvPr>
@@ -3214,8 +3217,8 @@
           </p:nvSpPr>
           <p:spPr>
             <a:xfrm>
-              <a:off x="292422" y="9429108"/>
-              <a:ext cx="523263" cy="711371"/>
+              <a:off x="329751" y="6050770"/>
+              <a:ext cx="513977" cy="908582"/>
             </a:xfrm>
             <a:prstGeom prst="rect">
               <a:avLst/>
@@ -3230,18 +3233,19 @@
             <a:p>
               <a:pPr algn="ctr"/>
               <a:r>
-                <a:rPr lang="en-US" sz="4020" dirty="0"/>
-                <a:t>C</a:t>
+                <a:rPr lang="en-US" sz="5304" dirty="0"/>
+                <a:t>B</a:t>
               </a:r>
+              <a:endParaRPr lang="en-US" sz="3949" dirty="0"/>
             </a:p>
           </p:txBody>
         </p:sp>
         <p:sp>
           <p:nvSpPr>
-            <p:cNvPr id="21" name="TextBox 20">
+            <p:cNvPr id="27" name="TextBox 26">
               <a:extLst>
                 <a:ext uri="{FF2B5EF4-FFF2-40B4-BE49-F238E27FC236}">
-                  <a16:creationId xmlns:a16="http://schemas.microsoft.com/office/drawing/2014/main" id="{3BC89755-5100-1D38-B52C-1A6F55FB9794}"/>
+                  <a16:creationId xmlns:a16="http://schemas.microsoft.com/office/drawing/2014/main" id="{8BAD1ED7-FCE5-6566-DDFB-47D6B8EC3C4A}"/>
                 </a:ext>
               </a:extLst>
             </p:cNvPr>
@@ -3250,8 +3254,8 @@
           </p:nvSpPr>
           <p:spPr>
             <a:xfrm>
-              <a:off x="299408" y="4334364"/>
-              <a:ext cx="523263" cy="711371"/>
+              <a:off x="329750" y="11787229"/>
+              <a:ext cx="513977" cy="908582"/>
             </a:xfrm>
             <a:prstGeom prst="rect">
               <a:avLst/>
@@ -3266,84 +3270,130 @@
             <a:p>
               <a:pPr algn="ctr"/>
               <a:r>
-                <a:rPr lang="en-US" sz="4020" dirty="0"/>
-                <a:t>B</a:t>
+                <a:rPr lang="en-US" sz="5304" dirty="0"/>
+                <a:t>C</a:t>
               </a:r>
+              <a:endParaRPr lang="en-US" sz="3949" dirty="0"/>
             </a:p>
           </p:txBody>
         </p:sp>
+        <p:sp>
+          <p:nvSpPr>
+            <p:cNvPr id="28" name="TextBox 27">
+              <a:extLst>
+                <a:ext uri="{FF2B5EF4-FFF2-40B4-BE49-F238E27FC236}">
+                  <a16:creationId xmlns:a16="http://schemas.microsoft.com/office/drawing/2014/main" id="{82DC070A-1510-54D9-1648-0AE7B22A5A1B}"/>
+                </a:ext>
+              </a:extLst>
+            </p:cNvPr>
+            <p:cNvSpPr txBox="1"/>
+            <p:nvPr/>
+          </p:nvSpPr>
+          <p:spPr>
+            <a:xfrm>
+              <a:off x="11390428" y="12013966"/>
+              <a:ext cx="513977" cy="908582"/>
+            </a:xfrm>
+            <a:prstGeom prst="rect">
+              <a:avLst/>
+            </a:prstGeom>
+            <a:noFill/>
+          </p:spPr>
+          <p:txBody>
+            <a:bodyPr wrap="square" rtlCol="0">
+              <a:spAutoFit/>
+            </a:bodyPr>
+            <a:lstStyle/>
+            <a:p>
+              <a:pPr algn="ctr"/>
+              <a:r>
+                <a:rPr lang="en-US" sz="5304" dirty="0"/>
+                <a:t>D</a:t>
+              </a:r>
+              <a:endParaRPr lang="en-US" sz="3949" dirty="0"/>
+            </a:p>
+          </p:txBody>
+        </p:sp>
+        <p:grpSp>
+          <p:nvGrpSpPr>
+            <p:cNvPr id="25" name="Group 24">
+              <a:extLst>
+                <a:ext uri="{FF2B5EF4-FFF2-40B4-BE49-F238E27FC236}">
+                  <a16:creationId xmlns:a16="http://schemas.microsoft.com/office/drawing/2014/main" id="{887C85D4-2441-AAB0-85F3-7EFAB886C64C}"/>
+                </a:ext>
+              </a:extLst>
+            </p:cNvPr>
+            <p:cNvGrpSpPr/>
+            <p:nvPr/>
+          </p:nvGrpSpPr>
+          <p:grpSpPr>
+            <a:xfrm>
+              <a:off x="14616221" y="8845616"/>
+              <a:ext cx="1963844" cy="1945337"/>
+              <a:chOff x="13881527" y="8147151"/>
+              <a:chExt cx="3943553" cy="3906389"/>
+            </a:xfrm>
+          </p:grpSpPr>
+          <p:pic>
+            <p:nvPicPr>
+              <p:cNvPr id="23" name="Picture 22">
+                <a:extLst>
+                  <a:ext uri="{FF2B5EF4-FFF2-40B4-BE49-F238E27FC236}">
+                    <a16:creationId xmlns:a16="http://schemas.microsoft.com/office/drawing/2014/main" id="{B3C429B4-86B7-A8F8-4EA8-EA97197739ED}"/>
+                  </a:ext>
+                </a:extLst>
+              </p:cNvPr>
+              <p:cNvPicPr>
+                <a:picLocks noChangeAspect="1"/>
+              </p:cNvPicPr>
+              <p:nvPr/>
+            </p:nvPicPr>
+            <p:blipFill rotWithShape="1">
+              <a:blip r:embed="rId3"/>
+              <a:srcRect t="62570" b="6189"/>
+              <a:stretch/>
+            </p:blipFill>
+            <p:spPr>
+              <a:xfrm>
+                <a:off x="13881527" y="10652909"/>
+                <a:ext cx="3943553" cy="1400631"/>
+              </a:xfrm>
+              <a:prstGeom prst="rect">
+                <a:avLst/>
+              </a:prstGeom>
+            </p:spPr>
+          </p:pic>
+          <p:pic>
+            <p:nvPicPr>
+              <p:cNvPr id="24" name="Picture 23">
+                <a:extLst>
+                  <a:ext uri="{FF2B5EF4-FFF2-40B4-BE49-F238E27FC236}">
+                    <a16:creationId xmlns:a16="http://schemas.microsoft.com/office/drawing/2014/main" id="{2A16BB2E-6A90-CF44-27EE-6798B3C54B33}"/>
+                  </a:ext>
+                </a:extLst>
+              </p:cNvPr>
+              <p:cNvPicPr>
+                <a:picLocks noChangeAspect="1"/>
+              </p:cNvPicPr>
+              <p:nvPr/>
+            </p:nvPicPr>
+            <p:blipFill rotWithShape="1">
+              <a:blip r:embed="rId3"/>
+              <a:srcRect r="36353" b="43387"/>
+              <a:stretch/>
+            </p:blipFill>
+            <p:spPr>
+              <a:xfrm>
+                <a:off x="13881527" y="8147151"/>
+                <a:ext cx="2509939" cy="2538160"/>
+              </a:xfrm>
+              <a:prstGeom prst="rect">
+                <a:avLst/>
+              </a:prstGeom>
+            </p:spPr>
+          </p:pic>
+        </p:grpSp>
       </p:grpSp>
-      <p:sp>
-        <p:nvSpPr>
-          <p:cNvPr id="12" name="TextBox 11">
-            <a:extLst>
-              <a:ext uri="{FF2B5EF4-FFF2-40B4-BE49-F238E27FC236}">
-                <a16:creationId xmlns:a16="http://schemas.microsoft.com/office/drawing/2014/main" id="{FBFF246D-610B-4374-EB67-17CF1BF15B54}"/>
-              </a:ext>
-            </a:extLst>
-          </p:cNvPr>
-          <p:cNvSpPr txBox="1"/>
-          <p:nvPr/>
-        </p:nvSpPr>
-        <p:spPr>
-          <a:xfrm>
-            <a:off x="9775262" y="9911289"/>
-            <a:ext cx="523263" cy="711371"/>
-          </a:xfrm>
-          <a:prstGeom prst="rect">
-            <a:avLst/>
-          </a:prstGeom>
-          <a:noFill/>
-        </p:spPr>
-        <p:txBody>
-          <a:bodyPr wrap="square" rtlCol="0">
-            <a:spAutoFit/>
-          </a:bodyPr>
-          <a:lstStyle/>
-          <a:p>
-            <a:pPr algn="ctr"/>
-            <a:r>
-              <a:rPr lang="en-US" sz="4020" dirty="0"/>
-              <a:t>D</a:t>
-            </a:r>
-          </a:p>
-        </p:txBody>
-      </p:sp>
-      <p:pic>
-        <p:nvPicPr>
-          <p:cNvPr id="3" name="Picture 2" descr="A collage of graphs&#10;&#10;Description automatically generated">
-            <a:extLst>
-              <a:ext uri="{FF2B5EF4-FFF2-40B4-BE49-F238E27FC236}">
-                <a16:creationId xmlns:a16="http://schemas.microsoft.com/office/drawing/2014/main" id="{214DF0C1-288E-7D0A-549F-71CABD41543F}"/>
-              </a:ext>
-            </a:extLst>
-          </p:cNvPr>
-          <p:cNvPicPr>
-            <a:picLocks noChangeAspect="1"/>
-          </p:cNvPicPr>
-          <p:nvPr/>
-        </p:nvPicPr>
-        <p:blipFill rotWithShape="1">
-          <a:blip r:embed="rId4">
-            <a:extLst>
-              <a:ext uri="{28A0092B-C50C-407E-A947-70E740481C1C}">
-                <a14:useLocalDpi xmlns:a14="http://schemas.microsoft.com/office/drawing/2010/main" val="0"/>
-              </a:ext>
-            </a:extLst>
-          </a:blip>
-          <a:srcRect l="84241" t="14478" b="48148"/>
-          <a:stretch/>
-        </p:blipFill>
-        <p:spPr>
-          <a:xfrm>
-            <a:off x="16267524" y="2076358"/>
-            <a:ext cx="3353214" cy="5964255"/>
-          </a:xfrm>
-          <a:prstGeom prst="rect">
-            <a:avLst/>
-          </a:prstGeom>
-        </p:spPr>
-      </p:pic>
     </p:spTree>
     <p:extLst>
       <p:ext uri="{BB962C8B-B14F-4D97-AF65-F5344CB8AC3E}">

</xml_diff>

<commit_message>
main text/figures with edits from Mark
</commit_message>
<xml_diff>
--- a/manuscript/final_figures/Figure_Box1_cleanup.pptx
+++ b/manuscript/final_figures/Figure_Box1_cleanup.pptx
@@ -2,12 +2,12 @@
 <file path=ppt/presentation.xml><?xml version="1.0" encoding="utf-8"?>
 <p:presentation xmlns:a="http://schemas.openxmlformats.org/drawingml/2006/main" xmlns:r="http://schemas.openxmlformats.org/officeDocument/2006/relationships" xmlns:p="http://schemas.openxmlformats.org/presentationml/2006/main" saveSubsetFonts="1">
   <p:sldMasterIdLst>
-    <p:sldMasterId id="2147483720" r:id="rId1"/>
+    <p:sldMasterId id="2147483744" r:id="rId1"/>
   </p:sldMasterIdLst>
   <p:sldIdLst>
     <p:sldId id="256" r:id="rId2"/>
   </p:sldIdLst>
-  <p:sldSz cx="23409275" cy="19202400"/>
+  <p:sldSz cx="23774400" cy="11887200"/>
   <p:notesSz cx="6858000" cy="9144000"/>
   <p:defaultTextStyle>
     <a:defPPr>
@@ -141,15 +141,15 @@
         </p:nvSpPr>
         <p:spPr>
           <a:xfrm>
-            <a:off x="1755696" y="3142616"/>
-            <a:ext cx="19897884" cy="6685280"/>
+            <a:off x="2971800" y="1945429"/>
+            <a:ext cx="17830800" cy="4138507"/>
           </a:xfrm>
         </p:spPr>
         <p:txBody>
           <a:bodyPr anchor="b"/>
           <a:lstStyle>
             <a:lvl1pPr algn="ctr">
-              <a:defRPr sz="15361"/>
+              <a:defRPr sz="10400"/>
             </a:lvl1pPr>
           </a:lstStyle>
           <a:p>
@@ -173,8 +173,8 @@
         </p:nvSpPr>
         <p:spPr>
           <a:xfrm>
-            <a:off x="2926160" y="10085706"/>
-            <a:ext cx="17556956" cy="4636134"/>
+            <a:off x="2971800" y="6243533"/>
+            <a:ext cx="17830800" cy="2869987"/>
           </a:xfrm>
         </p:spPr>
         <p:txBody>
@@ -182,39 +182,39 @@
           <a:lstStyle>
             <a:lvl1pPr marL="0" indent="0" algn="ctr">
               <a:buNone/>
-              <a:defRPr sz="6144"/>
+              <a:defRPr sz="4160"/>
             </a:lvl1pPr>
-            <a:lvl2pPr marL="1170478" indent="0" algn="ctr">
-              <a:buNone/>
-              <a:defRPr sz="5120"/>
+            <a:lvl2pPr marL="792465" indent="0" algn="ctr">
+              <a:buNone/>
+              <a:defRPr sz="3467"/>
             </a:lvl2pPr>
-            <a:lvl3pPr marL="2340955" indent="0" algn="ctr">
-              <a:buNone/>
-              <a:defRPr sz="4608"/>
+            <a:lvl3pPr marL="1584930" indent="0" algn="ctr">
+              <a:buNone/>
+              <a:defRPr sz="3120"/>
             </a:lvl3pPr>
-            <a:lvl4pPr marL="3511433" indent="0" algn="ctr">
-              <a:buNone/>
-              <a:defRPr sz="4096"/>
+            <a:lvl4pPr marL="2377394" indent="0" algn="ctr">
+              <a:buNone/>
+              <a:defRPr sz="2773"/>
             </a:lvl4pPr>
-            <a:lvl5pPr marL="4681911" indent="0" algn="ctr">
-              <a:buNone/>
-              <a:defRPr sz="4096"/>
+            <a:lvl5pPr marL="3169859" indent="0" algn="ctr">
+              <a:buNone/>
+              <a:defRPr sz="2773"/>
             </a:lvl5pPr>
-            <a:lvl6pPr marL="5852389" indent="0" algn="ctr">
-              <a:buNone/>
-              <a:defRPr sz="4096"/>
+            <a:lvl6pPr marL="3962324" indent="0" algn="ctr">
+              <a:buNone/>
+              <a:defRPr sz="2773"/>
             </a:lvl6pPr>
-            <a:lvl7pPr marL="7022866" indent="0" algn="ctr">
-              <a:buNone/>
-              <a:defRPr sz="4096"/>
+            <a:lvl7pPr marL="4754789" indent="0" algn="ctr">
+              <a:buNone/>
+              <a:defRPr sz="2773"/>
             </a:lvl7pPr>
-            <a:lvl8pPr marL="8193344" indent="0" algn="ctr">
-              <a:buNone/>
-              <a:defRPr sz="4096"/>
+            <a:lvl8pPr marL="5547253" indent="0" algn="ctr">
+              <a:buNone/>
+              <a:defRPr sz="2773"/>
             </a:lvl8pPr>
-            <a:lvl9pPr marL="9363822" indent="0" algn="ctr">
-              <a:buNone/>
-              <a:defRPr sz="4096"/>
+            <a:lvl9pPr marL="6339718" indent="0" algn="ctr">
+              <a:buNone/>
+              <a:defRPr sz="2773"/>
             </a:lvl9pPr>
           </a:lstStyle>
           <a:p>
@@ -243,7 +243,7 @@
           <a:p>
             <a:fld id="{9989B3A2-2388-44BE-9854-4BCC09CB1095}" type="datetimeFigureOut">
               <a:rPr lang="en-US" smtClean="0"/>
-              <a:t>1/15/2024</a:t>
+              <a:t>1/22/2024</a:t>
             </a:fld>
             <a:endParaRPr lang="en-US"/>
           </a:p>
@@ -294,7 +294,7 @@
     </p:spTree>
     <p:extLst>
       <p:ext uri="{BB962C8B-B14F-4D97-AF65-F5344CB8AC3E}">
-        <p14:creationId xmlns:p14="http://schemas.microsoft.com/office/powerpoint/2010/main" val="1407973400"/>
+        <p14:creationId xmlns:p14="http://schemas.microsoft.com/office/powerpoint/2010/main" val="528841120"/>
       </p:ext>
     </p:extLst>
   </p:cSld>
@@ -413,7 +413,7 @@
           <a:p>
             <a:fld id="{9989B3A2-2388-44BE-9854-4BCC09CB1095}" type="datetimeFigureOut">
               <a:rPr lang="en-US" smtClean="0"/>
-              <a:t>1/15/2024</a:t>
+              <a:t>1/22/2024</a:t>
             </a:fld>
             <a:endParaRPr lang="en-US"/>
           </a:p>
@@ -464,7 +464,7 @@
     </p:spTree>
     <p:extLst>
       <p:ext uri="{BB962C8B-B14F-4D97-AF65-F5344CB8AC3E}">
-        <p14:creationId xmlns:p14="http://schemas.microsoft.com/office/powerpoint/2010/main" val="3327965461"/>
+        <p14:creationId xmlns:p14="http://schemas.microsoft.com/office/powerpoint/2010/main" val="2710821367"/>
       </p:ext>
     </p:extLst>
   </p:cSld>
@@ -503,8 +503,8 @@
         </p:nvSpPr>
         <p:spPr>
           <a:xfrm>
-            <a:off x="16752264" y="1022350"/>
-            <a:ext cx="5047625" cy="16273146"/>
+            <a:off x="17013555" y="632883"/>
+            <a:ext cx="5126355" cy="10073853"/>
           </a:xfrm>
         </p:spPr>
         <p:txBody>
@@ -531,8 +531,8 @@
         </p:nvSpPr>
         <p:spPr>
           <a:xfrm>
-            <a:off x="1609389" y="1022350"/>
-            <a:ext cx="14850259" cy="16273146"/>
+            <a:off x="1634490" y="632883"/>
+            <a:ext cx="15081885" cy="10073853"/>
           </a:xfrm>
         </p:spPr>
         <p:txBody>
@@ -593,7 +593,7 @@
           <a:p>
             <a:fld id="{9989B3A2-2388-44BE-9854-4BCC09CB1095}" type="datetimeFigureOut">
               <a:rPr lang="en-US" smtClean="0"/>
-              <a:t>1/15/2024</a:t>
+              <a:t>1/22/2024</a:t>
             </a:fld>
             <a:endParaRPr lang="en-US"/>
           </a:p>
@@ -644,7 +644,7 @@
     </p:spTree>
     <p:extLst>
       <p:ext uri="{BB962C8B-B14F-4D97-AF65-F5344CB8AC3E}">
-        <p14:creationId xmlns:p14="http://schemas.microsoft.com/office/powerpoint/2010/main" val="3207882821"/>
+        <p14:creationId xmlns:p14="http://schemas.microsoft.com/office/powerpoint/2010/main" val="3396489340"/>
       </p:ext>
     </p:extLst>
   </p:cSld>
@@ -763,7 +763,7 @@
           <a:p>
             <a:fld id="{9989B3A2-2388-44BE-9854-4BCC09CB1095}" type="datetimeFigureOut">
               <a:rPr lang="en-US" smtClean="0"/>
-              <a:t>1/15/2024</a:t>
+              <a:t>1/22/2024</a:t>
             </a:fld>
             <a:endParaRPr lang="en-US"/>
           </a:p>
@@ -814,7 +814,7 @@
     </p:spTree>
     <p:extLst>
       <p:ext uri="{BB962C8B-B14F-4D97-AF65-F5344CB8AC3E}">
-        <p14:creationId xmlns:p14="http://schemas.microsoft.com/office/powerpoint/2010/main" val="3139788133"/>
+        <p14:creationId xmlns:p14="http://schemas.microsoft.com/office/powerpoint/2010/main" val="2239571296"/>
       </p:ext>
     </p:extLst>
   </p:cSld>
@@ -853,15 +853,15 @@
         </p:nvSpPr>
         <p:spPr>
           <a:xfrm>
-            <a:off x="1597196" y="4787270"/>
-            <a:ext cx="20190500" cy="7987664"/>
+            <a:off x="1622108" y="2963547"/>
+            <a:ext cx="20505420" cy="4944744"/>
           </a:xfrm>
         </p:spPr>
         <p:txBody>
           <a:bodyPr anchor="b"/>
           <a:lstStyle>
             <a:lvl1pPr>
-              <a:defRPr sz="15361"/>
+              <a:defRPr sz="10400"/>
             </a:lvl1pPr>
           </a:lstStyle>
           <a:p>
@@ -885,8 +885,8 @@
         </p:nvSpPr>
         <p:spPr>
           <a:xfrm>
-            <a:off x="1597196" y="12850500"/>
-            <a:ext cx="20190500" cy="4200524"/>
+            <a:off x="1622108" y="7955070"/>
+            <a:ext cx="20505420" cy="2600324"/>
           </a:xfrm>
         </p:spPr>
         <p:txBody>
@@ -894,15 +894,17 @@
           <a:lstStyle>
             <a:lvl1pPr marL="0" indent="0">
               <a:buNone/>
-              <a:defRPr sz="6144">
+              <a:defRPr sz="4160">
                 <a:solidFill>
-                  <a:schemeClr val="tx1"/>
+                  <a:schemeClr val="tx1">
+                    <a:tint val="75000"/>
+                  </a:schemeClr>
                 </a:solidFill>
               </a:defRPr>
             </a:lvl1pPr>
-            <a:lvl2pPr marL="1170478" indent="0">
-              <a:buNone/>
-              <a:defRPr sz="5120">
+            <a:lvl2pPr marL="792465" indent="0">
+              <a:buNone/>
+              <a:defRPr sz="3467">
                 <a:solidFill>
                   <a:schemeClr val="tx1">
                     <a:tint val="75000"/>
@@ -910,9 +912,9 @@
                 </a:solidFill>
               </a:defRPr>
             </a:lvl2pPr>
-            <a:lvl3pPr marL="2340955" indent="0">
-              <a:buNone/>
-              <a:defRPr sz="4608">
+            <a:lvl3pPr marL="1584930" indent="0">
+              <a:buNone/>
+              <a:defRPr sz="3120">
                 <a:solidFill>
                   <a:schemeClr val="tx1">
                     <a:tint val="75000"/>
@@ -920,9 +922,9 @@
                 </a:solidFill>
               </a:defRPr>
             </a:lvl3pPr>
-            <a:lvl4pPr marL="3511433" indent="0">
-              <a:buNone/>
-              <a:defRPr sz="4096">
+            <a:lvl4pPr marL="2377394" indent="0">
+              <a:buNone/>
+              <a:defRPr sz="2773">
                 <a:solidFill>
                   <a:schemeClr val="tx1">
                     <a:tint val="75000"/>
@@ -930,9 +932,9 @@
                 </a:solidFill>
               </a:defRPr>
             </a:lvl4pPr>
-            <a:lvl5pPr marL="4681911" indent="0">
-              <a:buNone/>
-              <a:defRPr sz="4096">
+            <a:lvl5pPr marL="3169859" indent="0">
+              <a:buNone/>
+              <a:defRPr sz="2773">
                 <a:solidFill>
                   <a:schemeClr val="tx1">
                     <a:tint val="75000"/>
@@ -940,9 +942,9 @@
                 </a:solidFill>
               </a:defRPr>
             </a:lvl5pPr>
-            <a:lvl6pPr marL="5852389" indent="0">
-              <a:buNone/>
-              <a:defRPr sz="4096">
+            <a:lvl6pPr marL="3962324" indent="0">
+              <a:buNone/>
+              <a:defRPr sz="2773">
                 <a:solidFill>
                   <a:schemeClr val="tx1">
                     <a:tint val="75000"/>
@@ -950,9 +952,9 @@
                 </a:solidFill>
               </a:defRPr>
             </a:lvl6pPr>
-            <a:lvl7pPr marL="7022866" indent="0">
-              <a:buNone/>
-              <a:defRPr sz="4096">
+            <a:lvl7pPr marL="4754789" indent="0">
+              <a:buNone/>
+              <a:defRPr sz="2773">
                 <a:solidFill>
                   <a:schemeClr val="tx1">
                     <a:tint val="75000"/>
@@ -960,9 +962,9 @@
                 </a:solidFill>
               </a:defRPr>
             </a:lvl7pPr>
-            <a:lvl8pPr marL="8193344" indent="0">
-              <a:buNone/>
-              <a:defRPr sz="4096">
+            <a:lvl8pPr marL="5547253" indent="0">
+              <a:buNone/>
+              <a:defRPr sz="2773">
                 <a:solidFill>
                   <a:schemeClr val="tx1">
                     <a:tint val="75000"/>
@@ -970,9 +972,9 @@
                 </a:solidFill>
               </a:defRPr>
             </a:lvl8pPr>
-            <a:lvl9pPr marL="9363822" indent="0">
-              <a:buNone/>
-              <a:defRPr sz="4096">
+            <a:lvl9pPr marL="6339718" indent="0">
+              <a:buNone/>
+              <a:defRPr sz="2773">
                 <a:solidFill>
                   <a:schemeClr val="tx1">
                     <a:tint val="75000"/>
@@ -1007,7 +1009,7 @@
           <a:p>
             <a:fld id="{9989B3A2-2388-44BE-9854-4BCC09CB1095}" type="datetimeFigureOut">
               <a:rPr lang="en-US" smtClean="0"/>
-              <a:t>1/15/2024</a:t>
+              <a:t>1/22/2024</a:t>
             </a:fld>
             <a:endParaRPr lang="en-US"/>
           </a:p>
@@ -1058,7 +1060,7 @@
     </p:spTree>
     <p:extLst>
       <p:ext uri="{BB962C8B-B14F-4D97-AF65-F5344CB8AC3E}">
-        <p14:creationId xmlns:p14="http://schemas.microsoft.com/office/powerpoint/2010/main" val="1199570316"/>
+        <p14:creationId xmlns:p14="http://schemas.microsoft.com/office/powerpoint/2010/main" val="3484445193"/>
       </p:ext>
     </p:extLst>
   </p:cSld>
@@ -1120,8 +1122,8 @@
         </p:nvSpPr>
         <p:spPr>
           <a:xfrm>
-            <a:off x="1609388" y="5111750"/>
-            <a:ext cx="9948942" cy="12183746"/>
+            <a:off x="1634490" y="3164417"/>
+            <a:ext cx="10104120" cy="7542319"/>
           </a:xfrm>
         </p:spPr>
         <p:txBody>
@@ -1177,8 +1179,8 @@
         </p:nvSpPr>
         <p:spPr>
           <a:xfrm>
-            <a:off x="11850945" y="5111750"/>
-            <a:ext cx="9948942" cy="12183746"/>
+            <a:off x="12035790" y="3164417"/>
+            <a:ext cx="10104120" cy="7542319"/>
           </a:xfrm>
         </p:spPr>
         <p:txBody>
@@ -1239,7 +1241,7 @@
           <a:p>
             <a:fld id="{9989B3A2-2388-44BE-9854-4BCC09CB1095}" type="datetimeFigureOut">
               <a:rPr lang="en-US" smtClean="0"/>
-              <a:t>1/15/2024</a:t>
+              <a:t>1/22/2024</a:t>
             </a:fld>
             <a:endParaRPr lang="en-US"/>
           </a:p>
@@ -1290,7 +1292,7 @@
     </p:spTree>
     <p:extLst>
       <p:ext uri="{BB962C8B-B14F-4D97-AF65-F5344CB8AC3E}">
-        <p14:creationId xmlns:p14="http://schemas.microsoft.com/office/powerpoint/2010/main" val="3314965289"/>
+        <p14:creationId xmlns:p14="http://schemas.microsoft.com/office/powerpoint/2010/main" val="3198479597"/>
       </p:ext>
     </p:extLst>
   </p:cSld>
@@ -1329,8 +1331,8 @@
         </p:nvSpPr>
         <p:spPr>
           <a:xfrm>
-            <a:off x="1612437" y="1022354"/>
-            <a:ext cx="20190500" cy="3711576"/>
+            <a:off x="1637587" y="632884"/>
+            <a:ext cx="20505420" cy="2297643"/>
           </a:xfrm>
         </p:spPr>
         <p:txBody>
@@ -1357,8 +1359,8 @@
         </p:nvSpPr>
         <p:spPr>
           <a:xfrm>
-            <a:off x="1612439" y="4707256"/>
-            <a:ext cx="9903219" cy="2306954"/>
+            <a:off x="1637587" y="2914016"/>
+            <a:ext cx="10057685" cy="1428114"/>
           </a:xfrm>
         </p:spPr>
         <p:txBody>
@@ -1366,39 +1368,39 @@
           <a:lstStyle>
             <a:lvl1pPr marL="0" indent="0">
               <a:buNone/>
-              <a:defRPr sz="6144" b="1"/>
+              <a:defRPr sz="4160" b="1"/>
             </a:lvl1pPr>
-            <a:lvl2pPr marL="1170478" indent="0">
-              <a:buNone/>
-              <a:defRPr sz="5120" b="1"/>
+            <a:lvl2pPr marL="792465" indent="0">
+              <a:buNone/>
+              <a:defRPr sz="3467" b="1"/>
             </a:lvl2pPr>
-            <a:lvl3pPr marL="2340955" indent="0">
-              <a:buNone/>
-              <a:defRPr sz="4608" b="1"/>
+            <a:lvl3pPr marL="1584930" indent="0">
+              <a:buNone/>
+              <a:defRPr sz="3120" b="1"/>
             </a:lvl3pPr>
-            <a:lvl4pPr marL="3511433" indent="0">
-              <a:buNone/>
-              <a:defRPr sz="4096" b="1"/>
+            <a:lvl4pPr marL="2377394" indent="0">
+              <a:buNone/>
+              <a:defRPr sz="2773" b="1"/>
             </a:lvl4pPr>
-            <a:lvl5pPr marL="4681911" indent="0">
-              <a:buNone/>
-              <a:defRPr sz="4096" b="1"/>
+            <a:lvl5pPr marL="3169859" indent="0">
+              <a:buNone/>
+              <a:defRPr sz="2773" b="1"/>
             </a:lvl5pPr>
-            <a:lvl6pPr marL="5852389" indent="0">
-              <a:buNone/>
-              <a:defRPr sz="4096" b="1"/>
+            <a:lvl6pPr marL="3962324" indent="0">
+              <a:buNone/>
+              <a:defRPr sz="2773" b="1"/>
             </a:lvl6pPr>
-            <a:lvl7pPr marL="7022866" indent="0">
-              <a:buNone/>
-              <a:defRPr sz="4096" b="1"/>
+            <a:lvl7pPr marL="4754789" indent="0">
+              <a:buNone/>
+              <a:defRPr sz="2773" b="1"/>
             </a:lvl7pPr>
-            <a:lvl8pPr marL="8193344" indent="0">
-              <a:buNone/>
-              <a:defRPr sz="4096" b="1"/>
+            <a:lvl8pPr marL="5547253" indent="0">
+              <a:buNone/>
+              <a:defRPr sz="2773" b="1"/>
             </a:lvl8pPr>
-            <a:lvl9pPr marL="9363822" indent="0">
-              <a:buNone/>
-              <a:defRPr sz="4096" b="1"/>
+            <a:lvl9pPr marL="6339718" indent="0">
+              <a:buNone/>
+              <a:defRPr sz="2773" b="1"/>
             </a:lvl9pPr>
           </a:lstStyle>
           <a:p>
@@ -1422,8 +1424,8 @@
         </p:nvSpPr>
         <p:spPr>
           <a:xfrm>
-            <a:off x="1612439" y="7014210"/>
-            <a:ext cx="9903219" cy="10316846"/>
+            <a:off x="1637587" y="4342130"/>
+            <a:ext cx="10057685" cy="6386619"/>
           </a:xfrm>
         </p:spPr>
         <p:txBody>
@@ -1479,8 +1481,8 @@
         </p:nvSpPr>
         <p:spPr>
           <a:xfrm>
-            <a:off x="11850947" y="4707256"/>
-            <a:ext cx="9951991" cy="2306954"/>
+            <a:off x="12035790" y="2914016"/>
+            <a:ext cx="10107217" cy="1428114"/>
           </a:xfrm>
         </p:spPr>
         <p:txBody>
@@ -1488,39 +1490,39 @@
           <a:lstStyle>
             <a:lvl1pPr marL="0" indent="0">
               <a:buNone/>
-              <a:defRPr sz="6144" b="1"/>
+              <a:defRPr sz="4160" b="1"/>
             </a:lvl1pPr>
-            <a:lvl2pPr marL="1170478" indent="0">
-              <a:buNone/>
-              <a:defRPr sz="5120" b="1"/>
+            <a:lvl2pPr marL="792465" indent="0">
+              <a:buNone/>
+              <a:defRPr sz="3467" b="1"/>
             </a:lvl2pPr>
-            <a:lvl3pPr marL="2340955" indent="0">
-              <a:buNone/>
-              <a:defRPr sz="4608" b="1"/>
+            <a:lvl3pPr marL="1584930" indent="0">
+              <a:buNone/>
+              <a:defRPr sz="3120" b="1"/>
             </a:lvl3pPr>
-            <a:lvl4pPr marL="3511433" indent="0">
-              <a:buNone/>
-              <a:defRPr sz="4096" b="1"/>
+            <a:lvl4pPr marL="2377394" indent="0">
+              <a:buNone/>
+              <a:defRPr sz="2773" b="1"/>
             </a:lvl4pPr>
-            <a:lvl5pPr marL="4681911" indent="0">
-              <a:buNone/>
-              <a:defRPr sz="4096" b="1"/>
+            <a:lvl5pPr marL="3169859" indent="0">
+              <a:buNone/>
+              <a:defRPr sz="2773" b="1"/>
             </a:lvl5pPr>
-            <a:lvl6pPr marL="5852389" indent="0">
-              <a:buNone/>
-              <a:defRPr sz="4096" b="1"/>
+            <a:lvl6pPr marL="3962324" indent="0">
+              <a:buNone/>
+              <a:defRPr sz="2773" b="1"/>
             </a:lvl6pPr>
-            <a:lvl7pPr marL="7022866" indent="0">
-              <a:buNone/>
-              <a:defRPr sz="4096" b="1"/>
+            <a:lvl7pPr marL="4754789" indent="0">
+              <a:buNone/>
+              <a:defRPr sz="2773" b="1"/>
             </a:lvl7pPr>
-            <a:lvl8pPr marL="8193344" indent="0">
-              <a:buNone/>
-              <a:defRPr sz="4096" b="1"/>
+            <a:lvl8pPr marL="5547253" indent="0">
+              <a:buNone/>
+              <a:defRPr sz="2773" b="1"/>
             </a:lvl8pPr>
-            <a:lvl9pPr marL="9363822" indent="0">
-              <a:buNone/>
-              <a:defRPr sz="4096" b="1"/>
+            <a:lvl9pPr marL="6339718" indent="0">
+              <a:buNone/>
+              <a:defRPr sz="2773" b="1"/>
             </a:lvl9pPr>
           </a:lstStyle>
           <a:p>
@@ -1544,8 +1546,8 @@
         </p:nvSpPr>
         <p:spPr>
           <a:xfrm>
-            <a:off x="11850947" y="7014210"/>
-            <a:ext cx="9951991" cy="10316846"/>
+            <a:off x="12035790" y="4342130"/>
+            <a:ext cx="10107217" cy="6386619"/>
           </a:xfrm>
         </p:spPr>
         <p:txBody>
@@ -1606,7 +1608,7 @@
           <a:p>
             <a:fld id="{9989B3A2-2388-44BE-9854-4BCC09CB1095}" type="datetimeFigureOut">
               <a:rPr lang="en-US" smtClean="0"/>
-              <a:t>1/15/2024</a:t>
+              <a:t>1/22/2024</a:t>
             </a:fld>
             <a:endParaRPr lang="en-US"/>
           </a:p>
@@ -1657,7 +1659,7 @@
     </p:spTree>
     <p:extLst>
       <p:ext uri="{BB962C8B-B14F-4D97-AF65-F5344CB8AC3E}">
-        <p14:creationId xmlns:p14="http://schemas.microsoft.com/office/powerpoint/2010/main" val="1648259647"/>
+        <p14:creationId xmlns:p14="http://schemas.microsoft.com/office/powerpoint/2010/main" val="3841745601"/>
       </p:ext>
     </p:extLst>
   </p:cSld>
@@ -1724,7 +1726,7 @@
           <a:p>
             <a:fld id="{9989B3A2-2388-44BE-9854-4BCC09CB1095}" type="datetimeFigureOut">
               <a:rPr lang="en-US" smtClean="0"/>
-              <a:t>1/15/2024</a:t>
+              <a:t>1/22/2024</a:t>
             </a:fld>
             <a:endParaRPr lang="en-US"/>
           </a:p>
@@ -1775,7 +1777,7 @@
     </p:spTree>
     <p:extLst>
       <p:ext uri="{BB962C8B-B14F-4D97-AF65-F5344CB8AC3E}">
-        <p14:creationId xmlns:p14="http://schemas.microsoft.com/office/powerpoint/2010/main" val="3031704273"/>
+        <p14:creationId xmlns:p14="http://schemas.microsoft.com/office/powerpoint/2010/main" val="155444735"/>
       </p:ext>
     </p:extLst>
   </p:cSld>
@@ -1819,7 +1821,7 @@
           <a:p>
             <a:fld id="{9989B3A2-2388-44BE-9854-4BCC09CB1095}" type="datetimeFigureOut">
               <a:rPr lang="en-US" smtClean="0"/>
-              <a:t>1/15/2024</a:t>
+              <a:t>1/22/2024</a:t>
             </a:fld>
             <a:endParaRPr lang="en-US"/>
           </a:p>
@@ -1870,7 +1872,7 @@
     </p:spTree>
     <p:extLst>
       <p:ext uri="{BB962C8B-B14F-4D97-AF65-F5344CB8AC3E}">
-        <p14:creationId xmlns:p14="http://schemas.microsoft.com/office/powerpoint/2010/main" val="2151955738"/>
+        <p14:creationId xmlns:p14="http://schemas.microsoft.com/office/powerpoint/2010/main" val="1566209910"/>
       </p:ext>
     </p:extLst>
   </p:cSld>
@@ -1909,15 +1911,15 @@
         </p:nvSpPr>
         <p:spPr>
           <a:xfrm>
-            <a:off x="1612437" y="1280160"/>
-            <a:ext cx="7550100" cy="4480560"/>
+            <a:off x="1637588" y="792480"/>
+            <a:ext cx="7667862" cy="2773680"/>
           </a:xfrm>
         </p:spPr>
         <p:txBody>
           <a:bodyPr anchor="b"/>
           <a:lstStyle>
             <a:lvl1pPr>
-              <a:defRPr sz="8192"/>
+              <a:defRPr sz="5547"/>
             </a:lvl1pPr>
           </a:lstStyle>
           <a:p>
@@ -1941,39 +1943,39 @@
         </p:nvSpPr>
         <p:spPr>
           <a:xfrm>
-            <a:off x="9951991" y="2764794"/>
-            <a:ext cx="11850945" cy="13646150"/>
+            <a:off x="10107217" y="1711537"/>
+            <a:ext cx="12035790" cy="8447617"/>
           </a:xfrm>
         </p:spPr>
         <p:txBody>
           <a:bodyPr/>
           <a:lstStyle>
             <a:lvl1pPr>
-              <a:defRPr sz="8192"/>
+              <a:defRPr sz="5547"/>
             </a:lvl1pPr>
             <a:lvl2pPr>
-              <a:defRPr sz="7168"/>
+              <a:defRPr sz="4853"/>
             </a:lvl2pPr>
             <a:lvl3pPr>
-              <a:defRPr sz="6144"/>
+              <a:defRPr sz="4160"/>
             </a:lvl3pPr>
             <a:lvl4pPr>
-              <a:defRPr sz="5120"/>
+              <a:defRPr sz="3467"/>
             </a:lvl4pPr>
             <a:lvl5pPr>
-              <a:defRPr sz="5120"/>
+              <a:defRPr sz="3467"/>
             </a:lvl5pPr>
             <a:lvl6pPr>
-              <a:defRPr sz="5120"/>
+              <a:defRPr sz="3467"/>
             </a:lvl6pPr>
             <a:lvl7pPr>
-              <a:defRPr sz="5120"/>
+              <a:defRPr sz="3467"/>
             </a:lvl7pPr>
             <a:lvl8pPr>
-              <a:defRPr sz="5120"/>
+              <a:defRPr sz="3467"/>
             </a:lvl8pPr>
             <a:lvl9pPr>
-              <a:defRPr sz="5120"/>
+              <a:defRPr sz="3467"/>
             </a:lvl9pPr>
           </a:lstStyle>
           <a:p>
@@ -2026,8 +2028,8 @@
         </p:nvSpPr>
         <p:spPr>
           <a:xfrm>
-            <a:off x="1612437" y="5760720"/>
-            <a:ext cx="7550100" cy="10672446"/>
+            <a:off x="1637588" y="3566160"/>
+            <a:ext cx="7667862" cy="6606753"/>
           </a:xfrm>
         </p:spPr>
         <p:txBody>
@@ -2035,39 +2037,39 @@
           <a:lstStyle>
             <a:lvl1pPr marL="0" indent="0">
               <a:buNone/>
-              <a:defRPr sz="4096"/>
+              <a:defRPr sz="2773"/>
             </a:lvl1pPr>
-            <a:lvl2pPr marL="1170478" indent="0">
-              <a:buNone/>
-              <a:defRPr sz="3584"/>
+            <a:lvl2pPr marL="792465" indent="0">
+              <a:buNone/>
+              <a:defRPr sz="2427"/>
             </a:lvl2pPr>
-            <a:lvl3pPr marL="2340955" indent="0">
-              <a:buNone/>
-              <a:defRPr sz="3072"/>
+            <a:lvl3pPr marL="1584930" indent="0">
+              <a:buNone/>
+              <a:defRPr sz="2080"/>
             </a:lvl3pPr>
-            <a:lvl4pPr marL="3511433" indent="0">
-              <a:buNone/>
-              <a:defRPr sz="2560"/>
+            <a:lvl4pPr marL="2377394" indent="0">
+              <a:buNone/>
+              <a:defRPr sz="1733"/>
             </a:lvl4pPr>
-            <a:lvl5pPr marL="4681911" indent="0">
-              <a:buNone/>
-              <a:defRPr sz="2560"/>
+            <a:lvl5pPr marL="3169859" indent="0">
+              <a:buNone/>
+              <a:defRPr sz="1733"/>
             </a:lvl5pPr>
-            <a:lvl6pPr marL="5852389" indent="0">
-              <a:buNone/>
-              <a:defRPr sz="2560"/>
+            <a:lvl6pPr marL="3962324" indent="0">
+              <a:buNone/>
+              <a:defRPr sz="1733"/>
             </a:lvl6pPr>
-            <a:lvl7pPr marL="7022866" indent="0">
-              <a:buNone/>
-              <a:defRPr sz="2560"/>
+            <a:lvl7pPr marL="4754789" indent="0">
+              <a:buNone/>
+              <a:defRPr sz="1733"/>
             </a:lvl7pPr>
-            <a:lvl8pPr marL="8193344" indent="0">
-              <a:buNone/>
-              <a:defRPr sz="2560"/>
+            <a:lvl8pPr marL="5547253" indent="0">
+              <a:buNone/>
+              <a:defRPr sz="1733"/>
             </a:lvl8pPr>
-            <a:lvl9pPr marL="9363822" indent="0">
-              <a:buNone/>
-              <a:defRPr sz="2560"/>
+            <a:lvl9pPr marL="6339718" indent="0">
+              <a:buNone/>
+              <a:defRPr sz="1733"/>
             </a:lvl9pPr>
           </a:lstStyle>
           <a:p>
@@ -2096,7 +2098,7 @@
           <a:p>
             <a:fld id="{9989B3A2-2388-44BE-9854-4BCC09CB1095}" type="datetimeFigureOut">
               <a:rPr lang="en-US" smtClean="0"/>
-              <a:t>1/15/2024</a:t>
+              <a:t>1/22/2024</a:t>
             </a:fld>
             <a:endParaRPr lang="en-US"/>
           </a:p>
@@ -2147,7 +2149,7 @@
     </p:spTree>
     <p:extLst>
       <p:ext uri="{BB962C8B-B14F-4D97-AF65-F5344CB8AC3E}">
-        <p14:creationId xmlns:p14="http://schemas.microsoft.com/office/powerpoint/2010/main" val="3487057580"/>
+        <p14:creationId xmlns:p14="http://schemas.microsoft.com/office/powerpoint/2010/main" val="2236138082"/>
       </p:ext>
     </p:extLst>
   </p:cSld>
@@ -2186,15 +2188,15 @@
         </p:nvSpPr>
         <p:spPr>
           <a:xfrm>
-            <a:off x="1612437" y="1280160"/>
-            <a:ext cx="7550100" cy="4480560"/>
+            <a:off x="1637588" y="792480"/>
+            <a:ext cx="7667862" cy="2773680"/>
           </a:xfrm>
         </p:spPr>
         <p:txBody>
           <a:bodyPr anchor="b"/>
           <a:lstStyle>
             <a:lvl1pPr>
-              <a:defRPr sz="8192"/>
+              <a:defRPr sz="5547"/>
             </a:lvl1pPr>
           </a:lstStyle>
           <a:p>
@@ -2218,8 +2220,8 @@
         </p:nvSpPr>
         <p:spPr>
           <a:xfrm>
-            <a:off x="9951991" y="2764794"/>
-            <a:ext cx="11850945" cy="13646150"/>
+            <a:off x="10107217" y="1711537"/>
+            <a:ext cx="12035790" cy="8447617"/>
           </a:xfrm>
         </p:spPr>
         <p:txBody>
@@ -2227,39 +2229,39 @@
           <a:lstStyle>
             <a:lvl1pPr marL="0" indent="0">
               <a:buNone/>
-              <a:defRPr sz="8192"/>
+              <a:defRPr sz="5547"/>
             </a:lvl1pPr>
-            <a:lvl2pPr marL="1170478" indent="0">
-              <a:buNone/>
-              <a:defRPr sz="7168"/>
+            <a:lvl2pPr marL="792465" indent="0">
+              <a:buNone/>
+              <a:defRPr sz="4853"/>
             </a:lvl2pPr>
-            <a:lvl3pPr marL="2340955" indent="0">
-              <a:buNone/>
-              <a:defRPr sz="6144"/>
+            <a:lvl3pPr marL="1584930" indent="0">
+              <a:buNone/>
+              <a:defRPr sz="4160"/>
             </a:lvl3pPr>
-            <a:lvl4pPr marL="3511433" indent="0">
-              <a:buNone/>
-              <a:defRPr sz="5120"/>
+            <a:lvl4pPr marL="2377394" indent="0">
+              <a:buNone/>
+              <a:defRPr sz="3467"/>
             </a:lvl4pPr>
-            <a:lvl5pPr marL="4681911" indent="0">
-              <a:buNone/>
-              <a:defRPr sz="5120"/>
+            <a:lvl5pPr marL="3169859" indent="0">
+              <a:buNone/>
+              <a:defRPr sz="3467"/>
             </a:lvl5pPr>
-            <a:lvl6pPr marL="5852389" indent="0">
-              <a:buNone/>
-              <a:defRPr sz="5120"/>
+            <a:lvl6pPr marL="3962324" indent="0">
+              <a:buNone/>
+              <a:defRPr sz="3467"/>
             </a:lvl6pPr>
-            <a:lvl7pPr marL="7022866" indent="0">
-              <a:buNone/>
-              <a:defRPr sz="5120"/>
+            <a:lvl7pPr marL="4754789" indent="0">
+              <a:buNone/>
+              <a:defRPr sz="3467"/>
             </a:lvl7pPr>
-            <a:lvl8pPr marL="8193344" indent="0">
-              <a:buNone/>
-              <a:defRPr sz="5120"/>
+            <a:lvl8pPr marL="5547253" indent="0">
+              <a:buNone/>
+              <a:defRPr sz="3467"/>
             </a:lvl8pPr>
-            <a:lvl9pPr marL="9363822" indent="0">
-              <a:buNone/>
-              <a:defRPr sz="5120"/>
+            <a:lvl9pPr marL="6339718" indent="0">
+              <a:buNone/>
+              <a:defRPr sz="3467"/>
             </a:lvl9pPr>
           </a:lstStyle>
           <a:p>
@@ -2283,8 +2285,8 @@
         </p:nvSpPr>
         <p:spPr>
           <a:xfrm>
-            <a:off x="1612437" y="5760720"/>
-            <a:ext cx="7550100" cy="10672446"/>
+            <a:off x="1637588" y="3566160"/>
+            <a:ext cx="7667862" cy="6606753"/>
           </a:xfrm>
         </p:spPr>
         <p:txBody>
@@ -2292,39 +2294,39 @@
           <a:lstStyle>
             <a:lvl1pPr marL="0" indent="0">
               <a:buNone/>
-              <a:defRPr sz="4096"/>
+              <a:defRPr sz="2773"/>
             </a:lvl1pPr>
-            <a:lvl2pPr marL="1170478" indent="0">
-              <a:buNone/>
-              <a:defRPr sz="3584"/>
+            <a:lvl2pPr marL="792465" indent="0">
+              <a:buNone/>
+              <a:defRPr sz="2427"/>
             </a:lvl2pPr>
-            <a:lvl3pPr marL="2340955" indent="0">
-              <a:buNone/>
-              <a:defRPr sz="3072"/>
+            <a:lvl3pPr marL="1584930" indent="0">
+              <a:buNone/>
+              <a:defRPr sz="2080"/>
             </a:lvl3pPr>
-            <a:lvl4pPr marL="3511433" indent="0">
-              <a:buNone/>
-              <a:defRPr sz="2560"/>
+            <a:lvl4pPr marL="2377394" indent="0">
+              <a:buNone/>
+              <a:defRPr sz="1733"/>
             </a:lvl4pPr>
-            <a:lvl5pPr marL="4681911" indent="0">
-              <a:buNone/>
-              <a:defRPr sz="2560"/>
+            <a:lvl5pPr marL="3169859" indent="0">
+              <a:buNone/>
+              <a:defRPr sz="1733"/>
             </a:lvl5pPr>
-            <a:lvl6pPr marL="5852389" indent="0">
-              <a:buNone/>
-              <a:defRPr sz="2560"/>
+            <a:lvl6pPr marL="3962324" indent="0">
+              <a:buNone/>
+              <a:defRPr sz="1733"/>
             </a:lvl6pPr>
-            <a:lvl7pPr marL="7022866" indent="0">
-              <a:buNone/>
-              <a:defRPr sz="2560"/>
+            <a:lvl7pPr marL="4754789" indent="0">
+              <a:buNone/>
+              <a:defRPr sz="1733"/>
             </a:lvl7pPr>
-            <a:lvl8pPr marL="8193344" indent="0">
-              <a:buNone/>
-              <a:defRPr sz="2560"/>
+            <a:lvl8pPr marL="5547253" indent="0">
+              <a:buNone/>
+              <a:defRPr sz="1733"/>
             </a:lvl8pPr>
-            <a:lvl9pPr marL="9363822" indent="0">
-              <a:buNone/>
-              <a:defRPr sz="2560"/>
+            <a:lvl9pPr marL="6339718" indent="0">
+              <a:buNone/>
+              <a:defRPr sz="1733"/>
             </a:lvl9pPr>
           </a:lstStyle>
           <a:p>
@@ -2353,7 +2355,7 @@
           <a:p>
             <a:fld id="{9989B3A2-2388-44BE-9854-4BCC09CB1095}" type="datetimeFigureOut">
               <a:rPr lang="en-US" smtClean="0"/>
-              <a:t>1/15/2024</a:t>
+              <a:t>1/22/2024</a:t>
             </a:fld>
             <a:endParaRPr lang="en-US"/>
           </a:p>
@@ -2404,7 +2406,7 @@
     </p:spTree>
     <p:extLst>
       <p:ext uri="{BB962C8B-B14F-4D97-AF65-F5344CB8AC3E}">
-        <p14:creationId xmlns:p14="http://schemas.microsoft.com/office/powerpoint/2010/main" val="4059251474"/>
+        <p14:creationId xmlns:p14="http://schemas.microsoft.com/office/powerpoint/2010/main" val="3036519200"/>
       </p:ext>
     </p:extLst>
   </p:cSld>
@@ -2448,8 +2450,8 @@
         </p:nvSpPr>
         <p:spPr>
           <a:xfrm>
-            <a:off x="1609388" y="1022354"/>
-            <a:ext cx="20190500" cy="3711576"/>
+            <a:off x="1634490" y="632884"/>
+            <a:ext cx="20505420" cy="2297643"/>
           </a:xfrm>
           <a:prstGeom prst="rect">
             <a:avLst/>
@@ -2481,8 +2483,8 @@
         </p:nvSpPr>
         <p:spPr>
           <a:xfrm>
-            <a:off x="1609388" y="5111750"/>
-            <a:ext cx="20190500" cy="12183746"/>
+            <a:off x="1634490" y="3164417"/>
+            <a:ext cx="20505420" cy="7542319"/>
           </a:xfrm>
           <a:prstGeom prst="rect">
             <a:avLst/>
@@ -2543,8 +2545,8 @@
         </p:nvSpPr>
         <p:spPr>
           <a:xfrm>
-            <a:off x="1609388" y="17797784"/>
-            <a:ext cx="5267087" cy="1022350"/>
+            <a:off x="1634490" y="11017674"/>
+            <a:ext cx="5349240" cy="632883"/>
           </a:xfrm>
           <a:prstGeom prst="rect">
             <a:avLst/>
@@ -2554,7 +2556,7 @@
           <a:bodyPr vert="horz" lIns="91440" tIns="45720" rIns="91440" bIns="45720" rtlCol="0" anchor="ctr"/>
           <a:lstStyle>
             <a:lvl1pPr algn="l">
-              <a:defRPr sz="3072">
+              <a:defRPr sz="2080">
                 <a:solidFill>
                   <a:schemeClr val="tx1">
                     <a:tint val="75000"/>
@@ -2566,7 +2568,7 @@
           <a:p>
             <a:fld id="{9989B3A2-2388-44BE-9854-4BCC09CB1095}" type="datetimeFigureOut">
               <a:rPr lang="en-US" smtClean="0"/>
-              <a:t>1/15/2024</a:t>
+              <a:t>1/22/2024</a:t>
             </a:fld>
             <a:endParaRPr lang="en-US"/>
           </a:p>
@@ -2584,8 +2586,8 @@
         </p:nvSpPr>
         <p:spPr>
           <a:xfrm>
-            <a:off x="7754323" y="17797784"/>
-            <a:ext cx="7900630" cy="1022350"/>
+            <a:off x="7875270" y="11017674"/>
+            <a:ext cx="8023860" cy="632883"/>
           </a:xfrm>
           <a:prstGeom prst="rect">
             <a:avLst/>
@@ -2595,7 +2597,7 @@
           <a:bodyPr vert="horz" lIns="91440" tIns="45720" rIns="91440" bIns="45720" rtlCol="0" anchor="ctr"/>
           <a:lstStyle>
             <a:lvl1pPr algn="ctr">
-              <a:defRPr sz="3072">
+              <a:defRPr sz="2080">
                 <a:solidFill>
                   <a:schemeClr val="tx1">
                     <a:tint val="75000"/>
@@ -2621,8 +2623,8 @@
         </p:nvSpPr>
         <p:spPr>
           <a:xfrm>
-            <a:off x="16532800" y="17797784"/>
-            <a:ext cx="5267087" cy="1022350"/>
+            <a:off x="16790670" y="11017674"/>
+            <a:ext cx="5349240" cy="632883"/>
           </a:xfrm>
           <a:prstGeom prst="rect">
             <a:avLst/>
@@ -2632,7 +2634,7 @@
           <a:bodyPr vert="horz" lIns="91440" tIns="45720" rIns="91440" bIns="45720" rtlCol="0" anchor="ctr"/>
           <a:lstStyle>
             <a:lvl1pPr algn="r">
-              <a:defRPr sz="3072">
+              <a:defRPr sz="2080">
                 <a:solidFill>
                   <a:schemeClr val="tx1">
                     <a:tint val="75000"/>
@@ -2653,27 +2655,27 @@
     </p:spTree>
     <p:extLst>
       <p:ext uri="{BB962C8B-B14F-4D97-AF65-F5344CB8AC3E}">
-        <p14:creationId xmlns:p14="http://schemas.microsoft.com/office/powerpoint/2010/main" val="682669044"/>
+        <p14:creationId xmlns:p14="http://schemas.microsoft.com/office/powerpoint/2010/main" val="1710095636"/>
       </p:ext>
     </p:extLst>
   </p:cSld>
   <p:clrMap bg1="lt1" tx1="dk1" bg2="lt2" tx2="dk2" accent1="accent1" accent2="accent2" accent3="accent3" accent4="accent4" accent5="accent5" accent6="accent6" hlink="hlink" folHlink="folHlink"/>
   <p:sldLayoutIdLst>
-    <p:sldLayoutId id="2147483721" r:id="rId1"/>
-    <p:sldLayoutId id="2147483722" r:id="rId2"/>
-    <p:sldLayoutId id="2147483723" r:id="rId3"/>
-    <p:sldLayoutId id="2147483724" r:id="rId4"/>
-    <p:sldLayoutId id="2147483725" r:id="rId5"/>
-    <p:sldLayoutId id="2147483726" r:id="rId6"/>
-    <p:sldLayoutId id="2147483727" r:id="rId7"/>
-    <p:sldLayoutId id="2147483728" r:id="rId8"/>
-    <p:sldLayoutId id="2147483729" r:id="rId9"/>
-    <p:sldLayoutId id="2147483730" r:id="rId10"/>
-    <p:sldLayoutId id="2147483731" r:id="rId11"/>
+    <p:sldLayoutId id="2147483745" r:id="rId1"/>
+    <p:sldLayoutId id="2147483746" r:id="rId2"/>
+    <p:sldLayoutId id="2147483747" r:id="rId3"/>
+    <p:sldLayoutId id="2147483748" r:id="rId4"/>
+    <p:sldLayoutId id="2147483749" r:id="rId5"/>
+    <p:sldLayoutId id="2147483750" r:id="rId6"/>
+    <p:sldLayoutId id="2147483751" r:id="rId7"/>
+    <p:sldLayoutId id="2147483752" r:id="rId8"/>
+    <p:sldLayoutId id="2147483753" r:id="rId9"/>
+    <p:sldLayoutId id="2147483754" r:id="rId10"/>
+    <p:sldLayoutId id="2147483755" r:id="rId11"/>
   </p:sldLayoutIdLst>
   <p:txStyles>
     <p:titleStyle>
-      <a:lvl1pPr algn="l" defTabSz="2340955" rtl="0" eaLnBrk="1" latinLnBrk="0" hangingPunct="1">
+      <a:lvl1pPr algn="l" defTabSz="1584930" rtl="0" eaLnBrk="1" latinLnBrk="0" hangingPunct="1">
         <a:lnSpc>
           <a:spcPct val="90000"/>
         </a:lnSpc>
@@ -2681,7 +2683,7 @@
           <a:spcPct val="0"/>
         </a:spcBef>
         <a:buNone/>
-        <a:defRPr sz="11264" kern="1200">
+        <a:defRPr sz="7627" kern="1200">
           <a:solidFill>
             <a:schemeClr val="tx1"/>
           </a:solidFill>
@@ -2692,16 +2694,16 @@
       </a:lvl1pPr>
     </p:titleStyle>
     <p:bodyStyle>
-      <a:lvl1pPr marL="585239" indent="-585239" algn="l" defTabSz="2340955" rtl="0" eaLnBrk="1" latinLnBrk="0" hangingPunct="1">
+      <a:lvl1pPr marL="396232" indent="-396232" algn="l" defTabSz="1584930" rtl="0" eaLnBrk="1" latinLnBrk="0" hangingPunct="1">
         <a:lnSpc>
           <a:spcPct val="90000"/>
         </a:lnSpc>
         <a:spcBef>
-          <a:spcPts val="2560"/>
+          <a:spcPts val="1733"/>
         </a:spcBef>
         <a:buFont typeface="Arial" panose="020B0604020202020204" pitchFamily="34" charset="0"/>
         <a:buChar char="•"/>
-        <a:defRPr sz="7168" kern="1200">
+        <a:defRPr sz="4853" kern="1200">
           <a:solidFill>
             <a:schemeClr val="tx1"/>
           </a:solidFill>
@@ -2710,16 +2712,16 @@
           <a:cs typeface="+mn-cs"/>
         </a:defRPr>
       </a:lvl1pPr>
-      <a:lvl2pPr marL="1755717" indent="-585239" algn="l" defTabSz="2340955" rtl="0" eaLnBrk="1" latinLnBrk="0" hangingPunct="1">
+      <a:lvl2pPr marL="1188697" indent="-396232" algn="l" defTabSz="1584930" rtl="0" eaLnBrk="1" latinLnBrk="0" hangingPunct="1">
         <a:lnSpc>
           <a:spcPct val="90000"/>
         </a:lnSpc>
         <a:spcBef>
-          <a:spcPts val="1280"/>
+          <a:spcPts val="867"/>
         </a:spcBef>
         <a:buFont typeface="Arial" panose="020B0604020202020204" pitchFamily="34" charset="0"/>
         <a:buChar char="•"/>
-        <a:defRPr sz="6144" kern="1200">
+        <a:defRPr sz="4160" kern="1200">
           <a:solidFill>
             <a:schemeClr val="tx1"/>
           </a:solidFill>
@@ -2728,16 +2730,16 @@
           <a:cs typeface="+mn-cs"/>
         </a:defRPr>
       </a:lvl2pPr>
-      <a:lvl3pPr marL="2926194" indent="-585239" algn="l" defTabSz="2340955" rtl="0" eaLnBrk="1" latinLnBrk="0" hangingPunct="1">
+      <a:lvl3pPr marL="1981162" indent="-396232" algn="l" defTabSz="1584930" rtl="0" eaLnBrk="1" latinLnBrk="0" hangingPunct="1">
         <a:lnSpc>
           <a:spcPct val="90000"/>
         </a:lnSpc>
         <a:spcBef>
-          <a:spcPts val="1280"/>
+          <a:spcPts val="867"/>
         </a:spcBef>
         <a:buFont typeface="Arial" panose="020B0604020202020204" pitchFamily="34" charset="0"/>
         <a:buChar char="•"/>
-        <a:defRPr sz="5120" kern="1200">
+        <a:defRPr sz="3467" kern="1200">
           <a:solidFill>
             <a:schemeClr val="tx1"/>
           </a:solidFill>
@@ -2746,16 +2748,16 @@
           <a:cs typeface="+mn-cs"/>
         </a:defRPr>
       </a:lvl3pPr>
-      <a:lvl4pPr marL="4096672" indent="-585239" algn="l" defTabSz="2340955" rtl="0" eaLnBrk="1" latinLnBrk="0" hangingPunct="1">
+      <a:lvl4pPr marL="2773627" indent="-396232" algn="l" defTabSz="1584930" rtl="0" eaLnBrk="1" latinLnBrk="0" hangingPunct="1">
         <a:lnSpc>
           <a:spcPct val="90000"/>
         </a:lnSpc>
         <a:spcBef>
-          <a:spcPts val="1280"/>
+          <a:spcPts val="867"/>
         </a:spcBef>
         <a:buFont typeface="Arial" panose="020B0604020202020204" pitchFamily="34" charset="0"/>
         <a:buChar char="•"/>
-        <a:defRPr sz="4608" kern="1200">
+        <a:defRPr sz="3120" kern="1200">
           <a:solidFill>
             <a:schemeClr val="tx1"/>
           </a:solidFill>
@@ -2764,16 +2766,16 @@
           <a:cs typeface="+mn-cs"/>
         </a:defRPr>
       </a:lvl4pPr>
-      <a:lvl5pPr marL="5267150" indent="-585239" algn="l" defTabSz="2340955" rtl="0" eaLnBrk="1" latinLnBrk="0" hangingPunct="1">
+      <a:lvl5pPr marL="3566091" indent="-396232" algn="l" defTabSz="1584930" rtl="0" eaLnBrk="1" latinLnBrk="0" hangingPunct="1">
         <a:lnSpc>
           <a:spcPct val="90000"/>
         </a:lnSpc>
         <a:spcBef>
-          <a:spcPts val="1280"/>
+          <a:spcPts val="867"/>
         </a:spcBef>
         <a:buFont typeface="Arial" panose="020B0604020202020204" pitchFamily="34" charset="0"/>
         <a:buChar char="•"/>
-        <a:defRPr sz="4608" kern="1200">
+        <a:defRPr sz="3120" kern="1200">
           <a:solidFill>
             <a:schemeClr val="tx1"/>
           </a:solidFill>
@@ -2782,16 +2784,16 @@
           <a:cs typeface="+mn-cs"/>
         </a:defRPr>
       </a:lvl5pPr>
-      <a:lvl6pPr marL="6437627" indent="-585239" algn="l" defTabSz="2340955" rtl="0" eaLnBrk="1" latinLnBrk="0" hangingPunct="1">
+      <a:lvl6pPr marL="4358556" indent="-396232" algn="l" defTabSz="1584930" rtl="0" eaLnBrk="1" latinLnBrk="0" hangingPunct="1">
         <a:lnSpc>
           <a:spcPct val="90000"/>
         </a:lnSpc>
         <a:spcBef>
-          <a:spcPts val="1280"/>
+          <a:spcPts val="867"/>
         </a:spcBef>
         <a:buFont typeface="Arial" panose="020B0604020202020204" pitchFamily="34" charset="0"/>
         <a:buChar char="•"/>
-        <a:defRPr sz="4608" kern="1200">
+        <a:defRPr sz="3120" kern="1200">
           <a:solidFill>
             <a:schemeClr val="tx1"/>
           </a:solidFill>
@@ -2800,16 +2802,16 @@
           <a:cs typeface="+mn-cs"/>
         </a:defRPr>
       </a:lvl6pPr>
-      <a:lvl7pPr marL="7608105" indent="-585239" algn="l" defTabSz="2340955" rtl="0" eaLnBrk="1" latinLnBrk="0" hangingPunct="1">
+      <a:lvl7pPr marL="5151021" indent="-396232" algn="l" defTabSz="1584930" rtl="0" eaLnBrk="1" latinLnBrk="0" hangingPunct="1">
         <a:lnSpc>
           <a:spcPct val="90000"/>
         </a:lnSpc>
         <a:spcBef>
-          <a:spcPts val="1280"/>
+          <a:spcPts val="867"/>
         </a:spcBef>
         <a:buFont typeface="Arial" panose="020B0604020202020204" pitchFamily="34" charset="0"/>
         <a:buChar char="•"/>
-        <a:defRPr sz="4608" kern="1200">
+        <a:defRPr sz="3120" kern="1200">
           <a:solidFill>
             <a:schemeClr val="tx1"/>
           </a:solidFill>
@@ -2818,16 +2820,16 @@
           <a:cs typeface="+mn-cs"/>
         </a:defRPr>
       </a:lvl7pPr>
-      <a:lvl8pPr marL="8778583" indent="-585239" algn="l" defTabSz="2340955" rtl="0" eaLnBrk="1" latinLnBrk="0" hangingPunct="1">
+      <a:lvl8pPr marL="5943486" indent="-396232" algn="l" defTabSz="1584930" rtl="0" eaLnBrk="1" latinLnBrk="0" hangingPunct="1">
         <a:lnSpc>
           <a:spcPct val="90000"/>
         </a:lnSpc>
         <a:spcBef>
-          <a:spcPts val="1280"/>
+          <a:spcPts val="867"/>
         </a:spcBef>
         <a:buFont typeface="Arial" panose="020B0604020202020204" pitchFamily="34" charset="0"/>
         <a:buChar char="•"/>
-        <a:defRPr sz="4608" kern="1200">
+        <a:defRPr sz="3120" kern="1200">
           <a:solidFill>
             <a:schemeClr val="tx1"/>
           </a:solidFill>
@@ -2836,16 +2838,16 @@
           <a:cs typeface="+mn-cs"/>
         </a:defRPr>
       </a:lvl8pPr>
-      <a:lvl9pPr marL="9949061" indent="-585239" algn="l" defTabSz="2340955" rtl="0" eaLnBrk="1" latinLnBrk="0" hangingPunct="1">
+      <a:lvl9pPr marL="6735950" indent="-396232" algn="l" defTabSz="1584930" rtl="0" eaLnBrk="1" latinLnBrk="0" hangingPunct="1">
         <a:lnSpc>
           <a:spcPct val="90000"/>
         </a:lnSpc>
         <a:spcBef>
-          <a:spcPts val="1280"/>
+          <a:spcPts val="867"/>
         </a:spcBef>
         <a:buFont typeface="Arial" panose="020B0604020202020204" pitchFamily="34" charset="0"/>
         <a:buChar char="•"/>
-        <a:defRPr sz="4608" kern="1200">
+        <a:defRPr sz="3120" kern="1200">
           <a:solidFill>
             <a:schemeClr val="tx1"/>
           </a:solidFill>
@@ -2859,8 +2861,8 @@
       <a:defPPr>
         <a:defRPr lang="en-US"/>
       </a:defPPr>
-      <a:lvl1pPr marL="0" algn="l" defTabSz="2340955" rtl="0" eaLnBrk="1" latinLnBrk="0" hangingPunct="1">
-        <a:defRPr sz="4608" kern="1200">
+      <a:lvl1pPr marL="0" algn="l" defTabSz="1584930" rtl="0" eaLnBrk="1" latinLnBrk="0" hangingPunct="1">
+        <a:defRPr sz="3120" kern="1200">
           <a:solidFill>
             <a:schemeClr val="tx1"/>
           </a:solidFill>
@@ -2869,8 +2871,8 @@
           <a:cs typeface="+mn-cs"/>
         </a:defRPr>
       </a:lvl1pPr>
-      <a:lvl2pPr marL="1170478" algn="l" defTabSz="2340955" rtl="0" eaLnBrk="1" latinLnBrk="0" hangingPunct="1">
-        <a:defRPr sz="4608" kern="1200">
+      <a:lvl2pPr marL="792465" algn="l" defTabSz="1584930" rtl="0" eaLnBrk="1" latinLnBrk="0" hangingPunct="1">
+        <a:defRPr sz="3120" kern="1200">
           <a:solidFill>
             <a:schemeClr val="tx1"/>
           </a:solidFill>
@@ -2879,8 +2881,8 @@
           <a:cs typeface="+mn-cs"/>
         </a:defRPr>
       </a:lvl2pPr>
-      <a:lvl3pPr marL="2340955" algn="l" defTabSz="2340955" rtl="0" eaLnBrk="1" latinLnBrk="0" hangingPunct="1">
-        <a:defRPr sz="4608" kern="1200">
+      <a:lvl3pPr marL="1584930" algn="l" defTabSz="1584930" rtl="0" eaLnBrk="1" latinLnBrk="0" hangingPunct="1">
+        <a:defRPr sz="3120" kern="1200">
           <a:solidFill>
             <a:schemeClr val="tx1"/>
           </a:solidFill>
@@ -2889,8 +2891,8 @@
           <a:cs typeface="+mn-cs"/>
         </a:defRPr>
       </a:lvl3pPr>
-      <a:lvl4pPr marL="3511433" algn="l" defTabSz="2340955" rtl="0" eaLnBrk="1" latinLnBrk="0" hangingPunct="1">
-        <a:defRPr sz="4608" kern="1200">
+      <a:lvl4pPr marL="2377394" algn="l" defTabSz="1584930" rtl="0" eaLnBrk="1" latinLnBrk="0" hangingPunct="1">
+        <a:defRPr sz="3120" kern="1200">
           <a:solidFill>
             <a:schemeClr val="tx1"/>
           </a:solidFill>
@@ -2899,8 +2901,8 @@
           <a:cs typeface="+mn-cs"/>
         </a:defRPr>
       </a:lvl4pPr>
-      <a:lvl5pPr marL="4681911" algn="l" defTabSz="2340955" rtl="0" eaLnBrk="1" latinLnBrk="0" hangingPunct="1">
-        <a:defRPr sz="4608" kern="1200">
+      <a:lvl5pPr marL="3169859" algn="l" defTabSz="1584930" rtl="0" eaLnBrk="1" latinLnBrk="0" hangingPunct="1">
+        <a:defRPr sz="3120" kern="1200">
           <a:solidFill>
             <a:schemeClr val="tx1"/>
           </a:solidFill>
@@ -2909,8 +2911,8 @@
           <a:cs typeface="+mn-cs"/>
         </a:defRPr>
       </a:lvl5pPr>
-      <a:lvl6pPr marL="5852389" algn="l" defTabSz="2340955" rtl="0" eaLnBrk="1" latinLnBrk="0" hangingPunct="1">
-        <a:defRPr sz="4608" kern="1200">
+      <a:lvl6pPr marL="3962324" algn="l" defTabSz="1584930" rtl="0" eaLnBrk="1" latinLnBrk="0" hangingPunct="1">
+        <a:defRPr sz="3120" kern="1200">
           <a:solidFill>
             <a:schemeClr val="tx1"/>
           </a:solidFill>
@@ -2919,8 +2921,8 @@
           <a:cs typeface="+mn-cs"/>
         </a:defRPr>
       </a:lvl6pPr>
-      <a:lvl7pPr marL="7022866" algn="l" defTabSz="2340955" rtl="0" eaLnBrk="1" latinLnBrk="0" hangingPunct="1">
-        <a:defRPr sz="4608" kern="1200">
+      <a:lvl7pPr marL="4754789" algn="l" defTabSz="1584930" rtl="0" eaLnBrk="1" latinLnBrk="0" hangingPunct="1">
+        <a:defRPr sz="3120" kern="1200">
           <a:solidFill>
             <a:schemeClr val="tx1"/>
           </a:solidFill>
@@ -2929,8 +2931,8 @@
           <a:cs typeface="+mn-cs"/>
         </a:defRPr>
       </a:lvl7pPr>
-      <a:lvl8pPr marL="8193344" algn="l" defTabSz="2340955" rtl="0" eaLnBrk="1" latinLnBrk="0" hangingPunct="1">
-        <a:defRPr sz="4608" kern="1200">
+      <a:lvl8pPr marL="5547253" algn="l" defTabSz="1584930" rtl="0" eaLnBrk="1" latinLnBrk="0" hangingPunct="1">
+        <a:defRPr sz="3120" kern="1200">
           <a:solidFill>
             <a:schemeClr val="tx1"/>
           </a:solidFill>
@@ -2939,8 +2941,8 @@
           <a:cs typeface="+mn-cs"/>
         </a:defRPr>
       </a:lvl8pPr>
-      <a:lvl9pPr marL="9363822" algn="l" defTabSz="2340955" rtl="0" eaLnBrk="1" latinLnBrk="0" hangingPunct="1">
-        <a:defRPr sz="4608" kern="1200">
+      <a:lvl9pPr marL="6339718" algn="l" defTabSz="1584930" rtl="0" eaLnBrk="1" latinLnBrk="0" hangingPunct="1">
+        <a:defRPr sz="3120" kern="1200">
           <a:solidFill>
             <a:schemeClr val="tx1"/>
           </a:solidFill>
@@ -2973,10 +2975,10 @@
       </p:grpSpPr>
       <p:grpSp>
         <p:nvGrpSpPr>
-          <p:cNvPr id="29" name="Group 28">
+          <p:cNvPr id="10" name="Group 9">
             <a:extLst>
               <a:ext uri="{FF2B5EF4-FFF2-40B4-BE49-F238E27FC236}">
-                <a16:creationId xmlns:a16="http://schemas.microsoft.com/office/drawing/2014/main" id="{4ED352B1-8471-138B-DD03-8FB44E698C80}"/>
+                <a16:creationId xmlns:a16="http://schemas.microsoft.com/office/drawing/2014/main" id="{5A5051A4-AEAD-2A46-1735-41CEA2008078}"/>
               </a:ext>
             </a:extLst>
           </p:cNvPr>
@@ -2985,18 +2987,18 @@
         </p:nvGrpSpPr>
         <p:grpSpPr>
           <a:xfrm>
-            <a:off x="388593" y="743570"/>
-            <a:ext cx="22632088" cy="17715260"/>
-            <a:chOff x="329750" y="486382"/>
-            <a:chExt cx="22632088" cy="17715260"/>
+            <a:off x="304637" y="775252"/>
+            <a:ext cx="19952825" cy="10734345"/>
+            <a:chOff x="304637" y="775252"/>
+            <a:chExt cx="19952825" cy="10734345"/>
           </a:xfrm>
         </p:grpSpPr>
         <p:pic>
           <p:nvPicPr>
-            <p:cNvPr id="8" name="Picture 7" descr="A collage of graphs and diagrams&#10;&#10;Description automatically generated">
+            <p:cNvPr id="5" name="Picture 4" descr="A group of graphs showing different colors&#10;&#10;Description automatically generated with medium confidence">
               <a:extLst>
                 <a:ext uri="{FF2B5EF4-FFF2-40B4-BE49-F238E27FC236}">
-                  <a16:creationId xmlns:a16="http://schemas.microsoft.com/office/drawing/2014/main" id="{A5F046DD-3009-235D-442A-8034DA2F7AC7}"/>
+                  <a16:creationId xmlns:a16="http://schemas.microsoft.com/office/drawing/2014/main" id="{B96922DE-F224-853B-4D32-3CEEA4EBEDB7}"/>
                 </a:ext>
               </a:extLst>
             </p:cNvPr>
@@ -3013,13 +3015,13 @@
                 </a:ext>
               </a:extLst>
             </a:blip>
-            <a:srcRect t="32879" r="16706" b="33682"/>
+            <a:srcRect r="16075" b="50715"/>
             <a:stretch/>
           </p:blipFill>
           <p:spPr>
             <a:xfrm>
-              <a:off x="586738" y="6504242"/>
-              <a:ext cx="18480612" cy="5564389"/>
+              <a:off x="304637" y="775252"/>
+              <a:ext cx="19952825" cy="5094478"/>
             </a:xfrm>
             <a:prstGeom prst="rect">
               <a:avLst/>
@@ -3028,10 +3030,10 @@
         </p:pic>
         <p:pic>
           <p:nvPicPr>
-            <p:cNvPr id="12" name="Picture 11" descr="A collage of graphs and diagrams&#10;&#10;Description automatically generated">
+            <p:cNvPr id="6" name="Picture 5" descr="A group of graphs showing different colors&#10;&#10;Description automatically generated with medium confidence">
               <a:extLst>
                 <a:ext uri="{FF2B5EF4-FFF2-40B4-BE49-F238E27FC236}">
-                  <a16:creationId xmlns:a16="http://schemas.microsoft.com/office/drawing/2014/main" id="{75A9D681-6545-C058-6441-375D8784E9F8}"/>
+                  <a16:creationId xmlns:a16="http://schemas.microsoft.com/office/drawing/2014/main" id="{82122924-415B-A061-209B-859230FA39FF}"/>
                 </a:ext>
               </a:extLst>
             </p:cNvPr>
@@ -3048,124 +3050,75 @@
                 </a:ext>
               </a:extLst>
             </a:blip>
-            <a:srcRect r="16706" b="66561"/>
+            <a:srcRect t="49813" r="16075"/>
             <a:stretch/>
           </p:blipFill>
           <p:spPr>
             <a:xfrm>
-              <a:off x="586738" y="939853"/>
-              <a:ext cx="18480612" cy="5564389"/>
+              <a:off x="304637" y="6321958"/>
+              <a:ext cx="19952825" cy="5187639"/>
             </a:xfrm>
             <a:prstGeom prst="rect">
               <a:avLst/>
             </a:prstGeom>
           </p:spPr>
         </p:pic>
-        <p:pic>
-          <p:nvPicPr>
-            <p:cNvPr id="13" name="Picture 12" descr="A collage of graphs and diagrams&#10;&#10;Description automatically generated">
-              <a:extLst>
-                <a:ext uri="{FF2B5EF4-FFF2-40B4-BE49-F238E27FC236}">
-                  <a16:creationId xmlns:a16="http://schemas.microsoft.com/office/drawing/2014/main" id="{58CF229D-DA55-03C2-11D8-67C383E21943}"/>
-                </a:ext>
-              </a:extLst>
-            </p:cNvPr>
-            <p:cNvPicPr>
-              <a:picLocks noChangeAspect="1"/>
-            </p:cNvPicPr>
-            <p:nvPr/>
-          </p:nvPicPr>
-          <p:blipFill rotWithShape="1">
-            <a:blip r:embed="rId2">
-              <a:extLst>
-                <a:ext uri="{28A0092B-C50C-407E-A947-70E740481C1C}">
-                  <a14:useLocalDpi xmlns:a14="http://schemas.microsoft.com/office/drawing/2010/main" val="0"/>
-                </a:ext>
-              </a:extLst>
-            </a:blip>
-            <a:srcRect l="50037" t="66341"/>
-            <a:stretch/>
-          </p:blipFill>
-          <p:spPr>
-            <a:xfrm>
-              <a:off x="11876494" y="12177998"/>
-              <a:ext cx="11085344" cy="5600969"/>
-            </a:xfrm>
-            <a:prstGeom prst="rect">
-              <a:avLst/>
-            </a:prstGeom>
-          </p:spPr>
-        </p:pic>
-        <p:pic>
-          <p:nvPicPr>
-            <p:cNvPr id="14" name="Picture 13" descr="A collage of graphs and diagrams&#10;&#10;Description automatically generated">
-              <a:extLst>
-                <a:ext uri="{FF2B5EF4-FFF2-40B4-BE49-F238E27FC236}">
-                  <a16:creationId xmlns:a16="http://schemas.microsoft.com/office/drawing/2014/main" id="{80CA01F1-946B-03CD-84D8-2B1F5589C0F9}"/>
-                </a:ext>
-              </a:extLst>
-            </p:cNvPr>
-            <p:cNvPicPr>
-              <a:picLocks noChangeAspect="1"/>
-            </p:cNvPicPr>
-            <p:nvPr/>
-          </p:nvPicPr>
-          <p:blipFill rotWithShape="1">
-            <a:blip r:embed="rId2">
-              <a:extLst>
-                <a:ext uri="{28A0092B-C50C-407E-A947-70E740481C1C}">
-                  <a14:useLocalDpi xmlns:a14="http://schemas.microsoft.com/office/drawing/2010/main" val="0"/>
-                </a:ext>
-              </a:extLst>
-            </a:blip>
-            <a:srcRect t="66903" r="50421"/>
-            <a:stretch/>
-          </p:blipFill>
-          <p:spPr>
-            <a:xfrm>
-              <a:off x="619373" y="12694173"/>
-              <a:ext cx="11000134" cy="5507469"/>
-            </a:xfrm>
-            <a:prstGeom prst="rect">
-              <a:avLst/>
-            </a:prstGeom>
-          </p:spPr>
-        </p:pic>
-        <p:pic>
-          <p:nvPicPr>
-            <p:cNvPr id="15" name="Picture 14" descr="A collage of graphs and diagrams&#10;&#10;Description automatically generated">
-              <a:extLst>
-                <a:ext uri="{FF2B5EF4-FFF2-40B4-BE49-F238E27FC236}">
-                  <a16:creationId xmlns:a16="http://schemas.microsoft.com/office/drawing/2014/main" id="{BC009E0C-FE68-35C3-083B-60EA303E79BF}"/>
-                </a:ext>
-              </a:extLst>
-            </p:cNvPr>
-            <p:cNvPicPr>
-              <a:picLocks noChangeAspect="1"/>
-            </p:cNvPicPr>
-            <p:nvPr/>
-          </p:nvPicPr>
-          <p:blipFill rotWithShape="1">
-            <a:blip r:embed="rId2">
-              <a:extLst>
-                <a:ext uri="{28A0092B-C50C-407E-A947-70E740481C1C}">
-                  <a14:useLocalDpi xmlns:a14="http://schemas.microsoft.com/office/drawing/2010/main" val="0"/>
-                </a:ext>
-              </a:extLst>
-            </a:blip>
-            <a:srcRect l="83605" t="14770" b="46764"/>
-            <a:stretch/>
-          </p:blipFill>
-          <p:spPr>
-            <a:xfrm>
-              <a:off x="19324337" y="3303842"/>
-              <a:ext cx="3637501" cy="6400800"/>
-            </a:xfrm>
-            <a:prstGeom prst="rect">
-              <a:avLst/>
-            </a:prstGeom>
-          </p:spPr>
-        </p:pic>
+      </p:grpSp>
+      <p:pic>
+        <p:nvPicPr>
+          <p:cNvPr id="8" name="Picture 7" descr="A group of graphs showing different colors&#10;&#10;Description automatically generated with medium confidence">
+            <a:extLst>
+              <a:ext uri="{FF2B5EF4-FFF2-40B4-BE49-F238E27FC236}">
+                <a16:creationId xmlns:a16="http://schemas.microsoft.com/office/drawing/2014/main" id="{D57E3C46-E697-5D03-3776-41959B63085A}"/>
+              </a:ext>
+            </a:extLst>
+          </p:cNvPr>
+          <p:cNvPicPr>
+            <a:picLocks noChangeAspect="1"/>
+          </p:cNvPicPr>
+          <p:nvPr/>
+        </p:nvPicPr>
+        <p:blipFill rotWithShape="1">
+          <a:blip r:embed="rId2">
+            <a:extLst>
+              <a:ext uri="{28A0092B-C50C-407E-A947-70E740481C1C}">
+                <a14:useLocalDpi xmlns:a14="http://schemas.microsoft.com/office/drawing/2010/main" val="0"/>
+              </a:ext>
+            </a:extLst>
+          </a:blip>
+          <a:srcRect l="84421" r="1314"/>
+          <a:stretch/>
+        </p:blipFill>
+        <p:spPr>
+          <a:xfrm>
+            <a:off x="20257462" y="775252"/>
+            <a:ext cx="3391382" cy="10336696"/>
+          </a:xfrm>
+          <a:prstGeom prst="rect">
+            <a:avLst/>
+          </a:prstGeom>
+        </p:spPr>
+      </p:pic>
+      <p:grpSp>
+        <p:nvGrpSpPr>
+          <p:cNvPr id="18" name="Group 17">
+            <a:extLst>
+              <a:ext uri="{FF2B5EF4-FFF2-40B4-BE49-F238E27FC236}">
+                <a16:creationId xmlns:a16="http://schemas.microsoft.com/office/drawing/2014/main" id="{FF089B04-F03D-89EA-5BBC-EE47A8F468BD}"/>
+              </a:ext>
+            </a:extLst>
+          </p:cNvPr>
+          <p:cNvGrpSpPr/>
+          <p:nvPr/>
+        </p:nvGrpSpPr>
+        <p:grpSpPr>
+          <a:xfrm>
+            <a:off x="304637" y="323024"/>
+            <a:ext cx="320374" cy="6401107"/>
+            <a:chOff x="1729159" y="-89178"/>
+            <a:chExt cx="517527" cy="10340250"/>
+          </a:xfrm>
+        </p:grpSpPr>
         <p:sp>
           <p:nvSpPr>
             <p:cNvPr id="16" name="TextBox 15">
@@ -3180,8 +3133,8 @@
           </p:nvSpPr>
           <p:spPr>
             <a:xfrm>
-              <a:off x="329751" y="486382"/>
-              <a:ext cx="513977" cy="908582"/>
+              <a:off x="1729159" y="-89178"/>
+              <a:ext cx="513976" cy="1380186"/>
             </a:xfrm>
             <a:prstGeom prst="rect">
               <a:avLst/>
@@ -3196,19 +3149,19 @@
             <a:p>
               <a:pPr algn="ctr"/>
               <a:r>
-                <a:rPr lang="en-US" sz="5304" dirty="0"/>
+                <a:rPr lang="en-US" sz="4952" dirty="0"/>
                 <a:t>A</a:t>
               </a:r>
-              <a:endParaRPr lang="en-US" sz="3949" dirty="0"/>
+              <a:endParaRPr lang="en-US" sz="3714" dirty="0"/>
             </a:p>
           </p:txBody>
         </p:sp>
         <p:sp>
           <p:nvSpPr>
-            <p:cNvPr id="26" name="TextBox 25">
+            <p:cNvPr id="11" name="TextBox 10">
               <a:extLst>
                 <a:ext uri="{FF2B5EF4-FFF2-40B4-BE49-F238E27FC236}">
-                  <a16:creationId xmlns:a16="http://schemas.microsoft.com/office/drawing/2014/main" id="{7D39908C-CE31-21A8-DB00-AFEF0331C99B}"/>
+                  <a16:creationId xmlns:a16="http://schemas.microsoft.com/office/drawing/2014/main" id="{0991532C-AC48-45F6-4909-E8876D5DF76A}"/>
                 </a:ext>
               </a:extLst>
             </p:cNvPr>
@@ -3217,8 +3170,8 @@
           </p:nvSpPr>
           <p:spPr>
             <a:xfrm>
-              <a:off x="329751" y="6050770"/>
-              <a:ext cx="513977" cy="908582"/>
+              <a:off x="1732710" y="8870886"/>
+              <a:ext cx="513976" cy="1380186"/>
             </a:xfrm>
             <a:prstGeom prst="rect">
               <a:avLst/>
@@ -3233,166 +3186,13 @@
             <a:p>
               <a:pPr algn="ctr"/>
               <a:r>
-                <a:rPr lang="en-US" sz="5304" dirty="0"/>
+                <a:rPr lang="en-US" sz="4952" dirty="0"/>
                 <a:t>B</a:t>
               </a:r>
-              <a:endParaRPr lang="en-US" sz="3949" dirty="0"/>
+              <a:endParaRPr lang="en-US" sz="3714" dirty="0"/>
             </a:p>
           </p:txBody>
         </p:sp>
-        <p:sp>
-          <p:nvSpPr>
-            <p:cNvPr id="27" name="TextBox 26">
-              <a:extLst>
-                <a:ext uri="{FF2B5EF4-FFF2-40B4-BE49-F238E27FC236}">
-                  <a16:creationId xmlns:a16="http://schemas.microsoft.com/office/drawing/2014/main" id="{8BAD1ED7-FCE5-6566-DDFB-47D6B8EC3C4A}"/>
-                </a:ext>
-              </a:extLst>
-            </p:cNvPr>
-            <p:cNvSpPr txBox="1"/>
-            <p:nvPr/>
-          </p:nvSpPr>
-          <p:spPr>
-            <a:xfrm>
-              <a:off x="329750" y="11787229"/>
-              <a:ext cx="513977" cy="908582"/>
-            </a:xfrm>
-            <a:prstGeom prst="rect">
-              <a:avLst/>
-            </a:prstGeom>
-            <a:noFill/>
-          </p:spPr>
-          <p:txBody>
-            <a:bodyPr wrap="square" rtlCol="0">
-              <a:spAutoFit/>
-            </a:bodyPr>
-            <a:lstStyle/>
-            <a:p>
-              <a:pPr algn="ctr"/>
-              <a:r>
-                <a:rPr lang="en-US" sz="5304" dirty="0"/>
-                <a:t>C</a:t>
-              </a:r>
-              <a:endParaRPr lang="en-US" sz="3949" dirty="0"/>
-            </a:p>
-          </p:txBody>
-        </p:sp>
-        <p:sp>
-          <p:nvSpPr>
-            <p:cNvPr id="28" name="TextBox 27">
-              <a:extLst>
-                <a:ext uri="{FF2B5EF4-FFF2-40B4-BE49-F238E27FC236}">
-                  <a16:creationId xmlns:a16="http://schemas.microsoft.com/office/drawing/2014/main" id="{82DC070A-1510-54D9-1648-0AE7B22A5A1B}"/>
-                </a:ext>
-              </a:extLst>
-            </p:cNvPr>
-            <p:cNvSpPr txBox="1"/>
-            <p:nvPr/>
-          </p:nvSpPr>
-          <p:spPr>
-            <a:xfrm>
-              <a:off x="11390428" y="12013966"/>
-              <a:ext cx="513977" cy="908582"/>
-            </a:xfrm>
-            <a:prstGeom prst="rect">
-              <a:avLst/>
-            </a:prstGeom>
-            <a:noFill/>
-          </p:spPr>
-          <p:txBody>
-            <a:bodyPr wrap="square" rtlCol="0">
-              <a:spAutoFit/>
-            </a:bodyPr>
-            <a:lstStyle/>
-            <a:p>
-              <a:pPr algn="ctr"/>
-              <a:r>
-                <a:rPr lang="en-US" sz="5304" dirty="0"/>
-                <a:t>D</a:t>
-              </a:r>
-              <a:endParaRPr lang="en-US" sz="3949" dirty="0"/>
-            </a:p>
-          </p:txBody>
-        </p:sp>
-        <p:grpSp>
-          <p:nvGrpSpPr>
-            <p:cNvPr id="25" name="Group 24">
-              <a:extLst>
-                <a:ext uri="{FF2B5EF4-FFF2-40B4-BE49-F238E27FC236}">
-                  <a16:creationId xmlns:a16="http://schemas.microsoft.com/office/drawing/2014/main" id="{887C85D4-2441-AAB0-85F3-7EFAB886C64C}"/>
-                </a:ext>
-              </a:extLst>
-            </p:cNvPr>
-            <p:cNvGrpSpPr/>
-            <p:nvPr/>
-          </p:nvGrpSpPr>
-          <p:grpSpPr>
-            <a:xfrm>
-              <a:off x="14616221" y="8845616"/>
-              <a:ext cx="1963844" cy="1945337"/>
-              <a:chOff x="13881527" y="8147151"/>
-              <a:chExt cx="3943553" cy="3906389"/>
-            </a:xfrm>
-          </p:grpSpPr>
-          <p:pic>
-            <p:nvPicPr>
-              <p:cNvPr id="23" name="Picture 22">
-                <a:extLst>
-                  <a:ext uri="{FF2B5EF4-FFF2-40B4-BE49-F238E27FC236}">
-                    <a16:creationId xmlns:a16="http://schemas.microsoft.com/office/drawing/2014/main" id="{B3C429B4-86B7-A8F8-4EA8-EA97197739ED}"/>
-                  </a:ext>
-                </a:extLst>
-              </p:cNvPr>
-              <p:cNvPicPr>
-                <a:picLocks noChangeAspect="1"/>
-              </p:cNvPicPr>
-              <p:nvPr/>
-            </p:nvPicPr>
-            <p:blipFill rotWithShape="1">
-              <a:blip r:embed="rId3"/>
-              <a:srcRect t="62570" b="6189"/>
-              <a:stretch/>
-            </p:blipFill>
-            <p:spPr>
-              <a:xfrm>
-                <a:off x="13881527" y="10652909"/>
-                <a:ext cx="3943553" cy="1400631"/>
-              </a:xfrm>
-              <a:prstGeom prst="rect">
-                <a:avLst/>
-              </a:prstGeom>
-            </p:spPr>
-          </p:pic>
-          <p:pic>
-            <p:nvPicPr>
-              <p:cNvPr id="24" name="Picture 23">
-                <a:extLst>
-                  <a:ext uri="{FF2B5EF4-FFF2-40B4-BE49-F238E27FC236}">
-                    <a16:creationId xmlns:a16="http://schemas.microsoft.com/office/drawing/2014/main" id="{2A16BB2E-6A90-CF44-27EE-6798B3C54B33}"/>
-                  </a:ext>
-                </a:extLst>
-              </p:cNvPr>
-              <p:cNvPicPr>
-                <a:picLocks noChangeAspect="1"/>
-              </p:cNvPicPr>
-              <p:nvPr/>
-            </p:nvPicPr>
-            <p:blipFill rotWithShape="1">
-              <a:blip r:embed="rId3"/>
-              <a:srcRect r="36353" b="43387"/>
-              <a:stretch/>
-            </p:blipFill>
-            <p:spPr>
-              <a:xfrm>
-                <a:off x="13881527" y="8147151"/>
-                <a:ext cx="2509939" cy="2538160"/>
-              </a:xfrm>
-              <a:prstGeom prst="rect">
-                <a:avLst/>
-              </a:prstGeom>
-            </p:spPr>
-          </p:pic>
-        </p:grpSp>
       </p:grpSp>
     </p:spTree>
     <p:extLst>

</xml_diff>

<commit_message>
more revision + formatting
</commit_message>
<xml_diff>
--- a/manuscript/final_figures/Figure_Box1_cleanup.pptx
+++ b/manuscript/final_figures/Figure_Box1_cleanup.pptx
@@ -243,7 +243,7 @@
           <a:p>
             <a:fld id="{9989B3A2-2388-44BE-9854-4BCC09CB1095}" type="datetimeFigureOut">
               <a:rPr lang="en-US" smtClean="0"/>
-              <a:t>1/22/2024</a:t>
+              <a:t>1/25/2024</a:t>
             </a:fld>
             <a:endParaRPr lang="en-US"/>
           </a:p>
@@ -413,7 +413,7 @@
           <a:p>
             <a:fld id="{9989B3A2-2388-44BE-9854-4BCC09CB1095}" type="datetimeFigureOut">
               <a:rPr lang="en-US" smtClean="0"/>
-              <a:t>1/22/2024</a:t>
+              <a:t>1/25/2024</a:t>
             </a:fld>
             <a:endParaRPr lang="en-US"/>
           </a:p>
@@ -593,7 +593,7 @@
           <a:p>
             <a:fld id="{9989B3A2-2388-44BE-9854-4BCC09CB1095}" type="datetimeFigureOut">
               <a:rPr lang="en-US" smtClean="0"/>
-              <a:t>1/22/2024</a:t>
+              <a:t>1/25/2024</a:t>
             </a:fld>
             <a:endParaRPr lang="en-US"/>
           </a:p>
@@ -763,7 +763,7 @@
           <a:p>
             <a:fld id="{9989B3A2-2388-44BE-9854-4BCC09CB1095}" type="datetimeFigureOut">
               <a:rPr lang="en-US" smtClean="0"/>
-              <a:t>1/22/2024</a:t>
+              <a:t>1/25/2024</a:t>
             </a:fld>
             <a:endParaRPr lang="en-US"/>
           </a:p>
@@ -1009,7 +1009,7 @@
           <a:p>
             <a:fld id="{9989B3A2-2388-44BE-9854-4BCC09CB1095}" type="datetimeFigureOut">
               <a:rPr lang="en-US" smtClean="0"/>
-              <a:t>1/22/2024</a:t>
+              <a:t>1/25/2024</a:t>
             </a:fld>
             <a:endParaRPr lang="en-US"/>
           </a:p>
@@ -1241,7 +1241,7 @@
           <a:p>
             <a:fld id="{9989B3A2-2388-44BE-9854-4BCC09CB1095}" type="datetimeFigureOut">
               <a:rPr lang="en-US" smtClean="0"/>
-              <a:t>1/22/2024</a:t>
+              <a:t>1/25/2024</a:t>
             </a:fld>
             <a:endParaRPr lang="en-US"/>
           </a:p>
@@ -1608,7 +1608,7 @@
           <a:p>
             <a:fld id="{9989B3A2-2388-44BE-9854-4BCC09CB1095}" type="datetimeFigureOut">
               <a:rPr lang="en-US" smtClean="0"/>
-              <a:t>1/22/2024</a:t>
+              <a:t>1/25/2024</a:t>
             </a:fld>
             <a:endParaRPr lang="en-US"/>
           </a:p>
@@ -1726,7 +1726,7 @@
           <a:p>
             <a:fld id="{9989B3A2-2388-44BE-9854-4BCC09CB1095}" type="datetimeFigureOut">
               <a:rPr lang="en-US" smtClean="0"/>
-              <a:t>1/22/2024</a:t>
+              <a:t>1/25/2024</a:t>
             </a:fld>
             <a:endParaRPr lang="en-US"/>
           </a:p>
@@ -1821,7 +1821,7 @@
           <a:p>
             <a:fld id="{9989B3A2-2388-44BE-9854-4BCC09CB1095}" type="datetimeFigureOut">
               <a:rPr lang="en-US" smtClean="0"/>
-              <a:t>1/22/2024</a:t>
+              <a:t>1/25/2024</a:t>
             </a:fld>
             <a:endParaRPr lang="en-US"/>
           </a:p>
@@ -2098,7 +2098,7 @@
           <a:p>
             <a:fld id="{9989B3A2-2388-44BE-9854-4BCC09CB1095}" type="datetimeFigureOut">
               <a:rPr lang="en-US" smtClean="0"/>
-              <a:t>1/22/2024</a:t>
+              <a:t>1/25/2024</a:t>
             </a:fld>
             <a:endParaRPr lang="en-US"/>
           </a:p>
@@ -2355,7 +2355,7 @@
           <a:p>
             <a:fld id="{9989B3A2-2388-44BE-9854-4BCC09CB1095}" type="datetimeFigureOut">
               <a:rPr lang="en-US" smtClean="0"/>
-              <a:t>1/22/2024</a:t>
+              <a:t>1/25/2024</a:t>
             </a:fld>
             <a:endParaRPr lang="en-US"/>
           </a:p>
@@ -2568,7 +2568,7 @@
           <a:p>
             <a:fld id="{9989B3A2-2388-44BE-9854-4BCC09CB1095}" type="datetimeFigureOut">
               <a:rPr lang="en-US" smtClean="0"/>
-              <a:t>1/22/2024</a:t>
+              <a:t>1/25/2024</a:t>
             </a:fld>
             <a:endParaRPr lang="en-US"/>
           </a:p>
@@ -2975,10 +2975,10 @@
       </p:grpSpPr>
       <p:grpSp>
         <p:nvGrpSpPr>
-          <p:cNvPr id="10" name="Group 9">
+          <p:cNvPr id="13" name="Group 12">
             <a:extLst>
               <a:ext uri="{FF2B5EF4-FFF2-40B4-BE49-F238E27FC236}">
-                <a16:creationId xmlns:a16="http://schemas.microsoft.com/office/drawing/2014/main" id="{5A5051A4-AEAD-2A46-1735-41CEA2008078}"/>
+                <a16:creationId xmlns:a16="http://schemas.microsoft.com/office/drawing/2014/main" id="{4C0A83DB-3AC3-FA73-7C20-6CED4EC90AEF}"/>
               </a:ext>
             </a:extLst>
           </p:cNvPr>
@@ -2987,18 +2987,18 @@
         </p:nvGrpSpPr>
         <p:grpSpPr>
           <a:xfrm>
-            <a:off x="304637" y="775252"/>
-            <a:ext cx="19952825" cy="10734345"/>
-            <a:chOff x="304637" y="775252"/>
-            <a:chExt cx="19952825" cy="10734345"/>
+            <a:off x="926711" y="467203"/>
+            <a:ext cx="18571136" cy="11359447"/>
+            <a:chOff x="463725" y="423608"/>
+            <a:chExt cx="18571136" cy="11359447"/>
           </a:xfrm>
         </p:grpSpPr>
         <p:pic>
           <p:nvPicPr>
-            <p:cNvPr id="5" name="Picture 4" descr="A group of graphs showing different colors&#10;&#10;Description automatically generated with medium confidence">
+            <p:cNvPr id="7" name="Picture 6" descr="A group of graphs showing different colors&#10;&#10;Description automatically generated with medium confidence">
               <a:extLst>
                 <a:ext uri="{FF2B5EF4-FFF2-40B4-BE49-F238E27FC236}">
-                  <a16:creationId xmlns:a16="http://schemas.microsoft.com/office/drawing/2014/main" id="{B96922DE-F224-853B-4D32-3CEEA4EBEDB7}"/>
+                  <a16:creationId xmlns:a16="http://schemas.microsoft.com/office/drawing/2014/main" id="{F9CEDBA1-EF76-8827-A3E9-66E2C686AC30}"/>
                 </a:ext>
               </a:extLst>
             </p:cNvPr>
@@ -3015,13 +3015,13 @@
                 </a:ext>
               </a:extLst>
             </a:blip>
-            <a:srcRect r="16075" b="50715"/>
+            <a:srcRect t="49378" r="16415"/>
             <a:stretch/>
           </p:blipFill>
           <p:spPr>
             <a:xfrm>
-              <a:off x="304637" y="775252"/>
-              <a:ext cx="19952825" cy="5094478"/>
+              <a:off x="463725" y="6159446"/>
+              <a:ext cx="18571136" cy="5623609"/>
             </a:xfrm>
             <a:prstGeom prst="rect">
               <a:avLst/>
@@ -3030,10 +3030,10 @@
         </p:pic>
         <p:pic>
           <p:nvPicPr>
-            <p:cNvPr id="6" name="Picture 5" descr="A group of graphs showing different colors&#10;&#10;Description automatically generated with medium confidence">
+            <p:cNvPr id="9" name="Picture 8" descr="A group of graphs showing different colors&#10;&#10;Description automatically generated with medium confidence">
               <a:extLst>
                 <a:ext uri="{FF2B5EF4-FFF2-40B4-BE49-F238E27FC236}">
-                  <a16:creationId xmlns:a16="http://schemas.microsoft.com/office/drawing/2014/main" id="{82122924-415B-A061-209B-859230FA39FF}"/>
+                  <a16:creationId xmlns:a16="http://schemas.microsoft.com/office/drawing/2014/main" id="{E66C32BC-9B9B-DF3D-8244-06889F10585F}"/>
                 </a:ext>
               </a:extLst>
             </p:cNvPr>
@@ -3050,13 +3050,13 @@
                 </a:ext>
               </a:extLst>
             </a:blip>
-            <a:srcRect t="49813" r="16075"/>
+            <a:srcRect r="16415" b="50311"/>
             <a:stretch/>
           </p:blipFill>
           <p:spPr>
             <a:xfrm>
-              <a:off x="304637" y="6321958"/>
-              <a:ext cx="19952825" cy="5187639"/>
+              <a:off x="463725" y="423608"/>
+              <a:ext cx="18571136" cy="5519992"/>
             </a:xfrm>
             <a:prstGeom prst="rect">
               <a:avLst/>
@@ -3064,41 +3064,6 @@
           </p:spPr>
         </p:pic>
       </p:grpSp>
-      <p:pic>
-        <p:nvPicPr>
-          <p:cNvPr id="8" name="Picture 7" descr="A group of graphs showing different colors&#10;&#10;Description automatically generated with medium confidence">
-            <a:extLst>
-              <a:ext uri="{FF2B5EF4-FFF2-40B4-BE49-F238E27FC236}">
-                <a16:creationId xmlns:a16="http://schemas.microsoft.com/office/drawing/2014/main" id="{D57E3C46-E697-5D03-3776-41959B63085A}"/>
-              </a:ext>
-            </a:extLst>
-          </p:cNvPr>
-          <p:cNvPicPr>
-            <a:picLocks noChangeAspect="1"/>
-          </p:cNvPicPr>
-          <p:nvPr/>
-        </p:nvPicPr>
-        <p:blipFill rotWithShape="1">
-          <a:blip r:embed="rId2">
-            <a:extLst>
-              <a:ext uri="{28A0092B-C50C-407E-A947-70E740481C1C}">
-                <a14:useLocalDpi xmlns:a14="http://schemas.microsoft.com/office/drawing/2010/main" val="0"/>
-              </a:ext>
-            </a:extLst>
-          </a:blip>
-          <a:srcRect l="84421" r="1314"/>
-          <a:stretch/>
-        </p:blipFill>
-        <p:spPr>
-          <a:xfrm>
-            <a:off x="20257462" y="775252"/>
-            <a:ext cx="3391382" cy="10336696"/>
-          </a:xfrm>
-          <a:prstGeom prst="rect">
-            <a:avLst/>
-          </a:prstGeom>
-        </p:spPr>
-      </p:pic>
       <p:grpSp>
         <p:nvGrpSpPr>
           <p:cNvPr id="18" name="Group 17">
@@ -3113,10 +3078,10 @@
         </p:nvGrpSpPr>
         <p:grpSpPr>
           <a:xfrm>
-            <a:off x="304637" y="323024"/>
-            <a:ext cx="320374" cy="6401107"/>
-            <a:chOff x="1729159" y="-89178"/>
-            <a:chExt cx="517527" cy="10340250"/>
+            <a:off x="767623" y="0"/>
+            <a:ext cx="320374" cy="6630241"/>
+            <a:chOff x="1729159" y="-681409"/>
+            <a:chExt cx="517527" cy="10710390"/>
           </a:xfrm>
         </p:grpSpPr>
         <p:sp>
@@ -3133,7 +3098,7 @@
           </p:nvSpPr>
           <p:spPr>
             <a:xfrm>
-              <a:off x="1729159" y="-89178"/>
+              <a:off x="1729159" y="-681409"/>
               <a:ext cx="513976" cy="1380186"/>
             </a:xfrm>
             <a:prstGeom prst="rect">
@@ -3170,7 +3135,7 @@
           </p:nvSpPr>
           <p:spPr>
             <a:xfrm>
-              <a:off x="1732710" y="8870886"/>
+              <a:off x="1732710" y="8648795"/>
               <a:ext cx="513976" cy="1380186"/>
             </a:xfrm>
             <a:prstGeom prst="rect">
@@ -3194,6 +3159,41 @@
           </p:txBody>
         </p:sp>
       </p:grpSp>
+      <p:pic>
+        <p:nvPicPr>
+          <p:cNvPr id="12" name="Picture 11" descr="A group of graphs showing different colors&#10;&#10;Description automatically generated with medium confidence">
+            <a:extLst>
+              <a:ext uri="{FF2B5EF4-FFF2-40B4-BE49-F238E27FC236}">
+                <a16:creationId xmlns:a16="http://schemas.microsoft.com/office/drawing/2014/main" id="{B0E75741-BF82-AA74-ADA3-FE080B872F78}"/>
+              </a:ext>
+            </a:extLst>
+          </p:cNvPr>
+          <p:cNvPicPr>
+            <a:picLocks noChangeAspect="1"/>
+          </p:cNvPicPr>
+          <p:nvPr/>
+        </p:nvPicPr>
+        <p:blipFill rotWithShape="1">
+          <a:blip r:embed="rId2">
+            <a:extLst>
+              <a:ext uri="{28A0092B-C50C-407E-A947-70E740481C1C}">
+                <a14:useLocalDpi xmlns:a14="http://schemas.microsoft.com/office/drawing/2010/main" val="0"/>
+              </a:ext>
+            </a:extLst>
+          </a:blip>
+          <a:srcRect l="83585" r="633" b="327"/>
+          <a:stretch/>
+        </p:blipFill>
+        <p:spPr>
+          <a:xfrm>
+            <a:off x="19654737" y="376943"/>
+            <a:ext cx="3506386" cy="11072764"/>
+          </a:xfrm>
+          <a:prstGeom prst="rect">
+            <a:avLst/>
+          </a:prstGeom>
+        </p:spPr>
+      </p:pic>
     </p:spTree>
     <p:extLst>
       <p:ext uri="{BB962C8B-B14F-4D97-AF65-F5344CB8AC3E}">

</xml_diff>

<commit_message>
final updates for second submission
</commit_message>
<xml_diff>
--- a/manuscript/final_figures/Figure_Box1_cleanup.pptx
+++ b/manuscript/final_figures/Figure_Box1_cleanup.pptx
@@ -243,7 +243,7 @@
           <a:p>
             <a:fld id="{9989B3A2-2388-44BE-9854-4BCC09CB1095}" type="datetimeFigureOut">
               <a:rPr lang="en-US" smtClean="0"/>
-              <a:t>1/25/2024</a:t>
+              <a:t>2/8/2024</a:t>
             </a:fld>
             <a:endParaRPr lang="en-US"/>
           </a:p>
@@ -413,7 +413,7 @@
           <a:p>
             <a:fld id="{9989B3A2-2388-44BE-9854-4BCC09CB1095}" type="datetimeFigureOut">
               <a:rPr lang="en-US" smtClean="0"/>
-              <a:t>1/25/2024</a:t>
+              <a:t>2/8/2024</a:t>
             </a:fld>
             <a:endParaRPr lang="en-US"/>
           </a:p>
@@ -593,7 +593,7 @@
           <a:p>
             <a:fld id="{9989B3A2-2388-44BE-9854-4BCC09CB1095}" type="datetimeFigureOut">
               <a:rPr lang="en-US" smtClean="0"/>
-              <a:t>1/25/2024</a:t>
+              <a:t>2/8/2024</a:t>
             </a:fld>
             <a:endParaRPr lang="en-US"/>
           </a:p>
@@ -763,7 +763,7 @@
           <a:p>
             <a:fld id="{9989B3A2-2388-44BE-9854-4BCC09CB1095}" type="datetimeFigureOut">
               <a:rPr lang="en-US" smtClean="0"/>
-              <a:t>1/25/2024</a:t>
+              <a:t>2/8/2024</a:t>
             </a:fld>
             <a:endParaRPr lang="en-US"/>
           </a:p>
@@ -1009,7 +1009,7 @@
           <a:p>
             <a:fld id="{9989B3A2-2388-44BE-9854-4BCC09CB1095}" type="datetimeFigureOut">
               <a:rPr lang="en-US" smtClean="0"/>
-              <a:t>1/25/2024</a:t>
+              <a:t>2/8/2024</a:t>
             </a:fld>
             <a:endParaRPr lang="en-US"/>
           </a:p>
@@ -1241,7 +1241,7 @@
           <a:p>
             <a:fld id="{9989B3A2-2388-44BE-9854-4BCC09CB1095}" type="datetimeFigureOut">
               <a:rPr lang="en-US" smtClean="0"/>
-              <a:t>1/25/2024</a:t>
+              <a:t>2/8/2024</a:t>
             </a:fld>
             <a:endParaRPr lang="en-US"/>
           </a:p>
@@ -1608,7 +1608,7 @@
           <a:p>
             <a:fld id="{9989B3A2-2388-44BE-9854-4BCC09CB1095}" type="datetimeFigureOut">
               <a:rPr lang="en-US" smtClean="0"/>
-              <a:t>1/25/2024</a:t>
+              <a:t>2/8/2024</a:t>
             </a:fld>
             <a:endParaRPr lang="en-US"/>
           </a:p>
@@ -1726,7 +1726,7 @@
           <a:p>
             <a:fld id="{9989B3A2-2388-44BE-9854-4BCC09CB1095}" type="datetimeFigureOut">
               <a:rPr lang="en-US" smtClean="0"/>
-              <a:t>1/25/2024</a:t>
+              <a:t>2/8/2024</a:t>
             </a:fld>
             <a:endParaRPr lang="en-US"/>
           </a:p>
@@ -1821,7 +1821,7 @@
           <a:p>
             <a:fld id="{9989B3A2-2388-44BE-9854-4BCC09CB1095}" type="datetimeFigureOut">
               <a:rPr lang="en-US" smtClean="0"/>
-              <a:t>1/25/2024</a:t>
+              <a:t>2/8/2024</a:t>
             </a:fld>
             <a:endParaRPr lang="en-US"/>
           </a:p>
@@ -2098,7 +2098,7 @@
           <a:p>
             <a:fld id="{9989B3A2-2388-44BE-9854-4BCC09CB1095}" type="datetimeFigureOut">
               <a:rPr lang="en-US" smtClean="0"/>
-              <a:t>1/25/2024</a:t>
+              <a:t>2/8/2024</a:t>
             </a:fld>
             <a:endParaRPr lang="en-US"/>
           </a:p>
@@ -2355,7 +2355,7 @@
           <a:p>
             <a:fld id="{9989B3A2-2388-44BE-9854-4BCC09CB1095}" type="datetimeFigureOut">
               <a:rPr lang="en-US" smtClean="0"/>
-              <a:t>1/25/2024</a:t>
+              <a:t>2/8/2024</a:t>
             </a:fld>
             <a:endParaRPr lang="en-US"/>
           </a:p>
@@ -2568,7 +2568,7 @@
           <a:p>
             <a:fld id="{9989B3A2-2388-44BE-9854-4BCC09CB1095}" type="datetimeFigureOut">
               <a:rPr lang="en-US" smtClean="0"/>
-              <a:t>1/25/2024</a:t>
+              <a:t>2/8/2024</a:t>
             </a:fld>
             <a:endParaRPr lang="en-US"/>
           </a:p>
@@ -2975,10 +2975,10 @@
       </p:grpSpPr>
       <p:grpSp>
         <p:nvGrpSpPr>
-          <p:cNvPr id="13" name="Group 12">
+          <p:cNvPr id="10" name="Group 9">
             <a:extLst>
               <a:ext uri="{FF2B5EF4-FFF2-40B4-BE49-F238E27FC236}">
-                <a16:creationId xmlns:a16="http://schemas.microsoft.com/office/drawing/2014/main" id="{4C0A83DB-3AC3-FA73-7C20-6CED4EC90AEF}"/>
+                <a16:creationId xmlns:a16="http://schemas.microsoft.com/office/drawing/2014/main" id="{F9587F46-C964-8759-F6B5-58D1787D439E}"/>
               </a:ext>
             </a:extLst>
           </p:cNvPr>
@@ -2987,18 +2987,18 @@
         </p:nvGrpSpPr>
         <p:grpSpPr>
           <a:xfrm>
-            <a:off x="926711" y="467203"/>
-            <a:ext cx="18571136" cy="11359447"/>
-            <a:chOff x="463725" y="423608"/>
-            <a:chExt cx="18571136" cy="11359447"/>
+            <a:off x="926711" y="410558"/>
+            <a:ext cx="18622439" cy="11402380"/>
+            <a:chOff x="926711" y="410558"/>
+            <a:chExt cx="18622439" cy="11402380"/>
           </a:xfrm>
         </p:grpSpPr>
         <p:pic>
           <p:nvPicPr>
-            <p:cNvPr id="7" name="Picture 6" descr="A group of graphs showing different colors&#10;&#10;Description automatically generated with medium confidence">
+            <p:cNvPr id="5" name="Picture 4" descr="A group of graphs showing different colors&#10;&#10;Description automatically generated with medium confidence">
               <a:extLst>
                 <a:ext uri="{FF2B5EF4-FFF2-40B4-BE49-F238E27FC236}">
-                  <a16:creationId xmlns:a16="http://schemas.microsoft.com/office/drawing/2014/main" id="{F9CEDBA1-EF76-8827-A3E9-66E2C686AC30}"/>
+                  <a16:creationId xmlns:a16="http://schemas.microsoft.com/office/drawing/2014/main" id="{42AF7FE2-47E0-1B25-98E6-73068CE2C3E2}"/>
                 </a:ext>
               </a:extLst>
             </p:cNvPr>
@@ -3015,13 +3015,13 @@
                 </a:ext>
               </a:extLst>
             </a:blip>
-            <a:srcRect t="49378" r="16415"/>
+            <a:srcRect r="16939" b="50245"/>
             <a:stretch/>
           </p:blipFill>
           <p:spPr>
             <a:xfrm>
-              <a:off x="463725" y="6159446"/>
-              <a:ext cx="18571136" cy="5623609"/>
+              <a:off x="926711" y="410558"/>
+              <a:ext cx="18473800" cy="5533041"/>
             </a:xfrm>
             <a:prstGeom prst="rect">
               <a:avLst/>
@@ -3030,10 +3030,10 @@
         </p:pic>
         <p:pic>
           <p:nvPicPr>
-            <p:cNvPr id="9" name="Picture 8" descr="A group of graphs showing different colors&#10;&#10;Description automatically generated with medium confidence">
+            <p:cNvPr id="6" name="Picture 5" descr="A group of graphs showing different colors&#10;&#10;Description automatically generated with medium confidence">
               <a:extLst>
                 <a:ext uri="{FF2B5EF4-FFF2-40B4-BE49-F238E27FC236}">
-                  <a16:creationId xmlns:a16="http://schemas.microsoft.com/office/drawing/2014/main" id="{E66C32BC-9B9B-DF3D-8244-06889F10585F}"/>
+                  <a16:creationId xmlns:a16="http://schemas.microsoft.com/office/drawing/2014/main" id="{A50F7305-32D4-1319-E7FE-0887032F8C04}"/>
                 </a:ext>
               </a:extLst>
             </p:cNvPr>
@@ -3050,13 +3050,13 @@
                 </a:ext>
               </a:extLst>
             </a:blip>
-            <a:srcRect r="16415" b="50311"/>
+            <a:srcRect t="49036" r="16271" b="-1"/>
             <a:stretch/>
           </p:blipFill>
           <p:spPr>
             <a:xfrm>
-              <a:off x="463725" y="423608"/>
-              <a:ext cx="18571136" cy="5519992"/>
+              <a:off x="926711" y="6145420"/>
+              <a:ext cx="18622439" cy="5667518"/>
             </a:xfrm>
             <a:prstGeom prst="rect">
               <a:avLst/>
@@ -3064,6 +3064,41 @@
           </p:spPr>
         </p:pic>
       </p:grpSp>
+      <p:pic>
+        <p:nvPicPr>
+          <p:cNvPr id="8" name="Picture 7" descr="A group of graphs showing different colors&#10;&#10;Description automatically generated with medium confidence">
+            <a:extLst>
+              <a:ext uri="{FF2B5EF4-FFF2-40B4-BE49-F238E27FC236}">
+                <a16:creationId xmlns:a16="http://schemas.microsoft.com/office/drawing/2014/main" id="{526D005C-D366-B9DB-FB36-D3551C3922BA}"/>
+              </a:ext>
+            </a:extLst>
+          </p:cNvPr>
+          <p:cNvPicPr>
+            <a:picLocks noChangeAspect="1"/>
+          </p:cNvPicPr>
+          <p:nvPr/>
+        </p:nvPicPr>
+        <p:blipFill rotWithShape="1">
+          <a:blip r:embed="rId2">
+            <a:extLst>
+              <a:ext uri="{28A0092B-C50C-407E-A947-70E740481C1C}">
+                <a14:useLocalDpi xmlns:a14="http://schemas.microsoft.com/office/drawing/2010/main" val="0"/>
+              </a:ext>
+            </a:extLst>
+          </a:blip>
+          <a:srcRect l="83742" t="21495" b="20895"/>
+          <a:stretch/>
+        </p:blipFill>
+        <p:spPr>
+          <a:xfrm>
+            <a:off x="19861365" y="2740259"/>
+            <a:ext cx="3615891" cy="6406679"/>
+          </a:xfrm>
+          <a:prstGeom prst="rect">
+            <a:avLst/>
+          </a:prstGeom>
+        </p:spPr>
+      </p:pic>
       <p:grpSp>
         <p:nvGrpSpPr>
           <p:cNvPr id="18" name="Group 17">
@@ -3159,41 +3194,6 @@
           </p:txBody>
         </p:sp>
       </p:grpSp>
-      <p:pic>
-        <p:nvPicPr>
-          <p:cNvPr id="12" name="Picture 11" descr="A group of graphs showing different colors&#10;&#10;Description automatically generated with medium confidence">
-            <a:extLst>
-              <a:ext uri="{FF2B5EF4-FFF2-40B4-BE49-F238E27FC236}">
-                <a16:creationId xmlns:a16="http://schemas.microsoft.com/office/drawing/2014/main" id="{B0E75741-BF82-AA74-ADA3-FE080B872F78}"/>
-              </a:ext>
-            </a:extLst>
-          </p:cNvPr>
-          <p:cNvPicPr>
-            <a:picLocks noChangeAspect="1"/>
-          </p:cNvPicPr>
-          <p:nvPr/>
-        </p:nvPicPr>
-        <p:blipFill rotWithShape="1">
-          <a:blip r:embed="rId2">
-            <a:extLst>
-              <a:ext uri="{28A0092B-C50C-407E-A947-70E740481C1C}">
-                <a14:useLocalDpi xmlns:a14="http://schemas.microsoft.com/office/drawing/2010/main" val="0"/>
-              </a:ext>
-            </a:extLst>
-          </a:blip>
-          <a:srcRect l="83585" r="633" b="327"/>
-          <a:stretch/>
-        </p:blipFill>
-        <p:spPr>
-          <a:xfrm>
-            <a:off x="19654737" y="376943"/>
-            <a:ext cx="3506386" cy="11072764"/>
-          </a:xfrm>
-          <a:prstGeom prst="rect">
-            <a:avLst/>
-          </a:prstGeom>
-        </p:spPr>
-      </p:pic>
     </p:spTree>
     <p:extLst>
       <p:ext uri="{BB962C8B-B14F-4D97-AF65-F5344CB8AC3E}">

</xml_diff>